<commit_message>
line integral 작성 초안 완료
</commit_message>
<xml_diff>
--- a/pics/2020-08-17-line_integral/pics.pptx
+++ b/pics/2020-08-17-line_integral/pics.pptx
@@ -6,6 +6,7 @@
   </p:sldMasterIdLst>
   <p:sldIdLst>
     <p:sldId id="256" r:id="rId2"/>
+    <p:sldId id="257" r:id="rId3"/>
   </p:sldIdLst>
   <p:sldSz cx="12192000" cy="6858000"/>
   <p:notesSz cx="6858000" cy="9144000"/>
@@ -104,6 +105,11 @@
       </a:defRPr>
     </a:lvl9pPr>
   </p:defaultTextStyle>
+  <p:extLst>
+    <p:ext uri="{EFAFB233-063F-42B5-8137-9DF3F51BA10A}">
+      <p15:sldGuideLst xmlns:p15="http://schemas.microsoft.com/office/powerpoint/2012/main"/>
+    </p:ext>
+  </p:extLst>
 </p:presentation>
 </file>
 
@@ -254,7 +260,7 @@
           <a:p>
             <a:fld id="{444083E8-13C9-443A-940E-8357ED0D1E1F}" type="datetimeFigureOut">
               <a:rPr lang="ko-KR" altLang="en-US" smtClean="0"/>
-              <a:t>2020-08-18</a:t>
+              <a:t>2020-08-22</a:t>
             </a:fld>
             <a:endParaRPr lang="ko-KR" altLang="en-US"/>
           </a:p>
@@ -452,7 +458,7 @@
           <a:p>
             <a:fld id="{444083E8-13C9-443A-940E-8357ED0D1E1F}" type="datetimeFigureOut">
               <a:rPr lang="ko-KR" altLang="en-US" smtClean="0"/>
-              <a:t>2020-08-18</a:t>
+              <a:t>2020-08-22</a:t>
             </a:fld>
             <a:endParaRPr lang="ko-KR" altLang="en-US"/>
           </a:p>
@@ -660,7 +666,7 @@
           <a:p>
             <a:fld id="{444083E8-13C9-443A-940E-8357ED0D1E1F}" type="datetimeFigureOut">
               <a:rPr lang="ko-KR" altLang="en-US" smtClean="0"/>
-              <a:t>2020-08-18</a:t>
+              <a:t>2020-08-22</a:t>
             </a:fld>
             <a:endParaRPr lang="ko-KR" altLang="en-US"/>
           </a:p>
@@ -858,7 +864,7 @@
           <a:p>
             <a:fld id="{444083E8-13C9-443A-940E-8357ED0D1E1F}" type="datetimeFigureOut">
               <a:rPr lang="ko-KR" altLang="en-US" smtClean="0"/>
-              <a:t>2020-08-18</a:t>
+              <a:t>2020-08-22</a:t>
             </a:fld>
             <a:endParaRPr lang="ko-KR" altLang="en-US"/>
           </a:p>
@@ -1133,7 +1139,7 @@
           <a:p>
             <a:fld id="{444083E8-13C9-443A-940E-8357ED0D1E1F}" type="datetimeFigureOut">
               <a:rPr lang="ko-KR" altLang="en-US" smtClean="0"/>
-              <a:t>2020-08-18</a:t>
+              <a:t>2020-08-22</a:t>
             </a:fld>
             <a:endParaRPr lang="ko-KR" altLang="en-US"/>
           </a:p>
@@ -1398,7 +1404,7 @@
           <a:p>
             <a:fld id="{444083E8-13C9-443A-940E-8357ED0D1E1F}" type="datetimeFigureOut">
               <a:rPr lang="ko-KR" altLang="en-US" smtClean="0"/>
-              <a:t>2020-08-18</a:t>
+              <a:t>2020-08-22</a:t>
             </a:fld>
             <a:endParaRPr lang="ko-KR" altLang="en-US"/>
           </a:p>
@@ -1810,7 +1816,7 @@
           <a:p>
             <a:fld id="{444083E8-13C9-443A-940E-8357ED0D1E1F}" type="datetimeFigureOut">
               <a:rPr lang="ko-KR" altLang="en-US" smtClean="0"/>
-              <a:t>2020-08-18</a:t>
+              <a:t>2020-08-22</a:t>
             </a:fld>
             <a:endParaRPr lang="ko-KR" altLang="en-US"/>
           </a:p>
@@ -1951,7 +1957,7 @@
           <a:p>
             <a:fld id="{444083E8-13C9-443A-940E-8357ED0D1E1F}" type="datetimeFigureOut">
               <a:rPr lang="ko-KR" altLang="en-US" smtClean="0"/>
-              <a:t>2020-08-18</a:t>
+              <a:t>2020-08-22</a:t>
             </a:fld>
             <a:endParaRPr lang="ko-KR" altLang="en-US"/>
           </a:p>
@@ -2064,7 +2070,7 @@
           <a:p>
             <a:fld id="{444083E8-13C9-443A-940E-8357ED0D1E1F}" type="datetimeFigureOut">
               <a:rPr lang="ko-KR" altLang="en-US" smtClean="0"/>
-              <a:t>2020-08-18</a:t>
+              <a:t>2020-08-22</a:t>
             </a:fld>
             <a:endParaRPr lang="ko-KR" altLang="en-US"/>
           </a:p>
@@ -2375,7 +2381,7 @@
           <a:p>
             <a:fld id="{444083E8-13C9-443A-940E-8357ED0D1E1F}" type="datetimeFigureOut">
               <a:rPr lang="ko-KR" altLang="en-US" smtClean="0"/>
-              <a:t>2020-08-18</a:t>
+              <a:t>2020-08-22</a:t>
             </a:fld>
             <a:endParaRPr lang="ko-KR" altLang="en-US"/>
           </a:p>
@@ -2663,7 +2669,7 @@
           <a:p>
             <a:fld id="{444083E8-13C9-443A-940E-8357ED0D1E1F}" type="datetimeFigureOut">
               <a:rPr lang="ko-KR" altLang="en-US" smtClean="0"/>
-              <a:t>2020-08-18</a:t>
+              <a:t>2020-08-22</a:t>
             </a:fld>
             <a:endParaRPr lang="ko-KR" altLang="en-US"/>
           </a:p>
@@ -2904,7 +2910,7 @@
           <a:p>
             <a:fld id="{444083E8-13C9-443A-940E-8357ED0D1E1F}" type="datetimeFigureOut">
               <a:rPr lang="ko-KR" altLang="en-US" smtClean="0"/>
-              <a:t>2020-08-18</a:t>
+              <a:t>2020-08-22</a:t>
             </a:fld>
             <a:endParaRPr lang="ko-KR" altLang="en-US"/>
           </a:p>
@@ -3321,12 +3327,48 @@
           <a:chExt cx="0" cy="0"/>
         </a:xfrm>
       </p:grpSpPr>
+      <p:pic>
+        <p:nvPicPr>
+          <p:cNvPr id="5" name="그림 4">
+            <a:extLst>
+              <a:ext uri="{FF2B5EF4-FFF2-40B4-BE49-F238E27FC236}">
+                <a16:creationId xmlns:a16="http://schemas.microsoft.com/office/drawing/2014/main" id="{EB3154AE-322D-4E54-8E31-E89EB96995BB}"/>
+              </a:ext>
+            </a:extLst>
+          </p:cNvPr>
+          <p:cNvPicPr>
+            <a:picLocks noChangeAspect="1"/>
+          </p:cNvPicPr>
+          <p:nvPr/>
+        </p:nvPicPr>
+        <p:blipFill>
+          <a:blip r:embed="rId2">
+            <a:extLst>
+              <a:ext uri="{28A0092B-C50C-407E-A947-70E740481C1C}">
+                <a14:useLocalDpi xmlns:a14="http://schemas.microsoft.com/office/drawing/2010/main" val="0"/>
+              </a:ext>
+            </a:extLst>
+          </a:blip>
+          <a:stretch>
+            <a:fillRect/>
+          </a:stretch>
+        </p:blipFill>
+        <p:spPr>
+          <a:xfrm>
+            <a:off x="4423242" y="2859972"/>
+            <a:ext cx="2856313" cy="1322723"/>
+          </a:xfrm>
+          <a:prstGeom prst="rect">
+            <a:avLst/>
+          </a:prstGeom>
+        </p:spPr>
+      </p:pic>
       <p:grpSp>
         <p:nvGrpSpPr>
-          <p:cNvPr id="22" name="그룹 21">
-            <a:extLst>
-              <a:ext uri="{FF2B5EF4-FFF2-40B4-BE49-F238E27FC236}">
-                <a16:creationId xmlns:a16="http://schemas.microsoft.com/office/drawing/2014/main" id="{C0C9CD51-7EA4-4F41-88A2-2A13B11D551E}"/>
+          <p:cNvPr id="17" name="그룹 16">
+            <a:extLst>
+              <a:ext uri="{FF2B5EF4-FFF2-40B4-BE49-F238E27FC236}">
+                <a16:creationId xmlns:a16="http://schemas.microsoft.com/office/drawing/2014/main" id="{47D8152B-3C4A-4B5A-BF9D-5B3DEC2B7C65}"/>
               </a:ext>
             </a:extLst>
           </p:cNvPr>
@@ -3335,580 +3377,1579 @@
         </p:nvGrpSpPr>
         <p:grpSpPr>
           <a:xfrm>
-            <a:off x="4423242" y="2464415"/>
-            <a:ext cx="3345517" cy="1868211"/>
-            <a:chOff x="4667843" y="2372081"/>
-            <a:chExt cx="3345517" cy="1868211"/>
+            <a:off x="4747599" y="4106550"/>
+            <a:ext cx="848412" cy="68580"/>
+            <a:chOff x="4992200" y="3863340"/>
+            <a:chExt cx="848412" cy="68580"/>
           </a:xfrm>
         </p:grpSpPr>
-        <p:pic>
-          <p:nvPicPr>
-            <p:cNvPr id="5" name="그림 4">
+        <p:cxnSp>
+          <p:nvCxnSpPr>
+            <p:cNvPr id="7" name="직선 연결선 6">
               <a:extLst>
                 <a:ext uri="{FF2B5EF4-FFF2-40B4-BE49-F238E27FC236}">
-                  <a16:creationId xmlns:a16="http://schemas.microsoft.com/office/drawing/2014/main" id="{EB3154AE-322D-4E54-8E31-E89EB96995BB}"/>
+                  <a16:creationId xmlns:a16="http://schemas.microsoft.com/office/drawing/2014/main" id="{2A2F3429-150D-4099-9BC2-A0BE8D83C869}"/>
                 </a:ext>
               </a:extLst>
             </p:cNvPr>
-            <p:cNvPicPr>
-              <a:picLocks noChangeAspect="1"/>
-            </p:cNvPicPr>
+            <p:cNvCxnSpPr/>
             <p:nvPr/>
-          </p:nvPicPr>
-          <p:blipFill>
-            <a:blip r:embed="rId2">
-              <a:extLst>
-                <a:ext uri="{28A0092B-C50C-407E-A947-70E740481C1C}">
-                  <a14:useLocalDpi xmlns:a14="http://schemas.microsoft.com/office/drawing/2010/main" val="0"/>
-                </a:ext>
-              </a:extLst>
-            </a:blip>
-            <a:stretch>
-              <a:fillRect/>
-            </a:stretch>
-          </p:blipFill>
+          </p:nvCxnSpPr>
           <p:spPr>
             <a:xfrm>
-              <a:off x="4667843" y="2767638"/>
-              <a:ext cx="2856313" cy="1322723"/>
+              <a:off x="4992200" y="3897630"/>
+              <a:ext cx="848412" cy="0"/>
             </a:xfrm>
-            <a:prstGeom prst="rect">
+            <a:prstGeom prst="line">
               <a:avLst/>
             </a:prstGeom>
-          </p:spPr>
-        </p:pic>
-        <p:grpSp>
-          <p:nvGrpSpPr>
-            <p:cNvPr id="17" name="그룹 16">
-              <a:extLst>
-                <a:ext uri="{FF2B5EF4-FFF2-40B4-BE49-F238E27FC236}">
-                  <a16:creationId xmlns:a16="http://schemas.microsoft.com/office/drawing/2014/main" id="{47D8152B-3C4A-4B5A-BF9D-5B3DEC2B7C65}"/>
-                </a:ext>
-              </a:extLst>
-            </p:cNvPr>
-            <p:cNvGrpSpPr/>
-            <p:nvPr/>
-          </p:nvGrpSpPr>
-          <p:grpSpPr>
-            <a:xfrm>
-              <a:off x="4992200" y="3886200"/>
-              <a:ext cx="848412" cy="68580"/>
-              <a:chOff x="4992200" y="3863340"/>
-              <a:chExt cx="848412" cy="68580"/>
-            </a:xfrm>
-          </p:grpSpPr>
-          <p:cxnSp>
-            <p:nvCxnSpPr>
-              <p:cNvPr id="7" name="직선 연결선 6">
-                <a:extLst>
-                  <a:ext uri="{FF2B5EF4-FFF2-40B4-BE49-F238E27FC236}">
-                    <a16:creationId xmlns:a16="http://schemas.microsoft.com/office/drawing/2014/main" id="{2A2F3429-150D-4099-9BC2-A0BE8D83C869}"/>
-                  </a:ext>
-                </a:extLst>
-              </p:cNvPr>
-              <p:cNvCxnSpPr/>
-              <p:nvPr/>
-            </p:nvCxnSpPr>
-            <p:spPr>
-              <a:xfrm>
-                <a:off x="4992200" y="3897630"/>
-                <a:ext cx="848412" cy="0"/>
-              </a:xfrm>
-              <a:prstGeom prst="line">
-                <a:avLst/>
-              </a:prstGeom>
-              <a:ln w="19050">
-                <a:solidFill>
-                  <a:srgbClr val="FF0000"/>
-                </a:solidFill>
-              </a:ln>
-            </p:spPr>
-            <p:style>
-              <a:lnRef idx="1">
-                <a:schemeClr val="accent1"/>
-              </a:lnRef>
-              <a:fillRef idx="0">
-                <a:schemeClr val="accent1"/>
-              </a:fillRef>
-              <a:effectRef idx="0">
-                <a:schemeClr val="accent1"/>
-              </a:effectRef>
-              <a:fontRef idx="minor">
-                <a:schemeClr val="tx1"/>
-              </a:fontRef>
-            </p:style>
-          </p:cxnSp>
-          <p:cxnSp>
-            <p:nvCxnSpPr>
-              <p:cNvPr id="9" name="직선 연결선 8">
-                <a:extLst>
-                  <a:ext uri="{FF2B5EF4-FFF2-40B4-BE49-F238E27FC236}">
-                    <a16:creationId xmlns:a16="http://schemas.microsoft.com/office/drawing/2014/main" id="{E0B4C48F-B7CD-466D-ABC6-B14C4A5A0F25}"/>
-                  </a:ext>
-                </a:extLst>
-              </p:cNvPr>
-              <p:cNvCxnSpPr>
-                <a:cxnSpLocks/>
-              </p:cNvCxnSpPr>
-              <p:nvPr/>
-            </p:nvCxnSpPr>
-            <p:spPr>
-              <a:xfrm>
-                <a:off x="4992200" y="3863340"/>
-                <a:ext cx="0" cy="68580"/>
-              </a:xfrm>
-              <a:prstGeom prst="line">
-                <a:avLst/>
-              </a:prstGeom>
-              <a:ln w="19050">
-                <a:solidFill>
-                  <a:srgbClr val="FF0000"/>
-                </a:solidFill>
-              </a:ln>
-            </p:spPr>
-            <p:style>
-              <a:lnRef idx="1">
-                <a:schemeClr val="accent1"/>
-              </a:lnRef>
-              <a:fillRef idx="0">
-                <a:schemeClr val="accent1"/>
-              </a:fillRef>
-              <a:effectRef idx="0">
-                <a:schemeClr val="accent1"/>
-              </a:effectRef>
-              <a:fontRef idx="minor">
-                <a:schemeClr val="tx1"/>
-              </a:fontRef>
-            </p:style>
-          </p:cxnSp>
-          <p:cxnSp>
-            <p:nvCxnSpPr>
-              <p:cNvPr id="11" name="직선 연결선 10">
-                <a:extLst>
-                  <a:ext uri="{FF2B5EF4-FFF2-40B4-BE49-F238E27FC236}">
-                    <a16:creationId xmlns:a16="http://schemas.microsoft.com/office/drawing/2014/main" id="{CFD10BF9-245B-4580-9251-965F1769E5AC}"/>
-                  </a:ext>
-                </a:extLst>
-              </p:cNvPr>
-              <p:cNvCxnSpPr>
-                <a:cxnSpLocks/>
-              </p:cNvCxnSpPr>
-              <p:nvPr/>
-            </p:nvCxnSpPr>
-            <p:spPr>
-              <a:xfrm>
-                <a:off x="5840612" y="3863340"/>
-                <a:ext cx="0" cy="68580"/>
-              </a:xfrm>
-              <a:prstGeom prst="line">
-                <a:avLst/>
-              </a:prstGeom>
-              <a:ln w="19050">
-                <a:solidFill>
-                  <a:srgbClr val="FF0000"/>
-                </a:solidFill>
-              </a:ln>
-            </p:spPr>
-            <p:style>
-              <a:lnRef idx="1">
-                <a:schemeClr val="accent1"/>
-              </a:lnRef>
-              <a:fillRef idx="0">
-                <a:schemeClr val="accent1"/>
-              </a:fillRef>
-              <a:effectRef idx="0">
-                <a:schemeClr val="accent1"/>
-              </a:effectRef>
-              <a:fontRef idx="minor">
-                <a:schemeClr val="tx1"/>
-              </a:fontRef>
-            </p:style>
-          </p:cxnSp>
-        </p:grpSp>
-        <mc:AlternateContent xmlns:mc="http://schemas.openxmlformats.org/markup-compatibility/2006">
-          <mc:Choice xmlns:a14="http://schemas.microsoft.com/office/drawing/2010/main" Requires="a14">
-            <p:sp>
-              <p:nvSpPr>
-                <p:cNvPr id="18" name="TextBox 17">
-                  <a:extLst>
-                    <a:ext uri="{FF2B5EF4-FFF2-40B4-BE49-F238E27FC236}">
-                      <a16:creationId xmlns:a16="http://schemas.microsoft.com/office/drawing/2014/main" id="{327FCE86-AD27-496A-9CEE-F0763C80365B}"/>
-                    </a:ext>
-                  </a:extLst>
-                </p:cNvPr>
-                <p:cNvSpPr txBox="1"/>
-                <p:nvPr/>
-              </p:nvSpPr>
-              <p:spPr>
-                <a:xfrm>
-                  <a:off x="5233035" y="3870960"/>
-                  <a:ext cx="378565" cy="369332"/>
-                </a:xfrm>
-                <a:prstGeom prst="rect">
-                  <a:avLst/>
-                </a:prstGeom>
-                <a:noFill/>
-              </p:spPr>
-              <p:txBody>
-                <a:bodyPr wrap="none" rtlCol="0">
-                  <a:spAutoFit/>
-                </a:bodyPr>
-                <a:lstStyle/>
-                <a:p>
-                  <a14:m>
-                    <m:oMathPara xmlns:m="http://schemas.openxmlformats.org/officeDocument/2006/math">
-                      <m:oMathParaPr>
-                        <m:jc m:val="centerGroup"/>
-                      </m:oMathParaPr>
-                      <m:oMath xmlns:m="http://schemas.openxmlformats.org/officeDocument/2006/math">
-                        <m:r>
-                          <a:rPr lang="en-US" altLang="ko-KR" b="0" i="1" smtClean="0">
-                            <a:latin typeface="Cambria Math" panose="02040503050406030204" pitchFamily="18" charset="0"/>
-                          </a:rPr>
-                          <m:t>𝑠</m:t>
-                        </m:r>
-                      </m:oMath>
-                    </m:oMathPara>
-                  </a14:m>
-                  <a:endParaRPr lang="ko-KR" altLang="en-US" dirty="0"/>
-                </a:p>
-              </p:txBody>
-            </p:sp>
-          </mc:Choice>
-          <mc:Fallback>
-            <p:sp>
-              <p:nvSpPr>
-                <p:cNvPr id="18" name="TextBox 17">
-                  <a:extLst>
-                    <a:ext uri="{FF2B5EF4-FFF2-40B4-BE49-F238E27FC236}">
-                      <a16:creationId xmlns:a16="http://schemas.microsoft.com/office/drawing/2014/main" id="{327FCE86-AD27-496A-9CEE-F0763C80365B}"/>
-                    </a:ext>
-                  </a:extLst>
-                </p:cNvPr>
-                <p:cNvSpPr txBox="1">
-                  <a:spLocks noRot="1" noChangeAspect="1" noMove="1" noResize="1" noEditPoints="1" noAdjustHandles="1" noChangeArrowheads="1" noChangeShapeType="1" noTextEdit="1"/>
-                </p:cNvSpPr>
-                <p:nvPr/>
-              </p:nvSpPr>
-              <p:spPr>
-                <a:xfrm>
-                  <a:off x="5233035" y="3870960"/>
-                  <a:ext cx="378565" cy="369332"/>
-                </a:xfrm>
-                <a:prstGeom prst="rect">
-                  <a:avLst/>
-                </a:prstGeom>
-                <a:blipFill>
-                  <a:blip r:embed="rId3"/>
-                  <a:stretch>
-                    <a:fillRect/>
-                  </a:stretch>
-                </a:blipFill>
-              </p:spPr>
-              <p:txBody>
-                <a:bodyPr/>
-                <a:lstStyle/>
-                <a:p>
-                  <a:r>
-                    <a:rPr lang="ko-KR" altLang="en-US">
-                      <a:noFill/>
-                    </a:rPr>
-                    <a:t> </a:t>
-                  </a:r>
-                </a:p>
-              </p:txBody>
-            </p:sp>
-          </mc:Fallback>
-        </mc:AlternateContent>
-        <p:sp>
-          <p:nvSpPr>
-            <p:cNvPr id="19" name="화살표: 오른쪽 18">
-              <a:extLst>
-                <a:ext uri="{FF2B5EF4-FFF2-40B4-BE49-F238E27FC236}">
-                  <a16:creationId xmlns:a16="http://schemas.microsoft.com/office/drawing/2014/main" id="{D09BA496-CA2F-4846-9545-865E002A3916}"/>
-                </a:ext>
-              </a:extLst>
-            </p:cNvPr>
-            <p:cNvSpPr/>
-            <p:nvPr/>
-          </p:nvSpPr>
-          <p:spPr>
-            <a:xfrm>
-              <a:off x="7034952" y="3093720"/>
-              <a:ext cx="978408" cy="484632"/>
-            </a:xfrm>
-            <a:prstGeom prst="rightArrow">
-              <a:avLst/>
-            </a:prstGeom>
-            <a:gradFill flip="none" rotWithShape="1">
-              <a:gsLst>
-                <a:gs pos="0">
-                  <a:schemeClr val="accent1">
-                    <a:tint val="66000"/>
-                    <a:satMod val="160000"/>
-                  </a:schemeClr>
-                </a:gs>
-                <a:gs pos="30000">
-                  <a:schemeClr val="accent1">
-                    <a:tint val="44500"/>
-                    <a:satMod val="160000"/>
-                  </a:schemeClr>
-                </a:gs>
-                <a:gs pos="85000">
-                  <a:schemeClr val="bg1"/>
-                </a:gs>
-              </a:gsLst>
-              <a:lin ang="10800000" scaled="1"/>
-              <a:tileRect/>
-            </a:gradFill>
-            <a:ln>
-              <a:noFill/>
+            <a:ln w="19050">
+              <a:solidFill>
+                <a:srgbClr val="FF0000"/>
+              </a:solidFill>
             </a:ln>
           </p:spPr>
           <p:style>
-            <a:lnRef idx="2">
-              <a:schemeClr val="accent1">
-                <a:shade val="50000"/>
-              </a:schemeClr>
+            <a:lnRef idx="1">
+              <a:schemeClr val="accent1"/>
             </a:lnRef>
-            <a:fillRef idx="1">
+            <a:fillRef idx="0">
               <a:schemeClr val="accent1"/>
             </a:fillRef>
             <a:effectRef idx="0">
               <a:schemeClr val="accent1"/>
             </a:effectRef>
             <a:fontRef idx="minor">
-              <a:schemeClr val="lt1"/>
+              <a:schemeClr val="tx1"/>
             </a:fontRef>
           </p:style>
-          <p:txBody>
-            <a:bodyPr rtlCol="0" anchor="ctr"/>
-            <a:lstStyle/>
-            <a:p>
-              <a:pPr algn="ctr"/>
-              <a:endParaRPr lang="ko-KR" altLang="en-US"/>
-            </a:p>
-          </p:txBody>
-        </p:sp>
-        <mc:AlternateContent xmlns:mc="http://schemas.openxmlformats.org/markup-compatibility/2006">
-          <mc:Choice xmlns:a14="http://schemas.microsoft.com/office/drawing/2010/main" Requires="a14">
-            <p:sp>
-              <p:nvSpPr>
-                <p:cNvPr id="20" name="TextBox 19">
-                  <a:extLst>
-                    <a:ext uri="{FF2B5EF4-FFF2-40B4-BE49-F238E27FC236}">
-                      <a16:creationId xmlns:a16="http://schemas.microsoft.com/office/drawing/2014/main" id="{FA503A6F-2B04-48EE-B664-12D6C892312B}"/>
-                    </a:ext>
-                  </a:extLst>
-                </p:cNvPr>
-                <p:cNvSpPr txBox="1"/>
-                <p:nvPr/>
-              </p:nvSpPr>
-              <p:spPr>
-                <a:xfrm>
-                  <a:off x="7315894" y="2842260"/>
-                  <a:ext cx="416524" cy="369332"/>
-                </a:xfrm>
-                <a:prstGeom prst="rect">
-                  <a:avLst/>
-                </a:prstGeom>
-                <a:noFill/>
-              </p:spPr>
-              <p:txBody>
-                <a:bodyPr wrap="none" rtlCol="0">
-                  <a:spAutoFit/>
-                </a:bodyPr>
-                <a:lstStyle/>
-                <a:p>
-                  <a14:m>
-                    <m:oMathPara xmlns:m="http://schemas.openxmlformats.org/officeDocument/2006/math">
-                      <m:oMathParaPr>
-                        <m:jc m:val="centerGroup"/>
-                      </m:oMathParaPr>
-                      <m:oMath xmlns:m="http://schemas.openxmlformats.org/officeDocument/2006/math">
-                        <m:r>
-                          <a:rPr lang="en-US" altLang="ko-KR" b="0" i="1" smtClean="0">
-                            <a:latin typeface="Cambria Math" panose="02040503050406030204" pitchFamily="18" charset="0"/>
-                          </a:rPr>
-                          <m:t>𝐹</m:t>
-                        </m:r>
-                      </m:oMath>
-                    </m:oMathPara>
-                  </a14:m>
-                  <a:endParaRPr lang="ko-KR" altLang="en-US" dirty="0"/>
-                </a:p>
-              </p:txBody>
-            </p:sp>
-          </mc:Choice>
-          <mc:Fallback>
-            <p:sp>
-              <p:nvSpPr>
-                <p:cNvPr id="20" name="TextBox 19">
-                  <a:extLst>
-                    <a:ext uri="{FF2B5EF4-FFF2-40B4-BE49-F238E27FC236}">
-                      <a16:creationId xmlns:a16="http://schemas.microsoft.com/office/drawing/2014/main" id="{FA503A6F-2B04-48EE-B664-12D6C892312B}"/>
-                    </a:ext>
-                  </a:extLst>
-                </p:cNvPr>
-                <p:cNvSpPr txBox="1">
-                  <a:spLocks noRot="1" noChangeAspect="1" noMove="1" noResize="1" noEditPoints="1" noAdjustHandles="1" noChangeArrowheads="1" noChangeShapeType="1" noTextEdit="1"/>
-                </p:cNvSpPr>
-                <p:nvPr/>
-              </p:nvSpPr>
-              <p:spPr>
-                <a:xfrm>
-                  <a:off x="7315894" y="2842260"/>
-                  <a:ext cx="416524" cy="369332"/>
-                </a:xfrm>
-                <a:prstGeom prst="rect">
-                  <a:avLst/>
-                </a:prstGeom>
-                <a:blipFill>
-                  <a:blip r:embed="rId4"/>
-                  <a:stretch>
-                    <a:fillRect/>
-                  </a:stretch>
-                </a:blipFill>
-              </p:spPr>
-              <p:txBody>
-                <a:bodyPr/>
-                <a:lstStyle/>
-                <a:p>
-                  <a:r>
-                    <a:rPr lang="ko-KR" altLang="en-US">
-                      <a:noFill/>
-                    </a:rPr>
-                    <a:t> </a:t>
-                  </a:r>
-                </a:p>
-              </p:txBody>
-            </p:sp>
-          </mc:Fallback>
-        </mc:AlternateContent>
-        <mc:AlternateContent xmlns:mc="http://schemas.openxmlformats.org/markup-compatibility/2006">
-          <mc:Choice xmlns:a14="http://schemas.microsoft.com/office/drawing/2010/main" Requires="a14">
-            <p:sp>
-              <p:nvSpPr>
-                <p:cNvPr id="21" name="TextBox 20">
-                  <a:extLst>
-                    <a:ext uri="{FF2B5EF4-FFF2-40B4-BE49-F238E27FC236}">
-                      <a16:creationId xmlns:a16="http://schemas.microsoft.com/office/drawing/2014/main" id="{0A967918-DD4B-454C-A892-2DC96F138395}"/>
-                    </a:ext>
-                  </a:extLst>
-                </p:cNvPr>
-                <p:cNvSpPr txBox="1"/>
-                <p:nvPr/>
-              </p:nvSpPr>
-              <p:spPr>
-                <a:xfrm>
-                  <a:off x="5611600" y="2372081"/>
-                  <a:ext cx="1227003" cy="369332"/>
-                </a:xfrm>
-                <a:prstGeom prst="rect">
-                  <a:avLst/>
-                </a:prstGeom>
-                <a:noFill/>
-              </p:spPr>
-              <p:txBody>
-                <a:bodyPr wrap="none" rtlCol="0">
-                  <a:spAutoFit/>
-                </a:bodyPr>
-                <a:lstStyle/>
-                <a:p>
-                  <a14:m>
-                    <m:oMathPara xmlns:m="http://schemas.openxmlformats.org/officeDocument/2006/math">
-                      <m:oMathParaPr>
-                        <m:jc m:val="centerGroup"/>
-                      </m:oMathParaPr>
-                      <m:oMath xmlns:m="http://schemas.openxmlformats.org/officeDocument/2006/math">
-                        <m:r>
-                          <a:rPr lang="en-US" altLang="ko-KR" b="0" i="1" smtClean="0">
-                            <a:latin typeface="Cambria Math" panose="02040503050406030204" pitchFamily="18" charset="0"/>
-                          </a:rPr>
-                          <m:t>𝑊</m:t>
-                        </m:r>
-                        <m:r>
-                          <a:rPr lang="en-US" altLang="ko-KR" b="0" i="1" smtClean="0">
-                            <a:latin typeface="Cambria Math" panose="02040503050406030204" pitchFamily="18" charset="0"/>
-                          </a:rPr>
-                          <m:t>=</m:t>
-                        </m:r>
-                        <m:r>
-                          <a:rPr lang="en-US" altLang="ko-KR" b="0" i="1" smtClean="0">
-                            <a:latin typeface="Cambria Math" panose="02040503050406030204" pitchFamily="18" charset="0"/>
-                          </a:rPr>
-                          <m:t>𝐹</m:t>
-                        </m:r>
-                        <m:r>
-                          <a:rPr lang="en-US" altLang="ko-KR" b="0" i="1" smtClean="0">
-                            <a:latin typeface="Cambria Math" panose="02040503050406030204" pitchFamily="18" charset="0"/>
-                          </a:rPr>
-                          <m:t>⋅</m:t>
-                        </m:r>
-                        <m:r>
-                          <a:rPr lang="en-US" altLang="ko-KR" b="0" i="1" smtClean="0">
-                            <a:latin typeface="Cambria Math" panose="02040503050406030204" pitchFamily="18" charset="0"/>
-                          </a:rPr>
-                          <m:t>𝑠</m:t>
-                        </m:r>
-                      </m:oMath>
-                    </m:oMathPara>
-                  </a14:m>
-                  <a:endParaRPr lang="ko-KR" altLang="en-US" dirty="0"/>
-                </a:p>
-              </p:txBody>
-            </p:sp>
-          </mc:Choice>
-          <mc:Fallback>
-            <p:sp>
-              <p:nvSpPr>
-                <p:cNvPr id="21" name="TextBox 20">
-                  <a:extLst>
-                    <a:ext uri="{FF2B5EF4-FFF2-40B4-BE49-F238E27FC236}">
-                      <a16:creationId xmlns:a16="http://schemas.microsoft.com/office/drawing/2014/main" id="{0A967918-DD4B-454C-A892-2DC96F138395}"/>
-                    </a:ext>
-                  </a:extLst>
-                </p:cNvPr>
-                <p:cNvSpPr txBox="1">
-                  <a:spLocks noRot="1" noChangeAspect="1" noMove="1" noResize="1" noEditPoints="1" noAdjustHandles="1" noChangeArrowheads="1" noChangeShapeType="1" noTextEdit="1"/>
-                </p:cNvSpPr>
-                <p:nvPr/>
-              </p:nvSpPr>
-              <p:spPr>
-                <a:xfrm>
-                  <a:off x="5611600" y="2372081"/>
-                  <a:ext cx="1227003" cy="369332"/>
-                </a:xfrm>
-                <a:prstGeom prst="rect">
-                  <a:avLst/>
-                </a:prstGeom>
-                <a:blipFill>
-                  <a:blip r:embed="rId5"/>
-                  <a:stretch>
-                    <a:fillRect/>
-                  </a:stretch>
-                </a:blipFill>
-              </p:spPr>
-              <p:txBody>
-                <a:bodyPr/>
-                <a:lstStyle/>
-                <a:p>
-                  <a:r>
-                    <a:rPr lang="ko-KR" altLang="en-US">
-                      <a:noFill/>
-                    </a:rPr>
-                    <a:t> </a:t>
-                  </a:r>
-                </a:p>
-              </p:txBody>
-            </p:sp>
-          </mc:Fallback>
-        </mc:AlternateContent>
+        </p:cxnSp>
+        <p:cxnSp>
+          <p:nvCxnSpPr>
+            <p:cNvPr id="9" name="직선 연결선 8">
+              <a:extLst>
+                <a:ext uri="{FF2B5EF4-FFF2-40B4-BE49-F238E27FC236}">
+                  <a16:creationId xmlns:a16="http://schemas.microsoft.com/office/drawing/2014/main" id="{E0B4C48F-B7CD-466D-ABC6-B14C4A5A0F25}"/>
+                </a:ext>
+              </a:extLst>
+            </p:cNvPr>
+            <p:cNvCxnSpPr>
+              <a:cxnSpLocks/>
+            </p:cNvCxnSpPr>
+            <p:nvPr/>
+          </p:nvCxnSpPr>
+          <p:spPr>
+            <a:xfrm>
+              <a:off x="4992200" y="3863340"/>
+              <a:ext cx="0" cy="68580"/>
+            </a:xfrm>
+            <a:prstGeom prst="line">
+              <a:avLst/>
+            </a:prstGeom>
+            <a:ln w="19050">
+              <a:solidFill>
+                <a:srgbClr val="FF0000"/>
+              </a:solidFill>
+            </a:ln>
+          </p:spPr>
+          <p:style>
+            <a:lnRef idx="1">
+              <a:schemeClr val="accent1"/>
+            </a:lnRef>
+            <a:fillRef idx="0">
+              <a:schemeClr val="accent1"/>
+            </a:fillRef>
+            <a:effectRef idx="0">
+              <a:schemeClr val="accent1"/>
+            </a:effectRef>
+            <a:fontRef idx="minor">
+              <a:schemeClr val="tx1"/>
+            </a:fontRef>
+          </p:style>
+        </p:cxnSp>
+        <p:cxnSp>
+          <p:nvCxnSpPr>
+            <p:cNvPr id="11" name="직선 연결선 10">
+              <a:extLst>
+                <a:ext uri="{FF2B5EF4-FFF2-40B4-BE49-F238E27FC236}">
+                  <a16:creationId xmlns:a16="http://schemas.microsoft.com/office/drawing/2014/main" id="{CFD10BF9-245B-4580-9251-965F1769E5AC}"/>
+                </a:ext>
+              </a:extLst>
+            </p:cNvPr>
+            <p:cNvCxnSpPr>
+              <a:cxnSpLocks/>
+            </p:cNvCxnSpPr>
+            <p:nvPr/>
+          </p:nvCxnSpPr>
+          <p:spPr>
+            <a:xfrm>
+              <a:off x="5840612" y="3863340"/>
+              <a:ext cx="0" cy="68580"/>
+            </a:xfrm>
+            <a:prstGeom prst="line">
+              <a:avLst/>
+            </a:prstGeom>
+            <a:ln w="19050">
+              <a:solidFill>
+                <a:srgbClr val="FF0000"/>
+              </a:solidFill>
+            </a:ln>
+          </p:spPr>
+          <p:style>
+            <a:lnRef idx="1">
+              <a:schemeClr val="accent1"/>
+            </a:lnRef>
+            <a:fillRef idx="0">
+              <a:schemeClr val="accent1"/>
+            </a:fillRef>
+            <a:effectRef idx="0">
+              <a:schemeClr val="accent1"/>
+            </a:effectRef>
+            <a:fontRef idx="minor">
+              <a:schemeClr val="tx1"/>
+            </a:fontRef>
+          </p:style>
+        </p:cxnSp>
       </p:grpSp>
+      <mc:AlternateContent xmlns:mc="http://schemas.openxmlformats.org/markup-compatibility/2006">
+        <mc:Choice xmlns:a14="http://schemas.microsoft.com/office/drawing/2010/main" Requires="a14">
+          <p:sp>
+            <p:nvSpPr>
+              <p:cNvPr id="18" name="TextBox 17">
+                <a:extLst>
+                  <a:ext uri="{FF2B5EF4-FFF2-40B4-BE49-F238E27FC236}">
+                    <a16:creationId xmlns:a16="http://schemas.microsoft.com/office/drawing/2014/main" id="{327FCE86-AD27-496A-9CEE-F0763C80365B}"/>
+                  </a:ext>
+                </a:extLst>
+              </p:cNvPr>
+              <p:cNvSpPr txBox="1"/>
+              <p:nvPr/>
+            </p:nvSpPr>
+            <p:spPr>
+              <a:xfrm>
+                <a:off x="4988434" y="4091310"/>
+                <a:ext cx="378565" cy="369332"/>
+              </a:xfrm>
+              <a:prstGeom prst="rect">
+                <a:avLst/>
+              </a:prstGeom>
+              <a:noFill/>
+            </p:spPr>
+            <p:txBody>
+              <a:bodyPr wrap="none" rtlCol="0">
+                <a:spAutoFit/>
+              </a:bodyPr>
+              <a:lstStyle/>
+              <a:p>
+                <a:pPr/>
+                <a14:m>
+                  <m:oMathPara xmlns:m="http://schemas.openxmlformats.org/officeDocument/2006/math">
+                    <m:oMathParaPr>
+                      <m:jc m:val="centerGroup"/>
+                    </m:oMathParaPr>
+                    <m:oMath xmlns:m="http://schemas.openxmlformats.org/officeDocument/2006/math">
+                      <m:r>
+                        <a:rPr lang="en-US" altLang="ko-KR" b="0" i="1" smtClean="0">
+                          <a:latin typeface="Cambria Math" panose="02040503050406030204" pitchFamily="18" charset="0"/>
+                        </a:rPr>
+                        <m:t>𝑠</m:t>
+                      </m:r>
+                    </m:oMath>
+                  </m:oMathPara>
+                </a14:m>
+                <a:endParaRPr lang="ko-KR" altLang="en-US" dirty="0"/>
+              </a:p>
+            </p:txBody>
+          </p:sp>
+        </mc:Choice>
+        <mc:Fallback>
+          <p:sp>
+            <p:nvSpPr>
+              <p:cNvPr id="18" name="TextBox 17">
+                <a:extLst>
+                  <a:ext uri="{FF2B5EF4-FFF2-40B4-BE49-F238E27FC236}">
+                    <a16:creationId xmlns:a16="http://schemas.microsoft.com/office/drawing/2014/main" id="{327FCE86-AD27-496A-9CEE-F0763C80365B}"/>
+                  </a:ext>
+                </a:extLst>
+              </p:cNvPr>
+              <p:cNvSpPr txBox="1">
+                <a:spLocks noRot="1" noChangeAspect="1" noMove="1" noResize="1" noEditPoints="1" noAdjustHandles="1" noChangeArrowheads="1" noChangeShapeType="1" noTextEdit="1"/>
+              </p:cNvSpPr>
+              <p:nvPr/>
+            </p:nvSpPr>
+            <p:spPr>
+              <a:xfrm>
+                <a:off x="4988434" y="4091310"/>
+                <a:ext cx="378565" cy="369332"/>
+              </a:xfrm>
+              <a:prstGeom prst="rect">
+                <a:avLst/>
+              </a:prstGeom>
+              <a:blipFill>
+                <a:blip r:embed="rId3"/>
+                <a:stretch>
+                  <a:fillRect/>
+                </a:stretch>
+              </a:blipFill>
+            </p:spPr>
+            <p:txBody>
+              <a:bodyPr/>
+              <a:lstStyle/>
+              <a:p>
+                <a:r>
+                  <a:rPr lang="ko-KR" altLang="en-US">
+                    <a:noFill/>
+                  </a:rPr>
+                  <a:t> </a:t>
+                </a:r>
+              </a:p>
+            </p:txBody>
+          </p:sp>
+        </mc:Fallback>
+      </mc:AlternateContent>
+      <p:sp>
+        <p:nvSpPr>
+          <p:cNvPr id="19" name="화살표: 오른쪽 18">
+            <a:extLst>
+              <a:ext uri="{FF2B5EF4-FFF2-40B4-BE49-F238E27FC236}">
+                <a16:creationId xmlns:a16="http://schemas.microsoft.com/office/drawing/2014/main" id="{D09BA496-CA2F-4846-9545-865E002A3916}"/>
+              </a:ext>
+            </a:extLst>
+          </p:cNvPr>
+          <p:cNvSpPr/>
+          <p:nvPr/>
+        </p:nvSpPr>
+        <p:spPr>
+          <a:xfrm>
+            <a:off x="6790351" y="3186054"/>
+            <a:ext cx="978408" cy="484632"/>
+          </a:xfrm>
+          <a:prstGeom prst="rightArrow">
+            <a:avLst/>
+          </a:prstGeom>
+          <a:gradFill flip="none" rotWithShape="1">
+            <a:gsLst>
+              <a:gs pos="0">
+                <a:schemeClr val="accent1">
+                  <a:tint val="66000"/>
+                  <a:satMod val="160000"/>
+                </a:schemeClr>
+              </a:gs>
+              <a:gs pos="30000">
+                <a:schemeClr val="accent1">
+                  <a:tint val="44500"/>
+                  <a:satMod val="160000"/>
+                </a:schemeClr>
+              </a:gs>
+              <a:gs pos="85000">
+                <a:schemeClr val="bg1"/>
+              </a:gs>
+            </a:gsLst>
+            <a:lin ang="10800000" scaled="1"/>
+            <a:tileRect/>
+          </a:gradFill>
+          <a:ln>
+            <a:noFill/>
+          </a:ln>
+        </p:spPr>
+        <p:style>
+          <a:lnRef idx="2">
+            <a:schemeClr val="accent1">
+              <a:shade val="50000"/>
+            </a:schemeClr>
+          </a:lnRef>
+          <a:fillRef idx="1">
+            <a:schemeClr val="accent1"/>
+          </a:fillRef>
+          <a:effectRef idx="0">
+            <a:schemeClr val="accent1"/>
+          </a:effectRef>
+          <a:fontRef idx="minor">
+            <a:schemeClr val="lt1"/>
+          </a:fontRef>
+        </p:style>
+        <p:txBody>
+          <a:bodyPr rtlCol="0" anchor="ctr"/>
+          <a:lstStyle/>
+          <a:p>
+            <a:pPr algn="ctr"/>
+            <a:endParaRPr lang="ko-KR" altLang="en-US"/>
+          </a:p>
+        </p:txBody>
+      </p:sp>
+      <mc:AlternateContent xmlns:mc="http://schemas.openxmlformats.org/markup-compatibility/2006">
+        <mc:Choice xmlns:a14="http://schemas.microsoft.com/office/drawing/2010/main" Requires="a14">
+          <p:sp>
+            <p:nvSpPr>
+              <p:cNvPr id="20" name="TextBox 19">
+                <a:extLst>
+                  <a:ext uri="{FF2B5EF4-FFF2-40B4-BE49-F238E27FC236}">
+                    <a16:creationId xmlns:a16="http://schemas.microsoft.com/office/drawing/2014/main" id="{FA503A6F-2B04-48EE-B664-12D6C892312B}"/>
+                  </a:ext>
+                </a:extLst>
+              </p:cNvPr>
+              <p:cNvSpPr txBox="1"/>
+              <p:nvPr/>
+            </p:nvSpPr>
+            <p:spPr>
+              <a:xfrm>
+                <a:off x="7071293" y="2934594"/>
+                <a:ext cx="416524" cy="369332"/>
+              </a:xfrm>
+              <a:prstGeom prst="rect">
+                <a:avLst/>
+              </a:prstGeom>
+              <a:noFill/>
+            </p:spPr>
+            <p:txBody>
+              <a:bodyPr wrap="none" rtlCol="0">
+                <a:spAutoFit/>
+              </a:bodyPr>
+              <a:lstStyle/>
+              <a:p>
+                <a:pPr/>
+                <a14:m>
+                  <m:oMathPara xmlns:m="http://schemas.openxmlformats.org/officeDocument/2006/math">
+                    <m:oMathParaPr>
+                      <m:jc m:val="centerGroup"/>
+                    </m:oMathParaPr>
+                    <m:oMath xmlns:m="http://schemas.openxmlformats.org/officeDocument/2006/math">
+                      <m:r>
+                        <a:rPr lang="en-US" altLang="ko-KR" b="0" i="1" smtClean="0">
+                          <a:latin typeface="Cambria Math" panose="02040503050406030204" pitchFamily="18" charset="0"/>
+                        </a:rPr>
+                        <m:t>𝐹</m:t>
+                      </m:r>
+                    </m:oMath>
+                  </m:oMathPara>
+                </a14:m>
+                <a:endParaRPr lang="ko-KR" altLang="en-US" dirty="0"/>
+              </a:p>
+            </p:txBody>
+          </p:sp>
+        </mc:Choice>
+        <mc:Fallback>
+          <p:sp>
+            <p:nvSpPr>
+              <p:cNvPr id="20" name="TextBox 19">
+                <a:extLst>
+                  <a:ext uri="{FF2B5EF4-FFF2-40B4-BE49-F238E27FC236}">
+                    <a16:creationId xmlns:a16="http://schemas.microsoft.com/office/drawing/2014/main" id="{FA503A6F-2B04-48EE-B664-12D6C892312B}"/>
+                  </a:ext>
+                </a:extLst>
+              </p:cNvPr>
+              <p:cNvSpPr txBox="1">
+                <a:spLocks noRot="1" noChangeAspect="1" noMove="1" noResize="1" noEditPoints="1" noAdjustHandles="1" noChangeArrowheads="1" noChangeShapeType="1" noTextEdit="1"/>
+              </p:cNvSpPr>
+              <p:nvPr/>
+            </p:nvSpPr>
+            <p:spPr>
+              <a:xfrm>
+                <a:off x="7071293" y="2934594"/>
+                <a:ext cx="416524" cy="369332"/>
+              </a:xfrm>
+              <a:prstGeom prst="rect">
+                <a:avLst/>
+              </a:prstGeom>
+              <a:blipFill>
+                <a:blip r:embed="rId4"/>
+                <a:stretch>
+                  <a:fillRect/>
+                </a:stretch>
+              </a:blipFill>
+            </p:spPr>
+            <p:txBody>
+              <a:bodyPr/>
+              <a:lstStyle/>
+              <a:p>
+                <a:r>
+                  <a:rPr lang="ko-KR" altLang="en-US">
+                    <a:noFill/>
+                  </a:rPr>
+                  <a:t> </a:t>
+                </a:r>
+              </a:p>
+            </p:txBody>
+          </p:sp>
+        </mc:Fallback>
+      </mc:AlternateContent>
+      <mc:AlternateContent xmlns:mc="http://schemas.openxmlformats.org/markup-compatibility/2006">
+        <mc:Choice xmlns:a14="http://schemas.microsoft.com/office/drawing/2010/main" Requires="a14">
+          <p:sp>
+            <p:nvSpPr>
+              <p:cNvPr id="21" name="TextBox 20">
+                <a:extLst>
+                  <a:ext uri="{FF2B5EF4-FFF2-40B4-BE49-F238E27FC236}">
+                    <a16:creationId xmlns:a16="http://schemas.microsoft.com/office/drawing/2014/main" id="{0A967918-DD4B-454C-A892-2DC96F138395}"/>
+                  </a:ext>
+                </a:extLst>
+              </p:cNvPr>
+              <p:cNvSpPr txBox="1"/>
+              <p:nvPr/>
+            </p:nvSpPr>
+            <p:spPr>
+              <a:xfrm>
+                <a:off x="5366999" y="2464415"/>
+                <a:ext cx="1227003" cy="369332"/>
+              </a:xfrm>
+              <a:prstGeom prst="rect">
+                <a:avLst/>
+              </a:prstGeom>
+              <a:noFill/>
+            </p:spPr>
+            <p:txBody>
+              <a:bodyPr wrap="none" rtlCol="0">
+                <a:spAutoFit/>
+              </a:bodyPr>
+              <a:lstStyle/>
+              <a:p>
+                <a:pPr/>
+                <a14:m>
+                  <m:oMathPara xmlns:m="http://schemas.openxmlformats.org/officeDocument/2006/math">
+                    <m:oMathParaPr>
+                      <m:jc m:val="centerGroup"/>
+                    </m:oMathParaPr>
+                    <m:oMath xmlns:m="http://schemas.openxmlformats.org/officeDocument/2006/math">
+                      <m:r>
+                        <a:rPr lang="en-US" altLang="ko-KR" b="0" i="1" smtClean="0">
+                          <a:latin typeface="Cambria Math" panose="02040503050406030204" pitchFamily="18" charset="0"/>
+                        </a:rPr>
+                        <m:t>𝑊</m:t>
+                      </m:r>
+                      <m:r>
+                        <a:rPr lang="en-US" altLang="ko-KR" b="0" i="1" smtClean="0">
+                          <a:latin typeface="Cambria Math" panose="02040503050406030204" pitchFamily="18" charset="0"/>
+                        </a:rPr>
+                        <m:t>=</m:t>
+                      </m:r>
+                      <m:r>
+                        <a:rPr lang="en-US" altLang="ko-KR" b="0" i="1" smtClean="0">
+                          <a:latin typeface="Cambria Math" panose="02040503050406030204" pitchFamily="18" charset="0"/>
+                        </a:rPr>
+                        <m:t>𝐹</m:t>
+                      </m:r>
+                      <m:r>
+                        <a:rPr lang="en-US" altLang="ko-KR" b="0" i="1" smtClean="0">
+                          <a:latin typeface="Cambria Math" panose="02040503050406030204" pitchFamily="18" charset="0"/>
+                        </a:rPr>
+                        <m:t>⋅</m:t>
+                      </m:r>
+                      <m:r>
+                        <a:rPr lang="en-US" altLang="ko-KR" b="0" i="1" smtClean="0">
+                          <a:latin typeface="Cambria Math" panose="02040503050406030204" pitchFamily="18" charset="0"/>
+                        </a:rPr>
+                        <m:t>𝑠</m:t>
+                      </m:r>
+                    </m:oMath>
+                  </m:oMathPara>
+                </a14:m>
+                <a:endParaRPr lang="ko-KR" altLang="en-US" dirty="0"/>
+              </a:p>
+            </p:txBody>
+          </p:sp>
+        </mc:Choice>
+        <mc:Fallback>
+          <p:sp>
+            <p:nvSpPr>
+              <p:cNvPr id="21" name="TextBox 20">
+                <a:extLst>
+                  <a:ext uri="{FF2B5EF4-FFF2-40B4-BE49-F238E27FC236}">
+                    <a16:creationId xmlns:a16="http://schemas.microsoft.com/office/drawing/2014/main" id="{0A967918-DD4B-454C-A892-2DC96F138395}"/>
+                  </a:ext>
+                </a:extLst>
+              </p:cNvPr>
+              <p:cNvSpPr txBox="1">
+                <a:spLocks noRot="1" noChangeAspect="1" noMove="1" noResize="1" noEditPoints="1" noAdjustHandles="1" noChangeArrowheads="1" noChangeShapeType="1" noTextEdit="1"/>
+              </p:cNvSpPr>
+              <p:nvPr/>
+            </p:nvSpPr>
+            <p:spPr>
+              <a:xfrm>
+                <a:off x="5366999" y="2464415"/>
+                <a:ext cx="1227003" cy="369332"/>
+              </a:xfrm>
+              <a:prstGeom prst="rect">
+                <a:avLst/>
+              </a:prstGeom>
+              <a:blipFill>
+                <a:blip r:embed="rId5"/>
+                <a:stretch>
+                  <a:fillRect/>
+                </a:stretch>
+              </a:blipFill>
+            </p:spPr>
+            <p:txBody>
+              <a:bodyPr/>
+              <a:lstStyle/>
+              <a:p>
+                <a:r>
+                  <a:rPr lang="ko-KR" altLang="en-US">
+                    <a:noFill/>
+                  </a:rPr>
+                  <a:t> </a:t>
+                </a:r>
+              </a:p>
+            </p:txBody>
+          </p:sp>
+        </mc:Fallback>
+      </mc:AlternateContent>
     </p:spTree>
     <p:extLst>
       <p:ext uri="{BB962C8B-B14F-4D97-AF65-F5344CB8AC3E}">
         <p14:creationId xmlns:p14="http://schemas.microsoft.com/office/powerpoint/2010/main" val="859738405"/>
+      </p:ext>
+    </p:extLst>
+  </p:cSld>
+  <p:clrMapOvr>
+    <a:masterClrMapping/>
+  </p:clrMapOvr>
+</p:sld>
+</file>
+
+<file path=ppt/slides/slide2.xml><?xml version="1.0" encoding="utf-8"?>
+<p:sld xmlns:a="http://schemas.openxmlformats.org/drawingml/2006/main" xmlns:r="http://schemas.openxmlformats.org/officeDocument/2006/relationships" xmlns:p="http://schemas.openxmlformats.org/presentationml/2006/main">
+  <p:cSld>
+    <p:spTree>
+      <p:nvGrpSpPr>
+        <p:cNvPr id="1" name=""/>
+        <p:cNvGrpSpPr/>
+        <p:nvPr/>
+      </p:nvGrpSpPr>
+      <p:grpSpPr>
+        <a:xfrm>
+          <a:off x="0" y="0"/>
+          <a:ext cx="0" cy="0"/>
+          <a:chOff x="0" y="0"/>
+          <a:chExt cx="0" cy="0"/>
+        </a:xfrm>
+      </p:grpSpPr>
+      <p:pic>
+        <p:nvPicPr>
+          <p:cNvPr id="5" name="그림 4">
+            <a:extLst>
+              <a:ext uri="{FF2B5EF4-FFF2-40B4-BE49-F238E27FC236}">
+                <a16:creationId xmlns:a16="http://schemas.microsoft.com/office/drawing/2014/main" id="{EB3154AE-322D-4E54-8E31-E89EB96995BB}"/>
+              </a:ext>
+            </a:extLst>
+          </p:cNvPr>
+          <p:cNvPicPr>
+            <a:picLocks noChangeAspect="1"/>
+          </p:cNvPicPr>
+          <p:nvPr/>
+        </p:nvPicPr>
+        <p:blipFill>
+          <a:blip r:embed="rId2">
+            <a:extLst>
+              <a:ext uri="{28A0092B-C50C-407E-A947-70E740481C1C}">
+                <a14:useLocalDpi xmlns:a14="http://schemas.microsoft.com/office/drawing/2010/main" val="0"/>
+              </a:ext>
+            </a:extLst>
+          </a:blip>
+          <a:stretch>
+            <a:fillRect/>
+          </a:stretch>
+        </p:blipFill>
+        <p:spPr>
+          <a:xfrm>
+            <a:off x="4423242" y="2859972"/>
+            <a:ext cx="2856313" cy="1322723"/>
+          </a:xfrm>
+          <a:prstGeom prst="rect">
+            <a:avLst/>
+          </a:prstGeom>
+        </p:spPr>
+      </p:pic>
+      <p:grpSp>
+        <p:nvGrpSpPr>
+          <p:cNvPr id="17" name="그룹 16">
+            <a:extLst>
+              <a:ext uri="{FF2B5EF4-FFF2-40B4-BE49-F238E27FC236}">
+                <a16:creationId xmlns:a16="http://schemas.microsoft.com/office/drawing/2014/main" id="{47D8152B-3C4A-4B5A-BF9D-5B3DEC2B7C65}"/>
+              </a:ext>
+            </a:extLst>
+          </p:cNvPr>
+          <p:cNvGrpSpPr/>
+          <p:nvPr/>
+        </p:nvGrpSpPr>
+        <p:grpSpPr>
+          <a:xfrm>
+            <a:off x="4747599" y="4106550"/>
+            <a:ext cx="848412" cy="68580"/>
+            <a:chOff x="4992200" y="3863340"/>
+            <a:chExt cx="848412" cy="68580"/>
+          </a:xfrm>
+        </p:grpSpPr>
+        <p:cxnSp>
+          <p:nvCxnSpPr>
+            <p:cNvPr id="7" name="직선 연결선 6">
+              <a:extLst>
+                <a:ext uri="{FF2B5EF4-FFF2-40B4-BE49-F238E27FC236}">
+                  <a16:creationId xmlns:a16="http://schemas.microsoft.com/office/drawing/2014/main" id="{2A2F3429-150D-4099-9BC2-A0BE8D83C869}"/>
+                </a:ext>
+              </a:extLst>
+            </p:cNvPr>
+            <p:cNvCxnSpPr/>
+            <p:nvPr/>
+          </p:nvCxnSpPr>
+          <p:spPr>
+            <a:xfrm>
+              <a:off x="4992200" y="3897630"/>
+              <a:ext cx="848412" cy="0"/>
+            </a:xfrm>
+            <a:prstGeom prst="line">
+              <a:avLst/>
+            </a:prstGeom>
+            <a:ln w="19050">
+              <a:solidFill>
+                <a:srgbClr val="FF0000"/>
+              </a:solidFill>
+            </a:ln>
+          </p:spPr>
+          <p:style>
+            <a:lnRef idx="1">
+              <a:schemeClr val="accent1"/>
+            </a:lnRef>
+            <a:fillRef idx="0">
+              <a:schemeClr val="accent1"/>
+            </a:fillRef>
+            <a:effectRef idx="0">
+              <a:schemeClr val="accent1"/>
+            </a:effectRef>
+            <a:fontRef idx="minor">
+              <a:schemeClr val="tx1"/>
+            </a:fontRef>
+          </p:style>
+        </p:cxnSp>
+        <p:cxnSp>
+          <p:nvCxnSpPr>
+            <p:cNvPr id="9" name="직선 연결선 8">
+              <a:extLst>
+                <a:ext uri="{FF2B5EF4-FFF2-40B4-BE49-F238E27FC236}">
+                  <a16:creationId xmlns:a16="http://schemas.microsoft.com/office/drawing/2014/main" id="{E0B4C48F-B7CD-466D-ABC6-B14C4A5A0F25}"/>
+                </a:ext>
+              </a:extLst>
+            </p:cNvPr>
+            <p:cNvCxnSpPr>
+              <a:cxnSpLocks/>
+            </p:cNvCxnSpPr>
+            <p:nvPr/>
+          </p:nvCxnSpPr>
+          <p:spPr>
+            <a:xfrm>
+              <a:off x="4992200" y="3863340"/>
+              <a:ext cx="0" cy="68580"/>
+            </a:xfrm>
+            <a:prstGeom prst="line">
+              <a:avLst/>
+            </a:prstGeom>
+            <a:ln w="19050">
+              <a:solidFill>
+                <a:srgbClr val="FF0000"/>
+              </a:solidFill>
+            </a:ln>
+          </p:spPr>
+          <p:style>
+            <a:lnRef idx="1">
+              <a:schemeClr val="accent1"/>
+            </a:lnRef>
+            <a:fillRef idx="0">
+              <a:schemeClr val="accent1"/>
+            </a:fillRef>
+            <a:effectRef idx="0">
+              <a:schemeClr val="accent1"/>
+            </a:effectRef>
+            <a:fontRef idx="minor">
+              <a:schemeClr val="tx1"/>
+            </a:fontRef>
+          </p:style>
+        </p:cxnSp>
+        <p:cxnSp>
+          <p:nvCxnSpPr>
+            <p:cNvPr id="11" name="직선 연결선 10">
+              <a:extLst>
+                <a:ext uri="{FF2B5EF4-FFF2-40B4-BE49-F238E27FC236}">
+                  <a16:creationId xmlns:a16="http://schemas.microsoft.com/office/drawing/2014/main" id="{CFD10BF9-245B-4580-9251-965F1769E5AC}"/>
+                </a:ext>
+              </a:extLst>
+            </p:cNvPr>
+            <p:cNvCxnSpPr>
+              <a:cxnSpLocks/>
+            </p:cNvCxnSpPr>
+            <p:nvPr/>
+          </p:nvCxnSpPr>
+          <p:spPr>
+            <a:xfrm>
+              <a:off x="5840612" y="3863340"/>
+              <a:ext cx="0" cy="68580"/>
+            </a:xfrm>
+            <a:prstGeom prst="line">
+              <a:avLst/>
+            </a:prstGeom>
+            <a:ln w="19050">
+              <a:solidFill>
+                <a:srgbClr val="FF0000"/>
+              </a:solidFill>
+            </a:ln>
+          </p:spPr>
+          <p:style>
+            <a:lnRef idx="1">
+              <a:schemeClr val="accent1"/>
+            </a:lnRef>
+            <a:fillRef idx="0">
+              <a:schemeClr val="accent1"/>
+            </a:fillRef>
+            <a:effectRef idx="0">
+              <a:schemeClr val="accent1"/>
+            </a:effectRef>
+            <a:fontRef idx="minor">
+              <a:schemeClr val="tx1"/>
+            </a:fontRef>
+          </p:style>
+        </p:cxnSp>
+      </p:grpSp>
+      <mc:AlternateContent xmlns:mc="http://schemas.openxmlformats.org/markup-compatibility/2006">
+        <mc:Choice xmlns:a14="http://schemas.microsoft.com/office/drawing/2010/main" Requires="a14">
+          <p:sp>
+            <p:nvSpPr>
+              <p:cNvPr id="18" name="TextBox 17">
+                <a:extLst>
+                  <a:ext uri="{FF2B5EF4-FFF2-40B4-BE49-F238E27FC236}">
+                    <a16:creationId xmlns:a16="http://schemas.microsoft.com/office/drawing/2014/main" id="{327FCE86-AD27-496A-9CEE-F0763C80365B}"/>
+                  </a:ext>
+                </a:extLst>
+              </p:cNvPr>
+              <p:cNvSpPr txBox="1"/>
+              <p:nvPr/>
+            </p:nvSpPr>
+            <p:spPr>
+              <a:xfrm>
+                <a:off x="4906026" y="4111630"/>
+                <a:ext cx="526041" cy="369332"/>
+              </a:xfrm>
+              <a:prstGeom prst="rect">
+                <a:avLst/>
+              </a:prstGeom>
+              <a:noFill/>
+            </p:spPr>
+            <p:txBody>
+              <a:bodyPr wrap="none" rtlCol="0">
+                <a:spAutoFit/>
+              </a:bodyPr>
+              <a:lstStyle/>
+              <a:p>
+                <a:pPr/>
+                <a14:m>
+                  <m:oMathPara xmlns:m="http://schemas.openxmlformats.org/officeDocument/2006/math">
+                    <m:oMathParaPr>
+                      <m:jc m:val="centerGroup"/>
+                    </m:oMathParaPr>
+                    <m:oMath xmlns:m="http://schemas.openxmlformats.org/officeDocument/2006/math">
+                      <m:d>
+                        <m:dPr>
+                          <m:begChr m:val="|"/>
+                          <m:endChr m:val="|"/>
+                          <m:ctrlPr>
+                            <a:rPr lang="en-US" altLang="ko-KR" b="0" i="1" smtClean="0">
+                              <a:latin typeface="Cambria Math" panose="02040503050406030204" pitchFamily="18" charset="0"/>
+                            </a:rPr>
+                          </m:ctrlPr>
+                        </m:dPr>
+                        <m:e>
+                          <m:acc>
+                            <m:accPr>
+                              <m:chr m:val="⃗"/>
+                              <m:ctrlPr>
+                                <a:rPr lang="en-US" altLang="ko-KR" b="0" i="1" smtClean="0">
+                                  <a:latin typeface="Cambria Math" panose="02040503050406030204" pitchFamily="18" charset="0"/>
+                                </a:rPr>
+                              </m:ctrlPr>
+                            </m:accPr>
+                            <m:e>
+                              <m:r>
+                                <a:rPr lang="en-US" altLang="ko-KR" b="0" i="1" smtClean="0">
+                                  <a:latin typeface="Cambria Math" panose="02040503050406030204" pitchFamily="18" charset="0"/>
+                                </a:rPr>
+                                <m:t>𝑠</m:t>
+                              </m:r>
+                            </m:e>
+                          </m:acc>
+                        </m:e>
+                      </m:d>
+                    </m:oMath>
+                  </m:oMathPara>
+                </a14:m>
+                <a:endParaRPr lang="ko-KR" altLang="en-US" dirty="0"/>
+              </a:p>
+            </p:txBody>
+          </p:sp>
+        </mc:Choice>
+        <mc:Fallback>
+          <p:sp>
+            <p:nvSpPr>
+              <p:cNvPr id="18" name="TextBox 17">
+                <a:extLst>
+                  <a:ext uri="{FF2B5EF4-FFF2-40B4-BE49-F238E27FC236}">
+                    <a16:creationId xmlns:a16="http://schemas.microsoft.com/office/drawing/2014/main" id="{327FCE86-AD27-496A-9CEE-F0763C80365B}"/>
+                  </a:ext>
+                </a:extLst>
+              </p:cNvPr>
+              <p:cNvSpPr txBox="1">
+                <a:spLocks noRot="1" noChangeAspect="1" noMove="1" noResize="1" noEditPoints="1" noAdjustHandles="1" noChangeArrowheads="1" noChangeShapeType="1" noTextEdit="1"/>
+              </p:cNvSpPr>
+              <p:nvPr/>
+            </p:nvSpPr>
+            <p:spPr>
+              <a:xfrm>
+                <a:off x="4906026" y="4111630"/>
+                <a:ext cx="526041" cy="369332"/>
+              </a:xfrm>
+              <a:prstGeom prst="rect">
+                <a:avLst/>
+              </a:prstGeom>
+              <a:blipFill>
+                <a:blip r:embed="rId3"/>
+                <a:stretch>
+                  <a:fillRect t="-19672" r="-33721"/>
+                </a:stretch>
+              </a:blipFill>
+            </p:spPr>
+            <p:txBody>
+              <a:bodyPr/>
+              <a:lstStyle/>
+              <a:p>
+                <a:r>
+                  <a:rPr lang="ko-KR" altLang="en-US">
+                    <a:noFill/>
+                  </a:rPr>
+                  <a:t> </a:t>
+                </a:r>
+              </a:p>
+            </p:txBody>
+          </p:sp>
+        </mc:Fallback>
+      </mc:AlternateContent>
+      <mc:AlternateContent xmlns:mc="http://schemas.openxmlformats.org/markup-compatibility/2006">
+        <mc:Choice xmlns:a14="http://schemas.microsoft.com/office/drawing/2010/main" Requires="a14">
+          <p:sp>
+            <p:nvSpPr>
+              <p:cNvPr id="20" name="TextBox 19">
+                <a:extLst>
+                  <a:ext uri="{FF2B5EF4-FFF2-40B4-BE49-F238E27FC236}">
+                    <a16:creationId xmlns:a16="http://schemas.microsoft.com/office/drawing/2014/main" id="{FA503A6F-2B04-48EE-B664-12D6C892312B}"/>
+                  </a:ext>
+                </a:extLst>
+              </p:cNvPr>
+              <p:cNvSpPr txBox="1"/>
+              <p:nvPr/>
+            </p:nvSpPr>
+            <p:spPr>
+              <a:xfrm>
+                <a:off x="7378693" y="2649713"/>
+                <a:ext cx="416524" cy="402931"/>
+              </a:xfrm>
+              <a:prstGeom prst="rect">
+                <a:avLst/>
+              </a:prstGeom>
+              <a:noFill/>
+            </p:spPr>
+            <p:txBody>
+              <a:bodyPr wrap="none" rtlCol="0">
+                <a:spAutoFit/>
+              </a:bodyPr>
+              <a:lstStyle/>
+              <a:p>
+                <a:pPr/>
+                <a14:m>
+                  <m:oMathPara xmlns:m="http://schemas.openxmlformats.org/officeDocument/2006/math">
+                    <m:oMathParaPr>
+                      <m:jc m:val="centerGroup"/>
+                    </m:oMathParaPr>
+                    <m:oMath xmlns:m="http://schemas.openxmlformats.org/officeDocument/2006/math">
+                      <m:acc>
+                        <m:accPr>
+                          <m:chr m:val="⃗"/>
+                          <m:ctrlPr>
+                            <a:rPr lang="en-US" altLang="ko-KR" b="0" i="1" smtClean="0">
+                              <a:latin typeface="Cambria Math" panose="02040503050406030204" pitchFamily="18" charset="0"/>
+                            </a:rPr>
+                          </m:ctrlPr>
+                        </m:accPr>
+                        <m:e>
+                          <m:r>
+                            <a:rPr lang="en-US" altLang="ko-KR" b="0" i="1" smtClean="0">
+                              <a:latin typeface="Cambria Math" panose="02040503050406030204" pitchFamily="18" charset="0"/>
+                            </a:rPr>
+                            <m:t>𝐹</m:t>
+                          </m:r>
+                        </m:e>
+                      </m:acc>
+                    </m:oMath>
+                  </m:oMathPara>
+                </a14:m>
+                <a:endParaRPr lang="ko-KR" altLang="en-US" dirty="0"/>
+              </a:p>
+            </p:txBody>
+          </p:sp>
+        </mc:Choice>
+        <mc:Fallback>
+          <p:sp>
+            <p:nvSpPr>
+              <p:cNvPr id="20" name="TextBox 19">
+                <a:extLst>
+                  <a:ext uri="{FF2B5EF4-FFF2-40B4-BE49-F238E27FC236}">
+                    <a16:creationId xmlns:a16="http://schemas.microsoft.com/office/drawing/2014/main" id="{FA503A6F-2B04-48EE-B664-12D6C892312B}"/>
+                  </a:ext>
+                </a:extLst>
+              </p:cNvPr>
+              <p:cNvSpPr txBox="1">
+                <a:spLocks noRot="1" noChangeAspect="1" noMove="1" noResize="1" noEditPoints="1" noAdjustHandles="1" noChangeArrowheads="1" noChangeShapeType="1" noTextEdit="1"/>
+              </p:cNvSpPr>
+              <p:nvPr/>
+            </p:nvSpPr>
+            <p:spPr>
+              <a:xfrm>
+                <a:off x="7378693" y="2649713"/>
+                <a:ext cx="416524" cy="402931"/>
+              </a:xfrm>
+              <a:prstGeom prst="rect">
+                <a:avLst/>
+              </a:prstGeom>
+              <a:blipFill>
+                <a:blip r:embed="rId4"/>
+                <a:stretch>
+                  <a:fillRect t="-21212" r="-30435"/>
+                </a:stretch>
+              </a:blipFill>
+            </p:spPr>
+            <p:txBody>
+              <a:bodyPr/>
+              <a:lstStyle/>
+              <a:p>
+                <a:r>
+                  <a:rPr lang="ko-KR" altLang="en-US">
+                    <a:noFill/>
+                  </a:rPr>
+                  <a:t> </a:t>
+                </a:r>
+              </a:p>
+            </p:txBody>
+          </p:sp>
+        </mc:Fallback>
+      </mc:AlternateContent>
+      <mc:AlternateContent xmlns:mc="http://schemas.openxmlformats.org/markup-compatibility/2006">
+        <mc:Choice xmlns:a14="http://schemas.microsoft.com/office/drawing/2010/main" Requires="a14">
+          <p:sp>
+            <p:nvSpPr>
+              <p:cNvPr id="21" name="TextBox 20">
+                <a:extLst>
+                  <a:ext uri="{FF2B5EF4-FFF2-40B4-BE49-F238E27FC236}">
+                    <a16:creationId xmlns:a16="http://schemas.microsoft.com/office/drawing/2014/main" id="{0A967918-DD4B-454C-A892-2DC96F138395}"/>
+                  </a:ext>
+                </a:extLst>
+              </p:cNvPr>
+              <p:cNvSpPr txBox="1"/>
+              <p:nvPr/>
+            </p:nvSpPr>
+            <p:spPr>
+              <a:xfrm>
+                <a:off x="4518639" y="2383135"/>
+                <a:ext cx="2555956" cy="425181"/>
+              </a:xfrm>
+              <a:prstGeom prst="rect">
+                <a:avLst/>
+              </a:prstGeom>
+              <a:noFill/>
+            </p:spPr>
+            <p:txBody>
+              <a:bodyPr wrap="none" rtlCol="0">
+                <a:spAutoFit/>
+              </a:bodyPr>
+              <a:lstStyle/>
+              <a:p>
+                <a:pPr/>
+                <a14:m>
+                  <m:oMathPara xmlns:m="http://schemas.openxmlformats.org/officeDocument/2006/math">
+                    <m:oMathParaPr>
+                      <m:jc m:val="centerGroup"/>
+                    </m:oMathParaPr>
+                    <m:oMath xmlns:m="http://schemas.openxmlformats.org/officeDocument/2006/math">
+                      <m:r>
+                        <a:rPr lang="en-US" altLang="ko-KR" b="0" i="1" smtClean="0">
+                          <a:latin typeface="Cambria Math" panose="02040503050406030204" pitchFamily="18" charset="0"/>
+                        </a:rPr>
+                        <m:t>𝑊</m:t>
+                      </m:r>
+                      <m:r>
+                        <a:rPr lang="en-US" altLang="ko-KR" b="0" i="1" smtClean="0">
+                          <a:latin typeface="Cambria Math" panose="02040503050406030204" pitchFamily="18" charset="0"/>
+                        </a:rPr>
+                        <m:t>=</m:t>
+                      </m:r>
+                      <m:r>
+                        <a:rPr lang="en-US" altLang="ko-KR" b="0" i="1" smtClean="0">
+                          <a:latin typeface="Cambria Math" panose="02040503050406030204" pitchFamily="18" charset="0"/>
+                        </a:rPr>
+                        <m:t>𝐹</m:t>
+                      </m:r>
+                      <m:r>
+                        <a:rPr lang="en-US" altLang="ko-KR" b="0" i="1" smtClean="0">
+                          <a:latin typeface="Cambria Math" panose="02040503050406030204" pitchFamily="18" charset="0"/>
+                        </a:rPr>
+                        <m:t>⋅</m:t>
+                      </m:r>
+                      <m:r>
+                        <a:rPr lang="en-US" altLang="ko-KR" b="0" i="1" smtClean="0">
+                          <a:latin typeface="Cambria Math" panose="02040503050406030204" pitchFamily="18" charset="0"/>
+                        </a:rPr>
+                        <m:t>𝑠</m:t>
+                      </m:r>
+                      <m:r>
+                        <a:rPr lang="en-US" altLang="ko-KR" b="0" i="1" smtClean="0">
+                          <a:latin typeface="Cambria Math" panose="02040503050406030204" pitchFamily="18" charset="0"/>
+                        </a:rPr>
+                        <m:t>=</m:t>
+                      </m:r>
+                      <m:d>
+                        <m:dPr>
+                          <m:begChr m:val="|"/>
+                          <m:endChr m:val="|"/>
+                          <m:ctrlPr>
+                            <a:rPr lang="en-US" altLang="ko-KR" b="0" i="1" smtClean="0">
+                              <a:latin typeface="Cambria Math" panose="02040503050406030204" pitchFamily="18" charset="0"/>
+                            </a:rPr>
+                          </m:ctrlPr>
+                        </m:dPr>
+                        <m:e>
+                          <m:acc>
+                            <m:accPr>
+                              <m:chr m:val="⃗"/>
+                              <m:ctrlPr>
+                                <a:rPr lang="en-US" altLang="ko-KR" b="0" i="1" smtClean="0">
+                                  <a:latin typeface="Cambria Math" panose="02040503050406030204" pitchFamily="18" charset="0"/>
+                                </a:rPr>
+                              </m:ctrlPr>
+                            </m:accPr>
+                            <m:e>
+                              <m:r>
+                                <a:rPr lang="en-US" altLang="ko-KR" b="0" i="1" smtClean="0">
+                                  <a:latin typeface="Cambria Math" panose="02040503050406030204" pitchFamily="18" charset="0"/>
+                                </a:rPr>
+                                <m:t>𝐹</m:t>
+                              </m:r>
+                            </m:e>
+                          </m:acc>
+                        </m:e>
+                      </m:d>
+                      <m:d>
+                        <m:dPr>
+                          <m:begChr m:val="|"/>
+                          <m:endChr m:val="|"/>
+                          <m:ctrlPr>
+                            <a:rPr lang="en-US" altLang="ko-KR" b="0" i="1" smtClean="0">
+                              <a:latin typeface="Cambria Math" panose="02040503050406030204" pitchFamily="18" charset="0"/>
+                            </a:rPr>
+                          </m:ctrlPr>
+                        </m:dPr>
+                        <m:e>
+                          <m:acc>
+                            <m:accPr>
+                              <m:chr m:val="⃗"/>
+                              <m:ctrlPr>
+                                <a:rPr lang="en-US" altLang="ko-KR" b="0" i="1" smtClean="0">
+                                  <a:latin typeface="Cambria Math" panose="02040503050406030204" pitchFamily="18" charset="0"/>
+                                </a:rPr>
+                              </m:ctrlPr>
+                            </m:accPr>
+                            <m:e>
+                              <m:r>
+                                <a:rPr lang="en-US" altLang="ko-KR" b="0" i="1" smtClean="0">
+                                  <a:latin typeface="Cambria Math" panose="02040503050406030204" pitchFamily="18" charset="0"/>
+                                </a:rPr>
+                                <m:t>𝑠</m:t>
+                              </m:r>
+                            </m:e>
+                          </m:acc>
+                        </m:e>
+                      </m:d>
+                      <m:r>
+                        <a:rPr lang="en-US" altLang="ko-KR" b="0" i="1" smtClean="0">
+                          <a:latin typeface="Cambria Math" panose="02040503050406030204" pitchFamily="18" charset="0"/>
+                        </a:rPr>
+                        <m:t>𝑐𝑜𝑠</m:t>
+                      </m:r>
+                      <m:r>
+                        <a:rPr lang="en-US" altLang="ko-KR" b="0" i="1" smtClean="0">
+                          <a:latin typeface="Cambria Math" panose="02040503050406030204" pitchFamily="18" charset="0"/>
+                        </a:rPr>
+                        <m:t>𝜃</m:t>
+                      </m:r>
+                    </m:oMath>
+                  </m:oMathPara>
+                </a14:m>
+                <a:endParaRPr lang="ko-KR" altLang="en-US" dirty="0"/>
+              </a:p>
+            </p:txBody>
+          </p:sp>
+        </mc:Choice>
+        <mc:Fallback>
+          <p:sp>
+            <p:nvSpPr>
+              <p:cNvPr id="21" name="TextBox 20">
+                <a:extLst>
+                  <a:ext uri="{FF2B5EF4-FFF2-40B4-BE49-F238E27FC236}">
+                    <a16:creationId xmlns:a16="http://schemas.microsoft.com/office/drawing/2014/main" id="{0A967918-DD4B-454C-A892-2DC96F138395}"/>
+                  </a:ext>
+                </a:extLst>
+              </p:cNvPr>
+              <p:cNvSpPr txBox="1">
+                <a:spLocks noRot="1" noChangeAspect="1" noMove="1" noResize="1" noEditPoints="1" noAdjustHandles="1" noChangeArrowheads="1" noChangeShapeType="1" noTextEdit="1"/>
+              </p:cNvSpPr>
+              <p:nvPr/>
+            </p:nvSpPr>
+            <p:spPr>
+              <a:xfrm>
+                <a:off x="4518639" y="2383135"/>
+                <a:ext cx="2555956" cy="425181"/>
+              </a:xfrm>
+              <a:prstGeom prst="rect">
+                <a:avLst/>
+              </a:prstGeom>
+              <a:blipFill>
+                <a:blip r:embed="rId5"/>
+                <a:stretch>
+                  <a:fillRect t="-20000"/>
+                </a:stretch>
+              </a:blipFill>
+            </p:spPr>
+            <p:txBody>
+              <a:bodyPr/>
+              <a:lstStyle/>
+              <a:p>
+                <a:r>
+                  <a:rPr lang="ko-KR" altLang="en-US">
+                    <a:noFill/>
+                  </a:rPr>
+                  <a:t> </a:t>
+                </a:r>
+              </a:p>
+            </p:txBody>
+          </p:sp>
+        </mc:Fallback>
+      </mc:AlternateContent>
+      <p:cxnSp>
+        <p:nvCxnSpPr>
+          <p:cNvPr id="3" name="직선 화살표 연결선 2">
+            <a:extLst>
+              <a:ext uri="{FF2B5EF4-FFF2-40B4-BE49-F238E27FC236}">
+                <a16:creationId xmlns:a16="http://schemas.microsoft.com/office/drawing/2014/main" id="{0BDDFAC2-C2C7-40E7-B9B3-A393EE9EA058}"/>
+              </a:ext>
+            </a:extLst>
+          </p:cNvPr>
+          <p:cNvCxnSpPr>
+            <a:cxnSpLocks/>
+          </p:cNvCxnSpPr>
+          <p:nvPr/>
+        </p:nvCxnSpPr>
+        <p:spPr>
+          <a:xfrm flipV="1">
+            <a:off x="7071293" y="2532754"/>
+            <a:ext cx="1242127" cy="850526"/>
+          </a:xfrm>
+          <a:prstGeom prst="straightConnector1">
+            <a:avLst/>
+          </a:prstGeom>
+          <a:ln w="19050">
+            <a:solidFill>
+              <a:schemeClr val="accent2"/>
+            </a:solidFill>
+            <a:tailEnd type="triangle"/>
+          </a:ln>
+        </p:spPr>
+        <p:style>
+          <a:lnRef idx="1">
+            <a:schemeClr val="accent1"/>
+          </a:lnRef>
+          <a:fillRef idx="0">
+            <a:schemeClr val="accent1"/>
+          </a:fillRef>
+          <a:effectRef idx="0">
+            <a:schemeClr val="accent1"/>
+          </a:effectRef>
+          <a:fontRef idx="minor">
+            <a:schemeClr val="tx1"/>
+          </a:fontRef>
+        </p:style>
+      </p:cxnSp>
+      <p:cxnSp>
+        <p:nvCxnSpPr>
+          <p:cNvPr id="13" name="직선 화살표 연결선 12">
+            <a:extLst>
+              <a:ext uri="{FF2B5EF4-FFF2-40B4-BE49-F238E27FC236}">
+                <a16:creationId xmlns:a16="http://schemas.microsoft.com/office/drawing/2014/main" id="{8F4D6B60-B0BE-47C9-9E57-83614E2FD670}"/>
+              </a:ext>
+            </a:extLst>
+          </p:cNvPr>
+          <p:cNvCxnSpPr>
+            <a:cxnSpLocks/>
+          </p:cNvCxnSpPr>
+          <p:nvPr/>
+        </p:nvCxnSpPr>
+        <p:spPr>
+          <a:xfrm flipV="1">
+            <a:off x="7071293" y="3383281"/>
+            <a:ext cx="1242127" cy="1"/>
+          </a:xfrm>
+          <a:prstGeom prst="straightConnector1">
+            <a:avLst/>
+          </a:prstGeom>
+          <a:ln w="19050">
+            <a:tailEnd type="triangle"/>
+          </a:ln>
+        </p:spPr>
+        <p:style>
+          <a:lnRef idx="1">
+            <a:schemeClr val="accent1"/>
+          </a:lnRef>
+          <a:fillRef idx="0">
+            <a:schemeClr val="accent1"/>
+          </a:fillRef>
+          <a:effectRef idx="0">
+            <a:schemeClr val="accent1"/>
+          </a:effectRef>
+          <a:fontRef idx="minor">
+            <a:schemeClr val="tx1"/>
+          </a:fontRef>
+        </p:style>
+      </p:cxnSp>
+      <mc:AlternateContent xmlns:mc="http://schemas.openxmlformats.org/markup-compatibility/2006">
+        <mc:Choice xmlns:a14="http://schemas.microsoft.com/office/drawing/2010/main" Requires="a14">
+          <p:sp>
+            <p:nvSpPr>
+              <p:cNvPr id="22" name="TextBox 21">
+                <a:extLst>
+                  <a:ext uri="{FF2B5EF4-FFF2-40B4-BE49-F238E27FC236}">
+                    <a16:creationId xmlns:a16="http://schemas.microsoft.com/office/drawing/2014/main" id="{6C1B976E-E439-4322-9004-7499B7A48E4C}"/>
+                  </a:ext>
+                </a:extLst>
+              </p:cNvPr>
+              <p:cNvSpPr txBox="1"/>
+              <p:nvPr/>
+            </p:nvSpPr>
+            <p:spPr>
+              <a:xfrm>
+                <a:off x="7177582" y="3356575"/>
+                <a:ext cx="1035796" cy="425181"/>
+              </a:xfrm>
+              <a:prstGeom prst="rect">
+                <a:avLst/>
+              </a:prstGeom>
+              <a:noFill/>
+            </p:spPr>
+            <p:txBody>
+              <a:bodyPr wrap="none" rtlCol="0">
+                <a:spAutoFit/>
+              </a:bodyPr>
+              <a:lstStyle/>
+              <a:p>
+                <a:pPr/>
+                <a14:m>
+                  <m:oMathPara xmlns:m="http://schemas.openxmlformats.org/officeDocument/2006/math">
+                    <m:oMathParaPr>
+                      <m:jc m:val="centerGroup"/>
+                    </m:oMathParaPr>
+                    <m:oMath xmlns:m="http://schemas.openxmlformats.org/officeDocument/2006/math">
+                      <m:d>
+                        <m:dPr>
+                          <m:begChr m:val="|"/>
+                          <m:endChr m:val="|"/>
+                          <m:ctrlPr>
+                            <a:rPr lang="en-US" altLang="ko-KR" b="0" i="1" smtClean="0">
+                              <a:latin typeface="Cambria Math" panose="02040503050406030204" pitchFamily="18" charset="0"/>
+                            </a:rPr>
+                          </m:ctrlPr>
+                        </m:dPr>
+                        <m:e>
+                          <m:acc>
+                            <m:accPr>
+                              <m:chr m:val="⃗"/>
+                              <m:ctrlPr>
+                                <a:rPr lang="en-US" altLang="ko-KR" b="0" i="1" smtClean="0">
+                                  <a:latin typeface="Cambria Math" panose="02040503050406030204" pitchFamily="18" charset="0"/>
+                                </a:rPr>
+                              </m:ctrlPr>
+                            </m:accPr>
+                            <m:e>
+                              <m:r>
+                                <a:rPr lang="en-US" altLang="ko-KR" b="0" i="1" smtClean="0">
+                                  <a:latin typeface="Cambria Math" panose="02040503050406030204" pitchFamily="18" charset="0"/>
+                                </a:rPr>
+                                <m:t>𝐹</m:t>
+                              </m:r>
+                            </m:e>
+                          </m:acc>
+                        </m:e>
+                      </m:d>
+                      <m:r>
+                        <a:rPr lang="en-US" altLang="ko-KR" b="0" i="1" smtClean="0">
+                          <a:latin typeface="Cambria Math" panose="02040503050406030204" pitchFamily="18" charset="0"/>
+                        </a:rPr>
+                        <m:t>𝑐𝑜𝑠</m:t>
+                      </m:r>
+                      <m:r>
+                        <a:rPr lang="en-US" altLang="ko-KR" b="0" i="1" smtClean="0">
+                          <a:latin typeface="Cambria Math" panose="02040503050406030204" pitchFamily="18" charset="0"/>
+                        </a:rPr>
+                        <m:t>𝜃</m:t>
+                      </m:r>
+                    </m:oMath>
+                  </m:oMathPara>
+                </a14:m>
+                <a:endParaRPr lang="ko-KR" altLang="en-US" dirty="0"/>
+              </a:p>
+            </p:txBody>
+          </p:sp>
+        </mc:Choice>
+        <mc:Fallback>
+          <p:sp>
+            <p:nvSpPr>
+              <p:cNvPr id="22" name="TextBox 21">
+                <a:extLst>
+                  <a:ext uri="{FF2B5EF4-FFF2-40B4-BE49-F238E27FC236}">
+                    <a16:creationId xmlns:a16="http://schemas.microsoft.com/office/drawing/2014/main" id="{6C1B976E-E439-4322-9004-7499B7A48E4C}"/>
+                  </a:ext>
+                </a:extLst>
+              </p:cNvPr>
+              <p:cNvSpPr txBox="1">
+                <a:spLocks noRot="1" noChangeAspect="1" noMove="1" noResize="1" noEditPoints="1" noAdjustHandles="1" noChangeArrowheads="1" noChangeShapeType="1" noTextEdit="1"/>
+              </p:cNvSpPr>
+              <p:nvPr/>
+            </p:nvSpPr>
+            <p:spPr>
+              <a:xfrm>
+                <a:off x="7177582" y="3356575"/>
+                <a:ext cx="1035796" cy="425181"/>
+              </a:xfrm>
+              <a:prstGeom prst="rect">
+                <a:avLst/>
+              </a:prstGeom>
+              <a:blipFill>
+                <a:blip r:embed="rId6"/>
+                <a:stretch>
+                  <a:fillRect t="-20290"/>
+                </a:stretch>
+              </a:blipFill>
+            </p:spPr>
+            <p:txBody>
+              <a:bodyPr/>
+              <a:lstStyle/>
+              <a:p>
+                <a:r>
+                  <a:rPr lang="ko-KR" altLang="en-US">
+                    <a:noFill/>
+                  </a:rPr>
+                  <a:t> </a:t>
+                </a:r>
+              </a:p>
+            </p:txBody>
+          </p:sp>
+        </mc:Fallback>
+      </mc:AlternateContent>
+      <mc:AlternateContent xmlns:mc="http://schemas.openxmlformats.org/markup-compatibility/2006">
+        <mc:Choice xmlns:a14="http://schemas.microsoft.com/office/drawing/2010/main" Requires="a14">
+          <p:sp>
+            <p:nvSpPr>
+              <p:cNvPr id="23" name="TextBox 22">
+                <a:extLst>
+                  <a:ext uri="{FF2B5EF4-FFF2-40B4-BE49-F238E27FC236}">
+                    <a16:creationId xmlns:a16="http://schemas.microsoft.com/office/drawing/2014/main" id="{D58AAE64-5503-48A2-9A56-D65E1E45BA01}"/>
+                  </a:ext>
+                </a:extLst>
+              </p:cNvPr>
+              <p:cNvSpPr txBox="1"/>
+              <p:nvPr/>
+            </p:nvSpPr>
+            <p:spPr>
+              <a:xfrm>
+                <a:off x="7147489" y="3169602"/>
+                <a:ext cx="330219" cy="276999"/>
+              </a:xfrm>
+              <a:prstGeom prst="rect">
+                <a:avLst/>
+              </a:prstGeom>
+              <a:noFill/>
+            </p:spPr>
+            <p:txBody>
+              <a:bodyPr wrap="none" rtlCol="0">
+                <a:spAutoFit/>
+              </a:bodyPr>
+              <a:lstStyle/>
+              <a:p>
+                <a:pPr/>
+                <a14:m>
+                  <m:oMathPara xmlns:m="http://schemas.openxmlformats.org/officeDocument/2006/math">
+                    <m:oMathParaPr>
+                      <m:jc m:val="centerGroup"/>
+                    </m:oMathParaPr>
+                    <m:oMath xmlns:m="http://schemas.openxmlformats.org/officeDocument/2006/math">
+                      <m:r>
+                        <a:rPr lang="en-US" altLang="ko-KR" sz="1200" b="0" i="1" smtClean="0">
+                          <a:latin typeface="Cambria Math" panose="02040503050406030204" pitchFamily="18" charset="0"/>
+                        </a:rPr>
+                        <m:t>𝜃</m:t>
+                      </m:r>
+                    </m:oMath>
+                  </m:oMathPara>
+                </a14:m>
+                <a:endParaRPr lang="ko-KR" altLang="en-US" sz="1200" dirty="0"/>
+              </a:p>
+            </p:txBody>
+          </p:sp>
+        </mc:Choice>
+        <mc:Fallback>
+          <p:sp>
+            <p:nvSpPr>
+              <p:cNvPr id="23" name="TextBox 22">
+                <a:extLst>
+                  <a:ext uri="{FF2B5EF4-FFF2-40B4-BE49-F238E27FC236}">
+                    <a16:creationId xmlns:a16="http://schemas.microsoft.com/office/drawing/2014/main" id="{D58AAE64-5503-48A2-9A56-D65E1E45BA01}"/>
+                  </a:ext>
+                </a:extLst>
+              </p:cNvPr>
+              <p:cNvSpPr txBox="1">
+                <a:spLocks noRot="1" noChangeAspect="1" noMove="1" noResize="1" noEditPoints="1" noAdjustHandles="1" noChangeArrowheads="1" noChangeShapeType="1" noTextEdit="1"/>
+              </p:cNvSpPr>
+              <p:nvPr/>
+            </p:nvSpPr>
+            <p:spPr>
+              <a:xfrm>
+                <a:off x="7147489" y="3169602"/>
+                <a:ext cx="330219" cy="276999"/>
+              </a:xfrm>
+              <a:prstGeom prst="rect">
+                <a:avLst/>
+              </a:prstGeom>
+              <a:blipFill>
+                <a:blip r:embed="rId7"/>
+                <a:stretch>
+                  <a:fillRect/>
+                </a:stretch>
+              </a:blipFill>
+            </p:spPr>
+            <p:txBody>
+              <a:bodyPr/>
+              <a:lstStyle/>
+              <a:p>
+                <a:r>
+                  <a:rPr lang="ko-KR" altLang="en-US">
+                    <a:noFill/>
+                  </a:rPr>
+                  <a:t> </a:t>
+                </a:r>
+              </a:p>
+            </p:txBody>
+          </p:sp>
+        </mc:Fallback>
+      </mc:AlternateContent>
+      <p:sp>
+        <p:nvSpPr>
+          <p:cNvPr id="12" name="원호 11">
+            <a:extLst>
+              <a:ext uri="{FF2B5EF4-FFF2-40B4-BE49-F238E27FC236}">
+                <a16:creationId xmlns:a16="http://schemas.microsoft.com/office/drawing/2014/main" id="{89BC5A47-1723-498E-8E49-AC986B4EA0A5}"/>
+              </a:ext>
+            </a:extLst>
+          </p:cNvPr>
+          <p:cNvSpPr/>
+          <p:nvPr/>
+        </p:nvSpPr>
+        <p:spPr>
+          <a:xfrm>
+            <a:off x="7038660" y="3285597"/>
+            <a:ext cx="157589" cy="157589"/>
+          </a:xfrm>
+          <a:prstGeom prst="arc">
+            <a:avLst>
+              <a:gd name="adj1" fmla="val 19160594"/>
+              <a:gd name="adj2" fmla="val 596641"/>
+            </a:avLst>
+          </a:prstGeom>
+          <a:ln>
+            <a:solidFill>
+              <a:schemeClr val="tx1"/>
+            </a:solidFill>
+          </a:ln>
+        </p:spPr>
+        <p:style>
+          <a:lnRef idx="1">
+            <a:schemeClr val="accent1"/>
+          </a:lnRef>
+          <a:fillRef idx="0">
+            <a:schemeClr val="accent1"/>
+          </a:fillRef>
+          <a:effectRef idx="0">
+            <a:schemeClr val="accent1"/>
+          </a:effectRef>
+          <a:fontRef idx="minor">
+            <a:schemeClr val="tx1"/>
+          </a:fontRef>
+        </p:style>
+        <p:txBody>
+          <a:bodyPr rtlCol="0" anchor="ctr"/>
+          <a:lstStyle/>
+          <a:p>
+            <a:pPr algn="ctr"/>
+            <a:endParaRPr lang="ko-KR" altLang="en-US"/>
+          </a:p>
+        </p:txBody>
+      </p:sp>
+      <p:cxnSp>
+        <p:nvCxnSpPr>
+          <p:cNvPr id="24" name="직선 연결선 23">
+            <a:extLst>
+              <a:ext uri="{FF2B5EF4-FFF2-40B4-BE49-F238E27FC236}">
+                <a16:creationId xmlns:a16="http://schemas.microsoft.com/office/drawing/2014/main" id="{5A1FCA85-EE75-46B6-8A7A-2E657E7A9E57}"/>
+              </a:ext>
+            </a:extLst>
+          </p:cNvPr>
+          <p:cNvCxnSpPr>
+            <a:cxnSpLocks/>
+          </p:cNvCxnSpPr>
+          <p:nvPr/>
+        </p:nvCxnSpPr>
+        <p:spPr>
+          <a:xfrm>
+            <a:off x="8310880" y="2532754"/>
+            <a:ext cx="0" cy="850526"/>
+          </a:xfrm>
+          <a:prstGeom prst="line">
+            <a:avLst/>
+          </a:prstGeom>
+          <a:ln>
+            <a:solidFill>
+              <a:schemeClr val="tx1"/>
+            </a:solidFill>
+            <a:prstDash val="dashDot"/>
+          </a:ln>
+        </p:spPr>
+        <p:style>
+          <a:lnRef idx="1">
+            <a:schemeClr val="accent1"/>
+          </a:lnRef>
+          <a:fillRef idx="0">
+            <a:schemeClr val="accent1"/>
+          </a:fillRef>
+          <a:effectRef idx="0">
+            <a:schemeClr val="accent1"/>
+          </a:effectRef>
+          <a:fontRef idx="minor">
+            <a:schemeClr val="tx1"/>
+          </a:fontRef>
+        </p:style>
+      </p:cxnSp>
+    </p:spTree>
+    <p:extLst>
+      <p:ext uri="{BB962C8B-B14F-4D97-AF65-F5344CB8AC3E}">
+        <p14:creationId xmlns:p14="http://schemas.microsoft.com/office/powerpoint/2010/main" val="2680840686"/>
       </p:ext>
     </p:extLst>
   </p:cSld>

</xml_diff>

<commit_message>
line integral in English
</commit_message>
<xml_diff>
--- a/pics/2020-08-17-line_integral/pics.pptx
+++ b/pics/2020-08-17-line_integral/pics.pptx
@@ -6,10 +6,13 @@
   </p:sldMasterIdLst>
   <p:sldIdLst>
     <p:sldId id="256" r:id="rId2"/>
-    <p:sldId id="257" r:id="rId3"/>
-    <p:sldId id="258" r:id="rId4"/>
-    <p:sldId id="259" r:id="rId5"/>
-    <p:sldId id="260" r:id="rId6"/>
+    <p:sldId id="261" r:id="rId3"/>
+    <p:sldId id="257" r:id="rId4"/>
+    <p:sldId id="262" r:id="rId5"/>
+    <p:sldId id="258" r:id="rId6"/>
+    <p:sldId id="263" r:id="rId7"/>
+    <p:sldId id="259" r:id="rId8"/>
+    <p:sldId id="260" r:id="rId9"/>
   </p:sldIdLst>
   <p:sldSz cx="12192000" cy="6858000"/>
   <p:notesSz cx="6858000" cy="9144000"/>
@@ -274,7 +277,7 @@
           <a:p>
             <a:fld id="{444083E8-13C9-443A-940E-8357ED0D1E1F}" type="datetimeFigureOut">
               <a:rPr lang="ko-KR" altLang="en-US" smtClean="0"/>
-              <a:t>2020-08-22</a:t>
+              <a:t>2023-04-27</a:t>
             </a:fld>
             <a:endParaRPr lang="ko-KR" altLang="en-US"/>
           </a:p>
@@ -472,7 +475,7 @@
           <a:p>
             <a:fld id="{444083E8-13C9-443A-940E-8357ED0D1E1F}" type="datetimeFigureOut">
               <a:rPr lang="ko-KR" altLang="en-US" smtClean="0"/>
-              <a:t>2020-08-22</a:t>
+              <a:t>2023-04-27</a:t>
             </a:fld>
             <a:endParaRPr lang="ko-KR" altLang="en-US"/>
           </a:p>
@@ -680,7 +683,7 @@
           <a:p>
             <a:fld id="{444083E8-13C9-443A-940E-8357ED0D1E1F}" type="datetimeFigureOut">
               <a:rPr lang="ko-KR" altLang="en-US" smtClean="0"/>
-              <a:t>2020-08-22</a:t>
+              <a:t>2023-04-27</a:t>
             </a:fld>
             <a:endParaRPr lang="ko-KR" altLang="en-US"/>
           </a:p>
@@ -878,7 +881,7 @@
           <a:p>
             <a:fld id="{444083E8-13C9-443A-940E-8357ED0D1E1F}" type="datetimeFigureOut">
               <a:rPr lang="ko-KR" altLang="en-US" smtClean="0"/>
-              <a:t>2020-08-22</a:t>
+              <a:t>2023-04-27</a:t>
             </a:fld>
             <a:endParaRPr lang="ko-KR" altLang="en-US"/>
           </a:p>
@@ -1153,7 +1156,7 @@
           <a:p>
             <a:fld id="{444083E8-13C9-443A-940E-8357ED0D1E1F}" type="datetimeFigureOut">
               <a:rPr lang="ko-KR" altLang="en-US" smtClean="0"/>
-              <a:t>2020-08-22</a:t>
+              <a:t>2023-04-27</a:t>
             </a:fld>
             <a:endParaRPr lang="ko-KR" altLang="en-US"/>
           </a:p>
@@ -1418,7 +1421,7 @@
           <a:p>
             <a:fld id="{444083E8-13C9-443A-940E-8357ED0D1E1F}" type="datetimeFigureOut">
               <a:rPr lang="ko-KR" altLang="en-US" smtClean="0"/>
-              <a:t>2020-08-22</a:t>
+              <a:t>2023-04-27</a:t>
             </a:fld>
             <a:endParaRPr lang="ko-KR" altLang="en-US"/>
           </a:p>
@@ -1830,7 +1833,7 @@
           <a:p>
             <a:fld id="{444083E8-13C9-443A-940E-8357ED0D1E1F}" type="datetimeFigureOut">
               <a:rPr lang="ko-KR" altLang="en-US" smtClean="0"/>
-              <a:t>2020-08-22</a:t>
+              <a:t>2023-04-27</a:t>
             </a:fld>
             <a:endParaRPr lang="ko-KR" altLang="en-US"/>
           </a:p>
@@ -1971,7 +1974,7 @@
           <a:p>
             <a:fld id="{444083E8-13C9-443A-940E-8357ED0D1E1F}" type="datetimeFigureOut">
               <a:rPr lang="ko-KR" altLang="en-US" smtClean="0"/>
-              <a:t>2020-08-22</a:t>
+              <a:t>2023-04-27</a:t>
             </a:fld>
             <a:endParaRPr lang="ko-KR" altLang="en-US"/>
           </a:p>
@@ -2084,7 +2087,7 @@
           <a:p>
             <a:fld id="{444083E8-13C9-443A-940E-8357ED0D1E1F}" type="datetimeFigureOut">
               <a:rPr lang="ko-KR" altLang="en-US" smtClean="0"/>
-              <a:t>2020-08-22</a:t>
+              <a:t>2023-04-27</a:t>
             </a:fld>
             <a:endParaRPr lang="ko-KR" altLang="en-US"/>
           </a:p>
@@ -2395,7 +2398,7 @@
           <a:p>
             <a:fld id="{444083E8-13C9-443A-940E-8357ED0D1E1F}" type="datetimeFigureOut">
               <a:rPr lang="ko-KR" altLang="en-US" smtClean="0"/>
-              <a:t>2020-08-22</a:t>
+              <a:t>2023-04-27</a:t>
             </a:fld>
             <a:endParaRPr lang="ko-KR" altLang="en-US"/>
           </a:p>
@@ -2683,7 +2686,7 @@
           <a:p>
             <a:fld id="{444083E8-13C9-443A-940E-8357ED0D1E1F}" type="datetimeFigureOut">
               <a:rPr lang="ko-KR" altLang="en-US" smtClean="0"/>
-              <a:t>2020-08-22</a:t>
+              <a:t>2023-04-27</a:t>
             </a:fld>
             <a:endParaRPr lang="ko-KR" altLang="en-US"/>
           </a:p>
@@ -2924,7 +2927,7 @@
           <a:p>
             <a:fld id="{444083E8-13C9-443A-940E-8357ED0D1E1F}" type="datetimeFigureOut">
               <a:rPr lang="ko-KR" altLang="en-US" smtClean="0"/>
-              <a:t>2020-08-22</a:t>
+              <a:t>2023-04-27</a:t>
             </a:fld>
             <a:endParaRPr lang="ko-KR" altLang="en-US"/>
           </a:p>
@@ -3525,8 +3528,8 @@
           </p:style>
         </p:cxnSp>
       </p:grpSp>
-      <mc:AlternateContent xmlns:mc="http://schemas.openxmlformats.org/markup-compatibility/2006">
-        <mc:Choice xmlns:a14="http://schemas.microsoft.com/office/drawing/2010/main" Requires="a14">
+      <mc:AlternateContent xmlns:mc="http://schemas.openxmlformats.org/markup-compatibility/2006" xmlns:a14="http://schemas.microsoft.com/office/drawing/2010/main">
+        <mc:Choice Requires="a14">
           <p:sp>
             <p:nvSpPr>
               <p:cNvPr id="18" name="TextBox 17">
@@ -3576,7 +3579,7 @@
             </p:txBody>
           </p:sp>
         </mc:Choice>
-        <mc:Fallback>
+        <mc:Fallback xmlns="">
           <p:sp>
             <p:nvSpPr>
               <p:cNvPr id="18" name="TextBox 17">
@@ -3691,8 +3694,8 @@
           </a:p>
         </p:txBody>
       </p:sp>
-      <mc:AlternateContent xmlns:mc="http://schemas.openxmlformats.org/markup-compatibility/2006">
-        <mc:Choice xmlns:a14="http://schemas.microsoft.com/office/drawing/2010/main" Requires="a14">
+      <mc:AlternateContent xmlns:mc="http://schemas.openxmlformats.org/markup-compatibility/2006" xmlns:a14="http://schemas.microsoft.com/office/drawing/2010/main">
+        <mc:Choice Requires="a14">
           <p:sp>
             <p:nvSpPr>
               <p:cNvPr id="20" name="TextBox 19">
@@ -3742,7 +3745,7 @@
             </p:txBody>
           </p:sp>
         </mc:Choice>
-        <mc:Fallback>
+        <mc:Fallback xmlns="">
           <p:sp>
             <p:nvSpPr>
               <p:cNvPr id="20" name="TextBox 19">
@@ -3787,8 +3790,8 @@
           </p:sp>
         </mc:Fallback>
       </mc:AlternateContent>
-      <mc:AlternateContent xmlns:mc="http://schemas.openxmlformats.org/markup-compatibility/2006">
-        <mc:Choice xmlns:a14="http://schemas.microsoft.com/office/drawing/2010/main" Requires="a14">
+      <mc:AlternateContent xmlns:mc="http://schemas.openxmlformats.org/markup-compatibility/2006" xmlns:a14="http://schemas.microsoft.com/office/drawing/2010/main">
+        <mc:Choice Requires="a14">
           <p:sp>
             <p:nvSpPr>
               <p:cNvPr id="21" name="TextBox 20">
@@ -3862,7 +3865,7 @@
             </p:txBody>
           </p:sp>
         </mc:Choice>
-        <mc:Fallback>
+        <mc:Fallback xmlns="">
           <p:sp>
             <p:nvSpPr>
               <p:cNvPr id="21" name="TextBox 20">
@@ -4121,8 +4124,727 @@
           </p:style>
         </p:cxnSp>
       </p:grpSp>
-      <mc:AlternateContent xmlns:mc="http://schemas.openxmlformats.org/markup-compatibility/2006">
-        <mc:Choice xmlns:a14="http://schemas.microsoft.com/office/drawing/2010/main" Requires="a14">
+      <mc:AlternateContent xmlns:mc="http://schemas.openxmlformats.org/markup-compatibility/2006" xmlns:a14="http://schemas.microsoft.com/office/drawing/2010/main">
+        <mc:Choice Requires="a14">
+          <p:sp>
+            <p:nvSpPr>
+              <p:cNvPr id="18" name="TextBox 17">
+                <a:extLst>
+                  <a:ext uri="{FF2B5EF4-FFF2-40B4-BE49-F238E27FC236}">
+                    <a16:creationId xmlns:a16="http://schemas.microsoft.com/office/drawing/2014/main" id="{327FCE86-AD27-496A-9CEE-F0763C80365B}"/>
+                  </a:ext>
+                </a:extLst>
+              </p:cNvPr>
+              <p:cNvSpPr txBox="1"/>
+              <p:nvPr/>
+            </p:nvSpPr>
+            <p:spPr>
+              <a:xfrm>
+                <a:off x="4988434" y="4091310"/>
+                <a:ext cx="378565" cy="369332"/>
+              </a:xfrm>
+              <a:prstGeom prst="rect">
+                <a:avLst/>
+              </a:prstGeom>
+              <a:noFill/>
+            </p:spPr>
+            <p:txBody>
+              <a:bodyPr wrap="none" rtlCol="0">
+                <a:spAutoFit/>
+              </a:bodyPr>
+              <a:lstStyle/>
+              <a:p>
+                <a:pPr/>
+                <a14:m>
+                  <m:oMathPara xmlns:m="http://schemas.openxmlformats.org/officeDocument/2006/math">
+                    <m:oMathParaPr>
+                      <m:jc m:val="centerGroup"/>
+                    </m:oMathParaPr>
+                    <m:oMath xmlns:m="http://schemas.openxmlformats.org/officeDocument/2006/math">
+                      <m:r>
+                        <a:rPr lang="en-US" altLang="ko-KR" b="0" i="1" smtClean="0">
+                          <a:latin typeface="Cambria Math" panose="02040503050406030204" pitchFamily="18" charset="0"/>
+                        </a:rPr>
+                        <m:t>𝑠</m:t>
+                      </m:r>
+                    </m:oMath>
+                  </m:oMathPara>
+                </a14:m>
+                <a:endParaRPr lang="ko-KR" altLang="en-US" dirty="0"/>
+              </a:p>
+            </p:txBody>
+          </p:sp>
+        </mc:Choice>
+        <mc:Fallback xmlns="">
+          <p:sp>
+            <p:nvSpPr>
+              <p:cNvPr id="18" name="TextBox 17">
+                <a:extLst>
+                  <a:ext uri="{FF2B5EF4-FFF2-40B4-BE49-F238E27FC236}">
+                    <a16:creationId xmlns:a16="http://schemas.microsoft.com/office/drawing/2014/main" id="{327FCE86-AD27-496A-9CEE-F0763C80365B}"/>
+                  </a:ext>
+                </a:extLst>
+              </p:cNvPr>
+              <p:cNvSpPr txBox="1">
+                <a:spLocks noRot="1" noChangeAspect="1" noMove="1" noResize="1" noEditPoints="1" noAdjustHandles="1" noChangeArrowheads="1" noChangeShapeType="1" noTextEdit="1"/>
+              </p:cNvSpPr>
+              <p:nvPr/>
+            </p:nvSpPr>
+            <p:spPr>
+              <a:xfrm>
+                <a:off x="4988434" y="4091310"/>
+                <a:ext cx="378565" cy="369332"/>
+              </a:xfrm>
+              <a:prstGeom prst="rect">
+                <a:avLst/>
+              </a:prstGeom>
+              <a:blipFill>
+                <a:blip r:embed="rId3"/>
+                <a:stretch>
+                  <a:fillRect/>
+                </a:stretch>
+              </a:blipFill>
+            </p:spPr>
+            <p:txBody>
+              <a:bodyPr/>
+              <a:lstStyle/>
+              <a:p>
+                <a:r>
+                  <a:rPr lang="ko-KR" altLang="en-US">
+                    <a:noFill/>
+                  </a:rPr>
+                  <a:t> </a:t>
+                </a:r>
+              </a:p>
+            </p:txBody>
+          </p:sp>
+        </mc:Fallback>
+      </mc:AlternateContent>
+      <p:sp>
+        <p:nvSpPr>
+          <p:cNvPr id="19" name="화살표: 오른쪽 18">
+            <a:extLst>
+              <a:ext uri="{FF2B5EF4-FFF2-40B4-BE49-F238E27FC236}">
+                <a16:creationId xmlns:a16="http://schemas.microsoft.com/office/drawing/2014/main" id="{D09BA496-CA2F-4846-9545-865E002A3916}"/>
+              </a:ext>
+            </a:extLst>
+          </p:cNvPr>
+          <p:cNvSpPr/>
+          <p:nvPr/>
+        </p:nvSpPr>
+        <p:spPr>
+          <a:xfrm>
+            <a:off x="6790351" y="3186054"/>
+            <a:ext cx="978408" cy="484632"/>
+          </a:xfrm>
+          <a:prstGeom prst="rightArrow">
+            <a:avLst/>
+          </a:prstGeom>
+          <a:gradFill flip="none" rotWithShape="1">
+            <a:gsLst>
+              <a:gs pos="0">
+                <a:schemeClr val="accent1">
+                  <a:tint val="66000"/>
+                  <a:satMod val="160000"/>
+                </a:schemeClr>
+              </a:gs>
+              <a:gs pos="30000">
+                <a:schemeClr val="accent1">
+                  <a:tint val="44500"/>
+                  <a:satMod val="160000"/>
+                </a:schemeClr>
+              </a:gs>
+              <a:gs pos="85000">
+                <a:schemeClr val="bg1"/>
+              </a:gs>
+            </a:gsLst>
+            <a:lin ang="10800000" scaled="1"/>
+            <a:tileRect/>
+          </a:gradFill>
+          <a:ln>
+            <a:noFill/>
+          </a:ln>
+        </p:spPr>
+        <p:style>
+          <a:lnRef idx="2">
+            <a:schemeClr val="accent1">
+              <a:shade val="50000"/>
+            </a:schemeClr>
+          </a:lnRef>
+          <a:fillRef idx="1">
+            <a:schemeClr val="accent1"/>
+          </a:fillRef>
+          <a:effectRef idx="0">
+            <a:schemeClr val="accent1"/>
+          </a:effectRef>
+          <a:fontRef idx="minor">
+            <a:schemeClr val="lt1"/>
+          </a:fontRef>
+        </p:style>
+        <p:txBody>
+          <a:bodyPr rtlCol="0" anchor="ctr"/>
+          <a:lstStyle/>
+          <a:p>
+            <a:pPr algn="ctr"/>
+            <a:endParaRPr lang="ko-KR" altLang="en-US"/>
+          </a:p>
+        </p:txBody>
+      </p:sp>
+      <mc:AlternateContent xmlns:mc="http://schemas.openxmlformats.org/markup-compatibility/2006" xmlns:a14="http://schemas.microsoft.com/office/drawing/2010/main">
+        <mc:Choice Requires="a14">
+          <p:sp>
+            <p:nvSpPr>
+              <p:cNvPr id="20" name="TextBox 19">
+                <a:extLst>
+                  <a:ext uri="{FF2B5EF4-FFF2-40B4-BE49-F238E27FC236}">
+                    <a16:creationId xmlns:a16="http://schemas.microsoft.com/office/drawing/2014/main" id="{FA503A6F-2B04-48EE-B664-12D6C892312B}"/>
+                  </a:ext>
+                </a:extLst>
+              </p:cNvPr>
+              <p:cNvSpPr txBox="1"/>
+              <p:nvPr/>
+            </p:nvSpPr>
+            <p:spPr>
+              <a:xfrm>
+                <a:off x="7071293" y="2934594"/>
+                <a:ext cx="416524" cy="369332"/>
+              </a:xfrm>
+              <a:prstGeom prst="rect">
+                <a:avLst/>
+              </a:prstGeom>
+              <a:noFill/>
+            </p:spPr>
+            <p:txBody>
+              <a:bodyPr wrap="none" rtlCol="0">
+                <a:spAutoFit/>
+              </a:bodyPr>
+              <a:lstStyle/>
+              <a:p>
+                <a:pPr/>
+                <a14:m>
+                  <m:oMathPara xmlns:m="http://schemas.openxmlformats.org/officeDocument/2006/math">
+                    <m:oMathParaPr>
+                      <m:jc m:val="centerGroup"/>
+                    </m:oMathParaPr>
+                    <m:oMath xmlns:m="http://schemas.openxmlformats.org/officeDocument/2006/math">
+                      <m:r>
+                        <a:rPr lang="en-US" altLang="ko-KR" b="0" i="1" smtClean="0">
+                          <a:latin typeface="Cambria Math" panose="02040503050406030204" pitchFamily="18" charset="0"/>
+                        </a:rPr>
+                        <m:t>𝐹</m:t>
+                      </m:r>
+                    </m:oMath>
+                  </m:oMathPara>
+                </a14:m>
+                <a:endParaRPr lang="ko-KR" altLang="en-US" dirty="0"/>
+              </a:p>
+            </p:txBody>
+          </p:sp>
+        </mc:Choice>
+        <mc:Fallback xmlns="">
+          <p:sp>
+            <p:nvSpPr>
+              <p:cNvPr id="20" name="TextBox 19">
+                <a:extLst>
+                  <a:ext uri="{FF2B5EF4-FFF2-40B4-BE49-F238E27FC236}">
+                    <a16:creationId xmlns:a16="http://schemas.microsoft.com/office/drawing/2014/main" id="{FA503A6F-2B04-48EE-B664-12D6C892312B}"/>
+                  </a:ext>
+                </a:extLst>
+              </p:cNvPr>
+              <p:cNvSpPr txBox="1">
+                <a:spLocks noRot="1" noChangeAspect="1" noMove="1" noResize="1" noEditPoints="1" noAdjustHandles="1" noChangeArrowheads="1" noChangeShapeType="1" noTextEdit="1"/>
+              </p:cNvSpPr>
+              <p:nvPr/>
+            </p:nvSpPr>
+            <p:spPr>
+              <a:xfrm>
+                <a:off x="7071293" y="2934594"/>
+                <a:ext cx="416524" cy="369332"/>
+              </a:xfrm>
+              <a:prstGeom prst="rect">
+                <a:avLst/>
+              </a:prstGeom>
+              <a:blipFill>
+                <a:blip r:embed="rId4"/>
+                <a:stretch>
+                  <a:fillRect/>
+                </a:stretch>
+              </a:blipFill>
+            </p:spPr>
+            <p:txBody>
+              <a:bodyPr/>
+              <a:lstStyle/>
+              <a:p>
+                <a:r>
+                  <a:rPr lang="ko-KR" altLang="en-US">
+                    <a:noFill/>
+                  </a:rPr>
+                  <a:t> </a:t>
+                </a:r>
+              </a:p>
+            </p:txBody>
+          </p:sp>
+        </mc:Fallback>
+      </mc:AlternateContent>
+      <mc:AlternateContent xmlns:mc="http://schemas.openxmlformats.org/markup-compatibility/2006" xmlns:a14="http://schemas.microsoft.com/office/drawing/2010/main">
+        <mc:Choice Requires="a14">
+          <p:sp>
+            <p:nvSpPr>
+              <p:cNvPr id="21" name="TextBox 20">
+                <a:extLst>
+                  <a:ext uri="{FF2B5EF4-FFF2-40B4-BE49-F238E27FC236}">
+                    <a16:creationId xmlns:a16="http://schemas.microsoft.com/office/drawing/2014/main" id="{0A967918-DD4B-454C-A892-2DC96F138395}"/>
+                  </a:ext>
+                </a:extLst>
+              </p:cNvPr>
+              <p:cNvSpPr txBox="1"/>
+              <p:nvPr/>
+            </p:nvSpPr>
+            <p:spPr>
+              <a:xfrm>
+                <a:off x="5366999" y="2464415"/>
+                <a:ext cx="1227003" cy="369332"/>
+              </a:xfrm>
+              <a:prstGeom prst="rect">
+                <a:avLst/>
+              </a:prstGeom>
+              <a:noFill/>
+            </p:spPr>
+            <p:txBody>
+              <a:bodyPr wrap="none" rtlCol="0">
+                <a:spAutoFit/>
+              </a:bodyPr>
+              <a:lstStyle/>
+              <a:p>
+                <a:pPr/>
+                <a14:m>
+                  <m:oMathPara xmlns:m="http://schemas.openxmlformats.org/officeDocument/2006/math">
+                    <m:oMathParaPr>
+                      <m:jc m:val="centerGroup"/>
+                    </m:oMathParaPr>
+                    <m:oMath xmlns:m="http://schemas.openxmlformats.org/officeDocument/2006/math">
+                      <m:r>
+                        <a:rPr lang="en-US" altLang="ko-KR" b="0" i="1" smtClean="0">
+                          <a:latin typeface="Cambria Math" panose="02040503050406030204" pitchFamily="18" charset="0"/>
+                        </a:rPr>
+                        <m:t>𝑊</m:t>
+                      </m:r>
+                      <m:r>
+                        <a:rPr lang="en-US" altLang="ko-KR" b="0" i="1" smtClean="0">
+                          <a:latin typeface="Cambria Math" panose="02040503050406030204" pitchFamily="18" charset="0"/>
+                        </a:rPr>
+                        <m:t>=</m:t>
+                      </m:r>
+                      <m:r>
+                        <a:rPr lang="en-US" altLang="ko-KR" b="0" i="1" smtClean="0">
+                          <a:latin typeface="Cambria Math" panose="02040503050406030204" pitchFamily="18" charset="0"/>
+                        </a:rPr>
+                        <m:t>𝐹</m:t>
+                      </m:r>
+                      <m:r>
+                        <a:rPr lang="en-US" altLang="ko-KR" b="0" i="1" smtClean="0">
+                          <a:latin typeface="Cambria Math" panose="02040503050406030204" pitchFamily="18" charset="0"/>
+                        </a:rPr>
+                        <m:t>⋅</m:t>
+                      </m:r>
+                      <m:r>
+                        <a:rPr lang="en-US" altLang="ko-KR" b="0" i="1" smtClean="0">
+                          <a:latin typeface="Cambria Math" panose="02040503050406030204" pitchFamily="18" charset="0"/>
+                        </a:rPr>
+                        <m:t>𝑠</m:t>
+                      </m:r>
+                    </m:oMath>
+                  </m:oMathPara>
+                </a14:m>
+                <a:endParaRPr lang="ko-KR" altLang="en-US" dirty="0"/>
+              </a:p>
+            </p:txBody>
+          </p:sp>
+        </mc:Choice>
+        <mc:Fallback xmlns="">
+          <p:sp>
+            <p:nvSpPr>
+              <p:cNvPr id="21" name="TextBox 20">
+                <a:extLst>
+                  <a:ext uri="{FF2B5EF4-FFF2-40B4-BE49-F238E27FC236}">
+                    <a16:creationId xmlns:a16="http://schemas.microsoft.com/office/drawing/2014/main" id="{0A967918-DD4B-454C-A892-2DC96F138395}"/>
+                  </a:ext>
+                </a:extLst>
+              </p:cNvPr>
+              <p:cNvSpPr txBox="1">
+                <a:spLocks noRot="1" noChangeAspect="1" noMove="1" noResize="1" noEditPoints="1" noAdjustHandles="1" noChangeArrowheads="1" noChangeShapeType="1" noTextEdit="1"/>
+              </p:cNvSpPr>
+              <p:nvPr/>
+            </p:nvSpPr>
+            <p:spPr>
+              <a:xfrm>
+                <a:off x="5366999" y="2464415"/>
+                <a:ext cx="1227003" cy="369332"/>
+              </a:xfrm>
+              <a:prstGeom prst="rect">
+                <a:avLst/>
+              </a:prstGeom>
+              <a:blipFill>
+                <a:blip r:embed="rId5"/>
+                <a:stretch>
+                  <a:fillRect/>
+                </a:stretch>
+              </a:blipFill>
+            </p:spPr>
+            <p:txBody>
+              <a:bodyPr/>
+              <a:lstStyle/>
+              <a:p>
+                <a:r>
+                  <a:rPr lang="ko-KR" altLang="en-US">
+                    <a:noFill/>
+                  </a:rPr>
+                  <a:t> </a:t>
+                </a:r>
+              </a:p>
+            </p:txBody>
+          </p:sp>
+        </mc:Fallback>
+      </mc:AlternateContent>
+      <p:pic>
+        <p:nvPicPr>
+          <p:cNvPr id="3" name="그림 4">
+            <a:extLst>
+              <a:ext uri="{FF2B5EF4-FFF2-40B4-BE49-F238E27FC236}">
+                <a16:creationId xmlns:a16="http://schemas.microsoft.com/office/drawing/2014/main" id="{CC65C1EA-153E-7900-E1D6-6438421E4B77}"/>
+              </a:ext>
+            </a:extLst>
+          </p:cNvPr>
+          <p:cNvPicPr>
+            <a:picLocks noChangeAspect="1"/>
+          </p:cNvPicPr>
+          <p:nvPr/>
+        </p:nvPicPr>
+        <p:blipFill rotWithShape="1">
+          <a:blip r:embed="rId2">
+            <a:extLst>
+              <a:ext uri="{28A0092B-C50C-407E-A947-70E740481C1C}">
+                <a14:useLocalDpi xmlns:a14="http://schemas.microsoft.com/office/drawing/2010/main" val="0"/>
+              </a:ext>
+            </a:extLst>
+          </a:blip>
+          <a:srcRect l="49686" t="79488" r="37060" b="2522"/>
+          <a:stretch/>
+        </p:blipFill>
+        <p:spPr>
+          <a:xfrm>
+            <a:off x="6815837" y="3912251"/>
+            <a:ext cx="378566" cy="237967"/>
+          </a:xfrm>
+          <a:prstGeom prst="rect">
+            <a:avLst/>
+          </a:prstGeom>
+        </p:spPr>
+      </p:pic>
+      <p:sp>
+        <p:nvSpPr>
+          <p:cNvPr id="4" name="Rectangle 3">
+            <a:extLst>
+              <a:ext uri="{FF2B5EF4-FFF2-40B4-BE49-F238E27FC236}">
+                <a16:creationId xmlns:a16="http://schemas.microsoft.com/office/drawing/2014/main" id="{E620BF75-29A5-72E9-D60D-1621BD0AD886}"/>
+              </a:ext>
+            </a:extLst>
+          </p:cNvPr>
+          <p:cNvSpPr/>
+          <p:nvPr/>
+        </p:nvSpPr>
+        <p:spPr>
+          <a:xfrm>
+            <a:off x="6199162" y="2929905"/>
+            <a:ext cx="323557" cy="193123"/>
+          </a:xfrm>
+          <a:prstGeom prst="rect">
+            <a:avLst/>
+          </a:prstGeom>
+          <a:solidFill>
+            <a:schemeClr val="bg1"/>
+          </a:solidFill>
+          <a:ln>
+            <a:noFill/>
+          </a:ln>
+        </p:spPr>
+        <p:style>
+          <a:lnRef idx="2">
+            <a:schemeClr val="accent1">
+              <a:shade val="50000"/>
+            </a:schemeClr>
+          </a:lnRef>
+          <a:fillRef idx="1">
+            <a:schemeClr val="accent1"/>
+          </a:fillRef>
+          <a:effectRef idx="0">
+            <a:schemeClr val="accent1"/>
+          </a:effectRef>
+          <a:fontRef idx="minor">
+            <a:schemeClr val="lt1"/>
+          </a:fontRef>
+        </p:style>
+        <p:txBody>
+          <a:bodyPr rtlCol="0" anchor="ctr"/>
+          <a:lstStyle/>
+          <a:p>
+            <a:pPr algn="ctr"/>
+            <a:endParaRPr lang="en-US"/>
+          </a:p>
+        </p:txBody>
+      </p:sp>
+      <p:sp>
+        <p:nvSpPr>
+          <p:cNvPr id="2" name="TextBox 1">
+            <a:extLst>
+              <a:ext uri="{FF2B5EF4-FFF2-40B4-BE49-F238E27FC236}">
+                <a16:creationId xmlns:a16="http://schemas.microsoft.com/office/drawing/2014/main" id="{1B632441-F1B8-0148-6F1B-A535DDE0492C}"/>
+              </a:ext>
+            </a:extLst>
+          </p:cNvPr>
+          <p:cNvSpPr txBox="1"/>
+          <p:nvPr/>
+        </p:nvSpPr>
+        <p:spPr>
+          <a:xfrm>
+            <a:off x="5992839" y="2937362"/>
+            <a:ext cx="618094" cy="246221"/>
+          </a:xfrm>
+          <a:prstGeom prst="rect">
+            <a:avLst/>
+          </a:prstGeom>
+          <a:noFill/>
+        </p:spPr>
+        <p:txBody>
+          <a:bodyPr wrap="square" rtlCol="0">
+            <a:spAutoFit/>
+          </a:bodyPr>
+          <a:lstStyle/>
+          <a:p>
+            <a:pPr algn="ctr"/>
+            <a:r>
+              <a:rPr lang="en-US" sz="1000" dirty="0"/>
+              <a:t>Charles</a:t>
+            </a:r>
+          </a:p>
+        </p:txBody>
+      </p:sp>
+    </p:spTree>
+    <p:extLst>
+      <p:ext uri="{BB962C8B-B14F-4D97-AF65-F5344CB8AC3E}">
+        <p14:creationId xmlns:p14="http://schemas.microsoft.com/office/powerpoint/2010/main" val="2583209070"/>
+      </p:ext>
+    </p:extLst>
+  </p:cSld>
+  <p:clrMapOvr>
+    <a:masterClrMapping/>
+  </p:clrMapOvr>
+</p:sld>
+</file>
+
+<file path=ppt/slides/slide3.xml><?xml version="1.0" encoding="utf-8"?>
+<p:sld xmlns:a="http://schemas.openxmlformats.org/drawingml/2006/main" xmlns:r="http://schemas.openxmlformats.org/officeDocument/2006/relationships" xmlns:p="http://schemas.openxmlformats.org/presentationml/2006/main">
+  <p:cSld>
+    <p:spTree>
+      <p:nvGrpSpPr>
+        <p:cNvPr id="1" name=""/>
+        <p:cNvGrpSpPr/>
+        <p:nvPr/>
+      </p:nvGrpSpPr>
+      <p:grpSpPr>
+        <a:xfrm>
+          <a:off x="0" y="0"/>
+          <a:ext cx="0" cy="0"/>
+          <a:chOff x="0" y="0"/>
+          <a:chExt cx="0" cy="0"/>
+        </a:xfrm>
+      </p:grpSpPr>
+      <p:pic>
+        <p:nvPicPr>
+          <p:cNvPr id="5" name="그림 4">
+            <a:extLst>
+              <a:ext uri="{FF2B5EF4-FFF2-40B4-BE49-F238E27FC236}">
+                <a16:creationId xmlns:a16="http://schemas.microsoft.com/office/drawing/2014/main" id="{EB3154AE-322D-4E54-8E31-E89EB96995BB}"/>
+              </a:ext>
+            </a:extLst>
+          </p:cNvPr>
+          <p:cNvPicPr>
+            <a:picLocks noChangeAspect="1"/>
+          </p:cNvPicPr>
+          <p:nvPr/>
+        </p:nvPicPr>
+        <p:blipFill>
+          <a:blip r:embed="rId2">
+            <a:extLst>
+              <a:ext uri="{28A0092B-C50C-407E-A947-70E740481C1C}">
+                <a14:useLocalDpi xmlns:a14="http://schemas.microsoft.com/office/drawing/2010/main" val="0"/>
+              </a:ext>
+            </a:extLst>
+          </a:blip>
+          <a:stretch>
+            <a:fillRect/>
+          </a:stretch>
+        </p:blipFill>
+        <p:spPr>
+          <a:xfrm>
+            <a:off x="4423242" y="2859972"/>
+            <a:ext cx="2856313" cy="1322723"/>
+          </a:xfrm>
+          <a:prstGeom prst="rect">
+            <a:avLst/>
+          </a:prstGeom>
+        </p:spPr>
+      </p:pic>
+      <p:grpSp>
+        <p:nvGrpSpPr>
+          <p:cNvPr id="17" name="그룹 16">
+            <a:extLst>
+              <a:ext uri="{FF2B5EF4-FFF2-40B4-BE49-F238E27FC236}">
+                <a16:creationId xmlns:a16="http://schemas.microsoft.com/office/drawing/2014/main" id="{47D8152B-3C4A-4B5A-BF9D-5B3DEC2B7C65}"/>
+              </a:ext>
+            </a:extLst>
+          </p:cNvPr>
+          <p:cNvGrpSpPr/>
+          <p:nvPr/>
+        </p:nvGrpSpPr>
+        <p:grpSpPr>
+          <a:xfrm>
+            <a:off x="4747599" y="4106550"/>
+            <a:ext cx="848412" cy="68580"/>
+            <a:chOff x="4992200" y="3863340"/>
+            <a:chExt cx="848412" cy="68580"/>
+          </a:xfrm>
+        </p:grpSpPr>
+        <p:cxnSp>
+          <p:nvCxnSpPr>
+            <p:cNvPr id="7" name="직선 연결선 6">
+              <a:extLst>
+                <a:ext uri="{FF2B5EF4-FFF2-40B4-BE49-F238E27FC236}">
+                  <a16:creationId xmlns:a16="http://schemas.microsoft.com/office/drawing/2014/main" id="{2A2F3429-150D-4099-9BC2-A0BE8D83C869}"/>
+                </a:ext>
+              </a:extLst>
+            </p:cNvPr>
+            <p:cNvCxnSpPr/>
+            <p:nvPr/>
+          </p:nvCxnSpPr>
+          <p:spPr>
+            <a:xfrm>
+              <a:off x="4992200" y="3897630"/>
+              <a:ext cx="848412" cy="0"/>
+            </a:xfrm>
+            <a:prstGeom prst="line">
+              <a:avLst/>
+            </a:prstGeom>
+            <a:ln w="19050">
+              <a:solidFill>
+                <a:srgbClr val="FF0000"/>
+              </a:solidFill>
+            </a:ln>
+          </p:spPr>
+          <p:style>
+            <a:lnRef idx="1">
+              <a:schemeClr val="accent1"/>
+            </a:lnRef>
+            <a:fillRef idx="0">
+              <a:schemeClr val="accent1"/>
+            </a:fillRef>
+            <a:effectRef idx="0">
+              <a:schemeClr val="accent1"/>
+            </a:effectRef>
+            <a:fontRef idx="minor">
+              <a:schemeClr val="tx1"/>
+            </a:fontRef>
+          </p:style>
+        </p:cxnSp>
+        <p:cxnSp>
+          <p:nvCxnSpPr>
+            <p:cNvPr id="9" name="직선 연결선 8">
+              <a:extLst>
+                <a:ext uri="{FF2B5EF4-FFF2-40B4-BE49-F238E27FC236}">
+                  <a16:creationId xmlns:a16="http://schemas.microsoft.com/office/drawing/2014/main" id="{E0B4C48F-B7CD-466D-ABC6-B14C4A5A0F25}"/>
+                </a:ext>
+              </a:extLst>
+            </p:cNvPr>
+            <p:cNvCxnSpPr>
+              <a:cxnSpLocks/>
+            </p:cNvCxnSpPr>
+            <p:nvPr/>
+          </p:nvCxnSpPr>
+          <p:spPr>
+            <a:xfrm>
+              <a:off x="4992200" y="3863340"/>
+              <a:ext cx="0" cy="68580"/>
+            </a:xfrm>
+            <a:prstGeom prst="line">
+              <a:avLst/>
+            </a:prstGeom>
+            <a:ln w="19050">
+              <a:solidFill>
+                <a:srgbClr val="FF0000"/>
+              </a:solidFill>
+            </a:ln>
+          </p:spPr>
+          <p:style>
+            <a:lnRef idx="1">
+              <a:schemeClr val="accent1"/>
+            </a:lnRef>
+            <a:fillRef idx="0">
+              <a:schemeClr val="accent1"/>
+            </a:fillRef>
+            <a:effectRef idx="0">
+              <a:schemeClr val="accent1"/>
+            </a:effectRef>
+            <a:fontRef idx="minor">
+              <a:schemeClr val="tx1"/>
+            </a:fontRef>
+          </p:style>
+        </p:cxnSp>
+        <p:cxnSp>
+          <p:nvCxnSpPr>
+            <p:cNvPr id="11" name="직선 연결선 10">
+              <a:extLst>
+                <a:ext uri="{FF2B5EF4-FFF2-40B4-BE49-F238E27FC236}">
+                  <a16:creationId xmlns:a16="http://schemas.microsoft.com/office/drawing/2014/main" id="{CFD10BF9-245B-4580-9251-965F1769E5AC}"/>
+                </a:ext>
+              </a:extLst>
+            </p:cNvPr>
+            <p:cNvCxnSpPr>
+              <a:cxnSpLocks/>
+            </p:cNvCxnSpPr>
+            <p:nvPr/>
+          </p:nvCxnSpPr>
+          <p:spPr>
+            <a:xfrm>
+              <a:off x="5840612" y="3863340"/>
+              <a:ext cx="0" cy="68580"/>
+            </a:xfrm>
+            <a:prstGeom prst="line">
+              <a:avLst/>
+            </a:prstGeom>
+            <a:ln w="19050">
+              <a:solidFill>
+                <a:srgbClr val="FF0000"/>
+              </a:solidFill>
+            </a:ln>
+          </p:spPr>
+          <p:style>
+            <a:lnRef idx="1">
+              <a:schemeClr val="accent1"/>
+            </a:lnRef>
+            <a:fillRef idx="0">
+              <a:schemeClr val="accent1"/>
+            </a:fillRef>
+            <a:effectRef idx="0">
+              <a:schemeClr val="accent1"/>
+            </a:effectRef>
+            <a:fontRef idx="minor">
+              <a:schemeClr val="tx1"/>
+            </a:fontRef>
+          </p:style>
+        </p:cxnSp>
+      </p:grpSp>
+      <mc:AlternateContent xmlns:mc="http://schemas.openxmlformats.org/markup-compatibility/2006" xmlns:a14="http://schemas.microsoft.com/office/drawing/2010/main">
+        <mc:Choice Requires="a14">
           <p:sp>
             <p:nvSpPr>
               <p:cNvPr id="18" name="TextBox 17">
@@ -4197,7 +4919,7 @@
             </p:txBody>
           </p:sp>
         </mc:Choice>
-        <mc:Fallback>
+        <mc:Fallback xmlns="">
           <p:sp>
             <p:nvSpPr>
               <p:cNvPr id="18" name="TextBox 17">
@@ -4242,8 +4964,8 @@
           </p:sp>
         </mc:Fallback>
       </mc:AlternateContent>
-      <mc:AlternateContent xmlns:mc="http://schemas.openxmlformats.org/markup-compatibility/2006">
-        <mc:Choice xmlns:a14="http://schemas.microsoft.com/office/drawing/2010/main" Requires="a14">
+      <mc:AlternateContent xmlns:mc="http://schemas.openxmlformats.org/markup-compatibility/2006" xmlns:a14="http://schemas.microsoft.com/office/drawing/2010/main">
+        <mc:Choice Requires="a14">
           <p:sp>
             <p:nvSpPr>
               <p:cNvPr id="20" name="TextBox 19">
@@ -4305,7 +5027,7 @@
             </p:txBody>
           </p:sp>
         </mc:Choice>
-        <mc:Fallback>
+        <mc:Fallback xmlns="">
           <p:sp>
             <p:nvSpPr>
               <p:cNvPr id="20" name="TextBox 19">
@@ -4350,8 +5072,8 @@
           </p:sp>
         </mc:Fallback>
       </mc:AlternateContent>
-      <mc:AlternateContent xmlns:mc="http://schemas.openxmlformats.org/markup-compatibility/2006">
-        <mc:Choice xmlns:a14="http://schemas.microsoft.com/office/drawing/2010/main" Requires="a14">
+      <mc:AlternateContent xmlns:mc="http://schemas.openxmlformats.org/markup-compatibility/2006" xmlns:a14="http://schemas.microsoft.com/office/drawing/2010/main">
+        <mc:Choice Requires="a14">
           <p:sp>
             <p:nvSpPr>
               <p:cNvPr id="21" name="TextBox 20">
@@ -4505,7 +5227,7 @@
             </p:txBody>
           </p:sp>
         </mc:Choice>
-        <mc:Fallback>
+        <mc:Fallback xmlns="">
           <p:sp>
             <p:nvSpPr>
               <p:cNvPr id="21" name="TextBox 20">
@@ -4635,8 +5357,8 @@
           </a:fontRef>
         </p:style>
       </p:cxnSp>
-      <mc:AlternateContent xmlns:mc="http://schemas.openxmlformats.org/markup-compatibility/2006">
-        <mc:Choice xmlns:a14="http://schemas.microsoft.com/office/drawing/2010/main" Requires="a14">
+      <mc:AlternateContent xmlns:mc="http://schemas.openxmlformats.org/markup-compatibility/2006" xmlns:a14="http://schemas.microsoft.com/office/drawing/2010/main">
+        <mc:Choice Requires="a14">
           <p:sp>
             <p:nvSpPr>
               <p:cNvPr id="22" name="TextBox 21">
@@ -4723,7 +5445,7 @@
             </p:txBody>
           </p:sp>
         </mc:Choice>
-        <mc:Fallback>
+        <mc:Fallback xmlns="">
           <p:sp>
             <p:nvSpPr>
               <p:cNvPr id="22" name="TextBox 21">
@@ -4768,8 +5490,8 @@
           </p:sp>
         </mc:Fallback>
       </mc:AlternateContent>
-      <mc:AlternateContent xmlns:mc="http://schemas.openxmlformats.org/markup-compatibility/2006">
-        <mc:Choice xmlns:a14="http://schemas.microsoft.com/office/drawing/2010/main" Requires="a14">
+      <mc:AlternateContent xmlns:mc="http://schemas.openxmlformats.org/markup-compatibility/2006" xmlns:a14="http://schemas.microsoft.com/office/drawing/2010/main">
+        <mc:Choice Requires="a14">
           <p:sp>
             <p:nvSpPr>
               <p:cNvPr id="23" name="TextBox 22">
@@ -4819,7 +5541,7 @@
             </p:txBody>
           </p:sp>
         </mc:Choice>
-        <mc:Fallback>
+        <mc:Fallback xmlns="">
           <p:sp>
             <p:nvSpPr>
               <p:cNvPr id="23" name="TextBox 22">
@@ -4973,7 +5695,1183 @@
 </p:sld>
 </file>
 
-<file path=ppt/slides/slide3.xml><?xml version="1.0" encoding="utf-8"?>
+<file path=ppt/slides/slide4.xml><?xml version="1.0" encoding="utf-8"?>
+<p:sld xmlns:a="http://schemas.openxmlformats.org/drawingml/2006/main" xmlns:r="http://schemas.openxmlformats.org/officeDocument/2006/relationships" xmlns:p="http://schemas.openxmlformats.org/presentationml/2006/main">
+  <p:cSld>
+    <p:spTree>
+      <p:nvGrpSpPr>
+        <p:cNvPr id="1" name=""/>
+        <p:cNvGrpSpPr/>
+        <p:nvPr/>
+      </p:nvGrpSpPr>
+      <p:grpSpPr>
+        <a:xfrm>
+          <a:off x="0" y="0"/>
+          <a:ext cx="0" cy="0"/>
+          <a:chOff x="0" y="0"/>
+          <a:chExt cx="0" cy="0"/>
+        </a:xfrm>
+      </p:grpSpPr>
+      <p:pic>
+        <p:nvPicPr>
+          <p:cNvPr id="5" name="그림 4">
+            <a:extLst>
+              <a:ext uri="{FF2B5EF4-FFF2-40B4-BE49-F238E27FC236}">
+                <a16:creationId xmlns:a16="http://schemas.microsoft.com/office/drawing/2014/main" id="{EB3154AE-322D-4E54-8E31-E89EB96995BB}"/>
+              </a:ext>
+            </a:extLst>
+          </p:cNvPr>
+          <p:cNvPicPr>
+            <a:picLocks noChangeAspect="1"/>
+          </p:cNvPicPr>
+          <p:nvPr/>
+        </p:nvPicPr>
+        <p:blipFill>
+          <a:blip r:embed="rId2">
+            <a:extLst>
+              <a:ext uri="{28A0092B-C50C-407E-A947-70E740481C1C}">
+                <a14:useLocalDpi xmlns:a14="http://schemas.microsoft.com/office/drawing/2010/main" val="0"/>
+              </a:ext>
+            </a:extLst>
+          </a:blip>
+          <a:stretch>
+            <a:fillRect/>
+          </a:stretch>
+        </p:blipFill>
+        <p:spPr>
+          <a:xfrm>
+            <a:off x="4423242" y="2859972"/>
+            <a:ext cx="2856313" cy="1322723"/>
+          </a:xfrm>
+          <a:prstGeom prst="rect">
+            <a:avLst/>
+          </a:prstGeom>
+        </p:spPr>
+      </p:pic>
+      <p:grpSp>
+        <p:nvGrpSpPr>
+          <p:cNvPr id="17" name="그룹 16">
+            <a:extLst>
+              <a:ext uri="{FF2B5EF4-FFF2-40B4-BE49-F238E27FC236}">
+                <a16:creationId xmlns:a16="http://schemas.microsoft.com/office/drawing/2014/main" id="{47D8152B-3C4A-4B5A-BF9D-5B3DEC2B7C65}"/>
+              </a:ext>
+            </a:extLst>
+          </p:cNvPr>
+          <p:cNvGrpSpPr/>
+          <p:nvPr/>
+        </p:nvGrpSpPr>
+        <p:grpSpPr>
+          <a:xfrm>
+            <a:off x="4747599" y="4106550"/>
+            <a:ext cx="848412" cy="68580"/>
+            <a:chOff x="4992200" y="3863340"/>
+            <a:chExt cx="848412" cy="68580"/>
+          </a:xfrm>
+        </p:grpSpPr>
+        <p:cxnSp>
+          <p:nvCxnSpPr>
+            <p:cNvPr id="7" name="직선 연결선 6">
+              <a:extLst>
+                <a:ext uri="{FF2B5EF4-FFF2-40B4-BE49-F238E27FC236}">
+                  <a16:creationId xmlns:a16="http://schemas.microsoft.com/office/drawing/2014/main" id="{2A2F3429-150D-4099-9BC2-A0BE8D83C869}"/>
+                </a:ext>
+              </a:extLst>
+            </p:cNvPr>
+            <p:cNvCxnSpPr/>
+            <p:nvPr/>
+          </p:nvCxnSpPr>
+          <p:spPr>
+            <a:xfrm>
+              <a:off x="4992200" y="3897630"/>
+              <a:ext cx="848412" cy="0"/>
+            </a:xfrm>
+            <a:prstGeom prst="line">
+              <a:avLst/>
+            </a:prstGeom>
+            <a:ln w="19050">
+              <a:solidFill>
+                <a:srgbClr val="FF0000"/>
+              </a:solidFill>
+            </a:ln>
+          </p:spPr>
+          <p:style>
+            <a:lnRef idx="1">
+              <a:schemeClr val="accent1"/>
+            </a:lnRef>
+            <a:fillRef idx="0">
+              <a:schemeClr val="accent1"/>
+            </a:fillRef>
+            <a:effectRef idx="0">
+              <a:schemeClr val="accent1"/>
+            </a:effectRef>
+            <a:fontRef idx="minor">
+              <a:schemeClr val="tx1"/>
+            </a:fontRef>
+          </p:style>
+        </p:cxnSp>
+        <p:cxnSp>
+          <p:nvCxnSpPr>
+            <p:cNvPr id="9" name="직선 연결선 8">
+              <a:extLst>
+                <a:ext uri="{FF2B5EF4-FFF2-40B4-BE49-F238E27FC236}">
+                  <a16:creationId xmlns:a16="http://schemas.microsoft.com/office/drawing/2014/main" id="{E0B4C48F-B7CD-466D-ABC6-B14C4A5A0F25}"/>
+                </a:ext>
+              </a:extLst>
+            </p:cNvPr>
+            <p:cNvCxnSpPr>
+              <a:cxnSpLocks/>
+            </p:cNvCxnSpPr>
+            <p:nvPr/>
+          </p:nvCxnSpPr>
+          <p:spPr>
+            <a:xfrm>
+              <a:off x="4992200" y="3863340"/>
+              <a:ext cx="0" cy="68580"/>
+            </a:xfrm>
+            <a:prstGeom prst="line">
+              <a:avLst/>
+            </a:prstGeom>
+            <a:ln w="19050">
+              <a:solidFill>
+                <a:srgbClr val="FF0000"/>
+              </a:solidFill>
+            </a:ln>
+          </p:spPr>
+          <p:style>
+            <a:lnRef idx="1">
+              <a:schemeClr val="accent1"/>
+            </a:lnRef>
+            <a:fillRef idx="0">
+              <a:schemeClr val="accent1"/>
+            </a:fillRef>
+            <a:effectRef idx="0">
+              <a:schemeClr val="accent1"/>
+            </a:effectRef>
+            <a:fontRef idx="minor">
+              <a:schemeClr val="tx1"/>
+            </a:fontRef>
+          </p:style>
+        </p:cxnSp>
+        <p:cxnSp>
+          <p:nvCxnSpPr>
+            <p:cNvPr id="11" name="직선 연결선 10">
+              <a:extLst>
+                <a:ext uri="{FF2B5EF4-FFF2-40B4-BE49-F238E27FC236}">
+                  <a16:creationId xmlns:a16="http://schemas.microsoft.com/office/drawing/2014/main" id="{CFD10BF9-245B-4580-9251-965F1769E5AC}"/>
+                </a:ext>
+              </a:extLst>
+            </p:cNvPr>
+            <p:cNvCxnSpPr>
+              <a:cxnSpLocks/>
+            </p:cNvCxnSpPr>
+            <p:nvPr/>
+          </p:nvCxnSpPr>
+          <p:spPr>
+            <a:xfrm>
+              <a:off x="5840612" y="3863340"/>
+              <a:ext cx="0" cy="68580"/>
+            </a:xfrm>
+            <a:prstGeom prst="line">
+              <a:avLst/>
+            </a:prstGeom>
+            <a:ln w="19050">
+              <a:solidFill>
+                <a:srgbClr val="FF0000"/>
+              </a:solidFill>
+            </a:ln>
+          </p:spPr>
+          <p:style>
+            <a:lnRef idx="1">
+              <a:schemeClr val="accent1"/>
+            </a:lnRef>
+            <a:fillRef idx="0">
+              <a:schemeClr val="accent1"/>
+            </a:fillRef>
+            <a:effectRef idx="0">
+              <a:schemeClr val="accent1"/>
+            </a:effectRef>
+            <a:fontRef idx="minor">
+              <a:schemeClr val="tx1"/>
+            </a:fontRef>
+          </p:style>
+        </p:cxnSp>
+      </p:grpSp>
+      <mc:AlternateContent xmlns:mc="http://schemas.openxmlformats.org/markup-compatibility/2006" xmlns:a14="http://schemas.microsoft.com/office/drawing/2010/main">
+        <mc:Choice Requires="a14">
+          <p:sp>
+            <p:nvSpPr>
+              <p:cNvPr id="18" name="TextBox 17">
+                <a:extLst>
+                  <a:ext uri="{FF2B5EF4-FFF2-40B4-BE49-F238E27FC236}">
+                    <a16:creationId xmlns:a16="http://schemas.microsoft.com/office/drawing/2014/main" id="{327FCE86-AD27-496A-9CEE-F0763C80365B}"/>
+                  </a:ext>
+                </a:extLst>
+              </p:cNvPr>
+              <p:cNvSpPr txBox="1"/>
+              <p:nvPr/>
+            </p:nvSpPr>
+            <p:spPr>
+              <a:xfrm>
+                <a:off x="4906026" y="4111630"/>
+                <a:ext cx="526041" cy="369332"/>
+              </a:xfrm>
+              <a:prstGeom prst="rect">
+                <a:avLst/>
+              </a:prstGeom>
+              <a:noFill/>
+            </p:spPr>
+            <p:txBody>
+              <a:bodyPr wrap="none" rtlCol="0">
+                <a:spAutoFit/>
+              </a:bodyPr>
+              <a:lstStyle/>
+              <a:p>
+                <a:pPr/>
+                <a14:m>
+                  <m:oMathPara xmlns:m="http://schemas.openxmlformats.org/officeDocument/2006/math">
+                    <m:oMathParaPr>
+                      <m:jc m:val="centerGroup"/>
+                    </m:oMathParaPr>
+                    <m:oMath xmlns:m="http://schemas.openxmlformats.org/officeDocument/2006/math">
+                      <m:d>
+                        <m:dPr>
+                          <m:begChr m:val="|"/>
+                          <m:endChr m:val="|"/>
+                          <m:ctrlPr>
+                            <a:rPr lang="en-US" altLang="ko-KR" b="0" i="1" smtClean="0">
+                              <a:latin typeface="Cambria Math" panose="02040503050406030204" pitchFamily="18" charset="0"/>
+                            </a:rPr>
+                          </m:ctrlPr>
+                        </m:dPr>
+                        <m:e>
+                          <m:acc>
+                            <m:accPr>
+                              <m:chr m:val="⃗"/>
+                              <m:ctrlPr>
+                                <a:rPr lang="en-US" altLang="ko-KR" b="0" i="1" smtClean="0">
+                                  <a:latin typeface="Cambria Math" panose="02040503050406030204" pitchFamily="18" charset="0"/>
+                                </a:rPr>
+                              </m:ctrlPr>
+                            </m:accPr>
+                            <m:e>
+                              <m:r>
+                                <a:rPr lang="en-US" altLang="ko-KR" b="0" i="1" smtClean="0">
+                                  <a:latin typeface="Cambria Math" panose="02040503050406030204" pitchFamily="18" charset="0"/>
+                                </a:rPr>
+                                <m:t>𝑠</m:t>
+                              </m:r>
+                            </m:e>
+                          </m:acc>
+                        </m:e>
+                      </m:d>
+                    </m:oMath>
+                  </m:oMathPara>
+                </a14:m>
+                <a:endParaRPr lang="ko-KR" altLang="en-US" dirty="0"/>
+              </a:p>
+            </p:txBody>
+          </p:sp>
+        </mc:Choice>
+        <mc:Fallback xmlns="">
+          <p:sp>
+            <p:nvSpPr>
+              <p:cNvPr id="18" name="TextBox 17">
+                <a:extLst>
+                  <a:ext uri="{FF2B5EF4-FFF2-40B4-BE49-F238E27FC236}">
+                    <a16:creationId xmlns:a16="http://schemas.microsoft.com/office/drawing/2014/main" id="{327FCE86-AD27-496A-9CEE-F0763C80365B}"/>
+                  </a:ext>
+                </a:extLst>
+              </p:cNvPr>
+              <p:cNvSpPr txBox="1">
+                <a:spLocks noRot="1" noChangeAspect="1" noMove="1" noResize="1" noEditPoints="1" noAdjustHandles="1" noChangeArrowheads="1" noChangeShapeType="1" noTextEdit="1"/>
+              </p:cNvSpPr>
+              <p:nvPr/>
+            </p:nvSpPr>
+            <p:spPr>
+              <a:xfrm>
+                <a:off x="4906026" y="4111630"/>
+                <a:ext cx="526041" cy="369332"/>
+              </a:xfrm>
+              <a:prstGeom prst="rect">
+                <a:avLst/>
+              </a:prstGeom>
+              <a:blipFill>
+                <a:blip r:embed="rId3"/>
+                <a:stretch>
+                  <a:fillRect t="-19672" r="-33721"/>
+                </a:stretch>
+              </a:blipFill>
+            </p:spPr>
+            <p:txBody>
+              <a:bodyPr/>
+              <a:lstStyle/>
+              <a:p>
+                <a:r>
+                  <a:rPr lang="ko-KR" altLang="en-US">
+                    <a:noFill/>
+                  </a:rPr>
+                  <a:t> </a:t>
+                </a:r>
+              </a:p>
+            </p:txBody>
+          </p:sp>
+        </mc:Fallback>
+      </mc:AlternateContent>
+      <mc:AlternateContent xmlns:mc="http://schemas.openxmlformats.org/markup-compatibility/2006" xmlns:a14="http://schemas.microsoft.com/office/drawing/2010/main">
+        <mc:Choice Requires="a14">
+          <p:sp>
+            <p:nvSpPr>
+              <p:cNvPr id="20" name="TextBox 19">
+                <a:extLst>
+                  <a:ext uri="{FF2B5EF4-FFF2-40B4-BE49-F238E27FC236}">
+                    <a16:creationId xmlns:a16="http://schemas.microsoft.com/office/drawing/2014/main" id="{FA503A6F-2B04-48EE-B664-12D6C892312B}"/>
+                  </a:ext>
+                </a:extLst>
+              </p:cNvPr>
+              <p:cNvSpPr txBox="1"/>
+              <p:nvPr/>
+            </p:nvSpPr>
+            <p:spPr>
+              <a:xfrm>
+                <a:off x="7378693" y="2649713"/>
+                <a:ext cx="416524" cy="402931"/>
+              </a:xfrm>
+              <a:prstGeom prst="rect">
+                <a:avLst/>
+              </a:prstGeom>
+              <a:noFill/>
+            </p:spPr>
+            <p:txBody>
+              <a:bodyPr wrap="none" rtlCol="0">
+                <a:spAutoFit/>
+              </a:bodyPr>
+              <a:lstStyle/>
+              <a:p>
+                <a:pPr/>
+                <a14:m>
+                  <m:oMathPara xmlns:m="http://schemas.openxmlformats.org/officeDocument/2006/math">
+                    <m:oMathParaPr>
+                      <m:jc m:val="centerGroup"/>
+                    </m:oMathParaPr>
+                    <m:oMath xmlns:m="http://schemas.openxmlformats.org/officeDocument/2006/math">
+                      <m:acc>
+                        <m:accPr>
+                          <m:chr m:val="⃗"/>
+                          <m:ctrlPr>
+                            <a:rPr lang="en-US" altLang="ko-KR" b="0" i="1" smtClean="0">
+                              <a:latin typeface="Cambria Math" panose="02040503050406030204" pitchFamily="18" charset="0"/>
+                            </a:rPr>
+                          </m:ctrlPr>
+                        </m:accPr>
+                        <m:e>
+                          <m:r>
+                            <a:rPr lang="en-US" altLang="ko-KR" b="0" i="1" smtClean="0">
+                              <a:latin typeface="Cambria Math" panose="02040503050406030204" pitchFamily="18" charset="0"/>
+                            </a:rPr>
+                            <m:t>𝐹</m:t>
+                          </m:r>
+                        </m:e>
+                      </m:acc>
+                    </m:oMath>
+                  </m:oMathPara>
+                </a14:m>
+                <a:endParaRPr lang="ko-KR" altLang="en-US" dirty="0"/>
+              </a:p>
+            </p:txBody>
+          </p:sp>
+        </mc:Choice>
+        <mc:Fallback xmlns="">
+          <p:sp>
+            <p:nvSpPr>
+              <p:cNvPr id="20" name="TextBox 19">
+                <a:extLst>
+                  <a:ext uri="{FF2B5EF4-FFF2-40B4-BE49-F238E27FC236}">
+                    <a16:creationId xmlns:a16="http://schemas.microsoft.com/office/drawing/2014/main" id="{FA503A6F-2B04-48EE-B664-12D6C892312B}"/>
+                  </a:ext>
+                </a:extLst>
+              </p:cNvPr>
+              <p:cNvSpPr txBox="1">
+                <a:spLocks noRot="1" noChangeAspect="1" noMove="1" noResize="1" noEditPoints="1" noAdjustHandles="1" noChangeArrowheads="1" noChangeShapeType="1" noTextEdit="1"/>
+              </p:cNvSpPr>
+              <p:nvPr/>
+            </p:nvSpPr>
+            <p:spPr>
+              <a:xfrm>
+                <a:off x="7378693" y="2649713"/>
+                <a:ext cx="416524" cy="402931"/>
+              </a:xfrm>
+              <a:prstGeom prst="rect">
+                <a:avLst/>
+              </a:prstGeom>
+              <a:blipFill>
+                <a:blip r:embed="rId4"/>
+                <a:stretch>
+                  <a:fillRect t="-21212" r="-30435"/>
+                </a:stretch>
+              </a:blipFill>
+            </p:spPr>
+            <p:txBody>
+              <a:bodyPr/>
+              <a:lstStyle/>
+              <a:p>
+                <a:r>
+                  <a:rPr lang="ko-KR" altLang="en-US">
+                    <a:noFill/>
+                  </a:rPr>
+                  <a:t> </a:t>
+                </a:r>
+              </a:p>
+            </p:txBody>
+          </p:sp>
+        </mc:Fallback>
+      </mc:AlternateContent>
+      <mc:AlternateContent xmlns:mc="http://schemas.openxmlformats.org/markup-compatibility/2006" xmlns:a14="http://schemas.microsoft.com/office/drawing/2010/main">
+        <mc:Choice Requires="a14">
+          <p:sp>
+            <p:nvSpPr>
+              <p:cNvPr id="21" name="TextBox 20">
+                <a:extLst>
+                  <a:ext uri="{FF2B5EF4-FFF2-40B4-BE49-F238E27FC236}">
+                    <a16:creationId xmlns:a16="http://schemas.microsoft.com/office/drawing/2014/main" id="{0A967918-DD4B-454C-A892-2DC96F138395}"/>
+                  </a:ext>
+                </a:extLst>
+              </p:cNvPr>
+              <p:cNvSpPr txBox="1"/>
+              <p:nvPr/>
+            </p:nvSpPr>
+            <p:spPr>
+              <a:xfrm>
+                <a:off x="4518639" y="2383135"/>
+                <a:ext cx="2555956" cy="425181"/>
+              </a:xfrm>
+              <a:prstGeom prst="rect">
+                <a:avLst/>
+              </a:prstGeom>
+              <a:noFill/>
+            </p:spPr>
+            <p:txBody>
+              <a:bodyPr wrap="none" rtlCol="0">
+                <a:spAutoFit/>
+              </a:bodyPr>
+              <a:lstStyle/>
+              <a:p>
+                <a:pPr/>
+                <a14:m>
+                  <m:oMathPara xmlns:m="http://schemas.openxmlformats.org/officeDocument/2006/math">
+                    <m:oMathParaPr>
+                      <m:jc m:val="centerGroup"/>
+                    </m:oMathParaPr>
+                    <m:oMath xmlns:m="http://schemas.openxmlformats.org/officeDocument/2006/math">
+                      <m:r>
+                        <a:rPr lang="en-US" altLang="ko-KR" b="0" i="1" smtClean="0">
+                          <a:latin typeface="Cambria Math" panose="02040503050406030204" pitchFamily="18" charset="0"/>
+                        </a:rPr>
+                        <m:t>𝑊</m:t>
+                      </m:r>
+                      <m:r>
+                        <a:rPr lang="en-US" altLang="ko-KR" b="0" i="1" smtClean="0">
+                          <a:latin typeface="Cambria Math" panose="02040503050406030204" pitchFamily="18" charset="0"/>
+                        </a:rPr>
+                        <m:t>=</m:t>
+                      </m:r>
+                      <m:r>
+                        <a:rPr lang="en-US" altLang="ko-KR" b="0" i="1" smtClean="0">
+                          <a:latin typeface="Cambria Math" panose="02040503050406030204" pitchFamily="18" charset="0"/>
+                        </a:rPr>
+                        <m:t>𝐹</m:t>
+                      </m:r>
+                      <m:r>
+                        <a:rPr lang="en-US" altLang="ko-KR" b="0" i="1" smtClean="0">
+                          <a:latin typeface="Cambria Math" panose="02040503050406030204" pitchFamily="18" charset="0"/>
+                        </a:rPr>
+                        <m:t>⋅</m:t>
+                      </m:r>
+                      <m:r>
+                        <a:rPr lang="en-US" altLang="ko-KR" b="0" i="1" smtClean="0">
+                          <a:latin typeface="Cambria Math" panose="02040503050406030204" pitchFamily="18" charset="0"/>
+                        </a:rPr>
+                        <m:t>𝑠</m:t>
+                      </m:r>
+                      <m:r>
+                        <a:rPr lang="en-US" altLang="ko-KR" b="0" i="1" smtClean="0">
+                          <a:latin typeface="Cambria Math" panose="02040503050406030204" pitchFamily="18" charset="0"/>
+                        </a:rPr>
+                        <m:t>=</m:t>
+                      </m:r>
+                      <m:d>
+                        <m:dPr>
+                          <m:begChr m:val="|"/>
+                          <m:endChr m:val="|"/>
+                          <m:ctrlPr>
+                            <a:rPr lang="en-US" altLang="ko-KR" b="0" i="1" smtClean="0">
+                              <a:latin typeface="Cambria Math" panose="02040503050406030204" pitchFamily="18" charset="0"/>
+                            </a:rPr>
+                          </m:ctrlPr>
+                        </m:dPr>
+                        <m:e>
+                          <m:acc>
+                            <m:accPr>
+                              <m:chr m:val="⃗"/>
+                              <m:ctrlPr>
+                                <a:rPr lang="en-US" altLang="ko-KR" b="0" i="1" smtClean="0">
+                                  <a:latin typeface="Cambria Math" panose="02040503050406030204" pitchFamily="18" charset="0"/>
+                                </a:rPr>
+                              </m:ctrlPr>
+                            </m:accPr>
+                            <m:e>
+                              <m:r>
+                                <a:rPr lang="en-US" altLang="ko-KR" b="0" i="1" smtClean="0">
+                                  <a:latin typeface="Cambria Math" panose="02040503050406030204" pitchFamily="18" charset="0"/>
+                                </a:rPr>
+                                <m:t>𝐹</m:t>
+                              </m:r>
+                            </m:e>
+                          </m:acc>
+                        </m:e>
+                      </m:d>
+                      <m:d>
+                        <m:dPr>
+                          <m:begChr m:val="|"/>
+                          <m:endChr m:val="|"/>
+                          <m:ctrlPr>
+                            <a:rPr lang="en-US" altLang="ko-KR" b="0" i="1" smtClean="0">
+                              <a:latin typeface="Cambria Math" panose="02040503050406030204" pitchFamily="18" charset="0"/>
+                            </a:rPr>
+                          </m:ctrlPr>
+                        </m:dPr>
+                        <m:e>
+                          <m:acc>
+                            <m:accPr>
+                              <m:chr m:val="⃗"/>
+                              <m:ctrlPr>
+                                <a:rPr lang="en-US" altLang="ko-KR" b="0" i="1" smtClean="0">
+                                  <a:latin typeface="Cambria Math" panose="02040503050406030204" pitchFamily="18" charset="0"/>
+                                </a:rPr>
+                              </m:ctrlPr>
+                            </m:accPr>
+                            <m:e>
+                              <m:r>
+                                <a:rPr lang="en-US" altLang="ko-KR" b="0" i="1" smtClean="0">
+                                  <a:latin typeface="Cambria Math" panose="02040503050406030204" pitchFamily="18" charset="0"/>
+                                </a:rPr>
+                                <m:t>𝑠</m:t>
+                              </m:r>
+                            </m:e>
+                          </m:acc>
+                        </m:e>
+                      </m:d>
+                      <m:r>
+                        <a:rPr lang="en-US" altLang="ko-KR" b="0" i="1" smtClean="0">
+                          <a:latin typeface="Cambria Math" panose="02040503050406030204" pitchFamily="18" charset="0"/>
+                        </a:rPr>
+                        <m:t>𝑐𝑜𝑠</m:t>
+                      </m:r>
+                      <m:r>
+                        <a:rPr lang="en-US" altLang="ko-KR" b="0" i="1" smtClean="0">
+                          <a:latin typeface="Cambria Math" panose="02040503050406030204" pitchFamily="18" charset="0"/>
+                        </a:rPr>
+                        <m:t>𝜃</m:t>
+                      </m:r>
+                    </m:oMath>
+                  </m:oMathPara>
+                </a14:m>
+                <a:endParaRPr lang="ko-KR" altLang="en-US" dirty="0"/>
+              </a:p>
+            </p:txBody>
+          </p:sp>
+        </mc:Choice>
+        <mc:Fallback xmlns="">
+          <p:sp>
+            <p:nvSpPr>
+              <p:cNvPr id="21" name="TextBox 20">
+                <a:extLst>
+                  <a:ext uri="{FF2B5EF4-FFF2-40B4-BE49-F238E27FC236}">
+                    <a16:creationId xmlns:a16="http://schemas.microsoft.com/office/drawing/2014/main" id="{0A967918-DD4B-454C-A892-2DC96F138395}"/>
+                  </a:ext>
+                </a:extLst>
+              </p:cNvPr>
+              <p:cNvSpPr txBox="1">
+                <a:spLocks noRot="1" noChangeAspect="1" noMove="1" noResize="1" noEditPoints="1" noAdjustHandles="1" noChangeArrowheads="1" noChangeShapeType="1" noTextEdit="1"/>
+              </p:cNvSpPr>
+              <p:nvPr/>
+            </p:nvSpPr>
+            <p:spPr>
+              <a:xfrm>
+                <a:off x="4518639" y="2383135"/>
+                <a:ext cx="2555956" cy="425181"/>
+              </a:xfrm>
+              <a:prstGeom prst="rect">
+                <a:avLst/>
+              </a:prstGeom>
+              <a:blipFill>
+                <a:blip r:embed="rId5"/>
+                <a:stretch>
+                  <a:fillRect t="-20000"/>
+                </a:stretch>
+              </a:blipFill>
+            </p:spPr>
+            <p:txBody>
+              <a:bodyPr/>
+              <a:lstStyle/>
+              <a:p>
+                <a:r>
+                  <a:rPr lang="ko-KR" altLang="en-US">
+                    <a:noFill/>
+                  </a:rPr>
+                  <a:t> </a:t>
+                </a:r>
+              </a:p>
+            </p:txBody>
+          </p:sp>
+        </mc:Fallback>
+      </mc:AlternateContent>
+      <p:cxnSp>
+        <p:nvCxnSpPr>
+          <p:cNvPr id="3" name="직선 화살표 연결선 2">
+            <a:extLst>
+              <a:ext uri="{FF2B5EF4-FFF2-40B4-BE49-F238E27FC236}">
+                <a16:creationId xmlns:a16="http://schemas.microsoft.com/office/drawing/2014/main" id="{0BDDFAC2-C2C7-40E7-B9B3-A393EE9EA058}"/>
+              </a:ext>
+            </a:extLst>
+          </p:cNvPr>
+          <p:cNvCxnSpPr>
+            <a:cxnSpLocks/>
+          </p:cNvCxnSpPr>
+          <p:nvPr/>
+        </p:nvCxnSpPr>
+        <p:spPr>
+          <a:xfrm flipV="1">
+            <a:off x="7071293" y="2532754"/>
+            <a:ext cx="1242127" cy="850526"/>
+          </a:xfrm>
+          <a:prstGeom prst="straightConnector1">
+            <a:avLst/>
+          </a:prstGeom>
+          <a:ln w="19050">
+            <a:solidFill>
+              <a:schemeClr val="accent2"/>
+            </a:solidFill>
+            <a:tailEnd type="triangle"/>
+          </a:ln>
+        </p:spPr>
+        <p:style>
+          <a:lnRef idx="1">
+            <a:schemeClr val="accent1"/>
+          </a:lnRef>
+          <a:fillRef idx="0">
+            <a:schemeClr val="accent1"/>
+          </a:fillRef>
+          <a:effectRef idx="0">
+            <a:schemeClr val="accent1"/>
+          </a:effectRef>
+          <a:fontRef idx="minor">
+            <a:schemeClr val="tx1"/>
+          </a:fontRef>
+        </p:style>
+      </p:cxnSp>
+      <p:cxnSp>
+        <p:nvCxnSpPr>
+          <p:cNvPr id="13" name="직선 화살표 연결선 12">
+            <a:extLst>
+              <a:ext uri="{FF2B5EF4-FFF2-40B4-BE49-F238E27FC236}">
+                <a16:creationId xmlns:a16="http://schemas.microsoft.com/office/drawing/2014/main" id="{8F4D6B60-B0BE-47C9-9E57-83614E2FD670}"/>
+              </a:ext>
+            </a:extLst>
+          </p:cNvPr>
+          <p:cNvCxnSpPr>
+            <a:cxnSpLocks/>
+          </p:cNvCxnSpPr>
+          <p:nvPr/>
+        </p:nvCxnSpPr>
+        <p:spPr>
+          <a:xfrm flipV="1">
+            <a:off x="7071293" y="3383281"/>
+            <a:ext cx="1242127" cy="1"/>
+          </a:xfrm>
+          <a:prstGeom prst="straightConnector1">
+            <a:avLst/>
+          </a:prstGeom>
+          <a:ln w="19050">
+            <a:tailEnd type="triangle"/>
+          </a:ln>
+        </p:spPr>
+        <p:style>
+          <a:lnRef idx="1">
+            <a:schemeClr val="accent1"/>
+          </a:lnRef>
+          <a:fillRef idx="0">
+            <a:schemeClr val="accent1"/>
+          </a:fillRef>
+          <a:effectRef idx="0">
+            <a:schemeClr val="accent1"/>
+          </a:effectRef>
+          <a:fontRef idx="minor">
+            <a:schemeClr val="tx1"/>
+          </a:fontRef>
+        </p:style>
+      </p:cxnSp>
+      <mc:AlternateContent xmlns:mc="http://schemas.openxmlformats.org/markup-compatibility/2006" xmlns:a14="http://schemas.microsoft.com/office/drawing/2010/main">
+        <mc:Choice Requires="a14">
+          <p:sp>
+            <p:nvSpPr>
+              <p:cNvPr id="22" name="TextBox 21">
+                <a:extLst>
+                  <a:ext uri="{FF2B5EF4-FFF2-40B4-BE49-F238E27FC236}">
+                    <a16:creationId xmlns:a16="http://schemas.microsoft.com/office/drawing/2014/main" id="{6C1B976E-E439-4322-9004-7499B7A48E4C}"/>
+                  </a:ext>
+                </a:extLst>
+              </p:cNvPr>
+              <p:cNvSpPr txBox="1"/>
+              <p:nvPr/>
+            </p:nvSpPr>
+            <p:spPr>
+              <a:xfrm>
+                <a:off x="7177582" y="3356575"/>
+                <a:ext cx="1035796" cy="425181"/>
+              </a:xfrm>
+              <a:prstGeom prst="rect">
+                <a:avLst/>
+              </a:prstGeom>
+              <a:noFill/>
+            </p:spPr>
+            <p:txBody>
+              <a:bodyPr wrap="none" rtlCol="0">
+                <a:spAutoFit/>
+              </a:bodyPr>
+              <a:lstStyle/>
+              <a:p>
+                <a:pPr/>
+                <a14:m>
+                  <m:oMathPara xmlns:m="http://schemas.openxmlformats.org/officeDocument/2006/math">
+                    <m:oMathParaPr>
+                      <m:jc m:val="centerGroup"/>
+                    </m:oMathParaPr>
+                    <m:oMath xmlns:m="http://schemas.openxmlformats.org/officeDocument/2006/math">
+                      <m:d>
+                        <m:dPr>
+                          <m:begChr m:val="|"/>
+                          <m:endChr m:val="|"/>
+                          <m:ctrlPr>
+                            <a:rPr lang="en-US" altLang="ko-KR" b="0" i="1" smtClean="0">
+                              <a:latin typeface="Cambria Math" panose="02040503050406030204" pitchFamily="18" charset="0"/>
+                            </a:rPr>
+                          </m:ctrlPr>
+                        </m:dPr>
+                        <m:e>
+                          <m:acc>
+                            <m:accPr>
+                              <m:chr m:val="⃗"/>
+                              <m:ctrlPr>
+                                <a:rPr lang="en-US" altLang="ko-KR" b="0" i="1" smtClean="0">
+                                  <a:latin typeface="Cambria Math" panose="02040503050406030204" pitchFamily="18" charset="0"/>
+                                </a:rPr>
+                              </m:ctrlPr>
+                            </m:accPr>
+                            <m:e>
+                              <m:r>
+                                <a:rPr lang="en-US" altLang="ko-KR" b="0" i="1" smtClean="0">
+                                  <a:latin typeface="Cambria Math" panose="02040503050406030204" pitchFamily="18" charset="0"/>
+                                </a:rPr>
+                                <m:t>𝐹</m:t>
+                              </m:r>
+                            </m:e>
+                          </m:acc>
+                        </m:e>
+                      </m:d>
+                      <m:r>
+                        <a:rPr lang="en-US" altLang="ko-KR" b="0" i="1" smtClean="0">
+                          <a:latin typeface="Cambria Math" panose="02040503050406030204" pitchFamily="18" charset="0"/>
+                        </a:rPr>
+                        <m:t>𝑐𝑜𝑠</m:t>
+                      </m:r>
+                      <m:r>
+                        <a:rPr lang="en-US" altLang="ko-KR" b="0" i="1" smtClean="0">
+                          <a:latin typeface="Cambria Math" panose="02040503050406030204" pitchFamily="18" charset="0"/>
+                        </a:rPr>
+                        <m:t>𝜃</m:t>
+                      </m:r>
+                    </m:oMath>
+                  </m:oMathPara>
+                </a14:m>
+                <a:endParaRPr lang="ko-KR" altLang="en-US" dirty="0"/>
+              </a:p>
+            </p:txBody>
+          </p:sp>
+        </mc:Choice>
+        <mc:Fallback xmlns="">
+          <p:sp>
+            <p:nvSpPr>
+              <p:cNvPr id="22" name="TextBox 21">
+                <a:extLst>
+                  <a:ext uri="{FF2B5EF4-FFF2-40B4-BE49-F238E27FC236}">
+                    <a16:creationId xmlns:a16="http://schemas.microsoft.com/office/drawing/2014/main" id="{6C1B976E-E439-4322-9004-7499B7A48E4C}"/>
+                  </a:ext>
+                </a:extLst>
+              </p:cNvPr>
+              <p:cNvSpPr txBox="1">
+                <a:spLocks noRot="1" noChangeAspect="1" noMove="1" noResize="1" noEditPoints="1" noAdjustHandles="1" noChangeArrowheads="1" noChangeShapeType="1" noTextEdit="1"/>
+              </p:cNvSpPr>
+              <p:nvPr/>
+            </p:nvSpPr>
+            <p:spPr>
+              <a:xfrm>
+                <a:off x="7177582" y="3356575"/>
+                <a:ext cx="1035796" cy="425181"/>
+              </a:xfrm>
+              <a:prstGeom prst="rect">
+                <a:avLst/>
+              </a:prstGeom>
+              <a:blipFill>
+                <a:blip r:embed="rId6"/>
+                <a:stretch>
+                  <a:fillRect t="-20290"/>
+                </a:stretch>
+              </a:blipFill>
+            </p:spPr>
+            <p:txBody>
+              <a:bodyPr/>
+              <a:lstStyle/>
+              <a:p>
+                <a:r>
+                  <a:rPr lang="ko-KR" altLang="en-US">
+                    <a:noFill/>
+                  </a:rPr>
+                  <a:t> </a:t>
+                </a:r>
+              </a:p>
+            </p:txBody>
+          </p:sp>
+        </mc:Fallback>
+      </mc:AlternateContent>
+      <mc:AlternateContent xmlns:mc="http://schemas.openxmlformats.org/markup-compatibility/2006" xmlns:a14="http://schemas.microsoft.com/office/drawing/2010/main">
+        <mc:Choice Requires="a14">
+          <p:sp>
+            <p:nvSpPr>
+              <p:cNvPr id="23" name="TextBox 22">
+                <a:extLst>
+                  <a:ext uri="{FF2B5EF4-FFF2-40B4-BE49-F238E27FC236}">
+                    <a16:creationId xmlns:a16="http://schemas.microsoft.com/office/drawing/2014/main" id="{D58AAE64-5503-48A2-9A56-D65E1E45BA01}"/>
+                  </a:ext>
+                </a:extLst>
+              </p:cNvPr>
+              <p:cNvSpPr txBox="1"/>
+              <p:nvPr/>
+            </p:nvSpPr>
+            <p:spPr>
+              <a:xfrm>
+                <a:off x="7147489" y="3169602"/>
+                <a:ext cx="330219" cy="276999"/>
+              </a:xfrm>
+              <a:prstGeom prst="rect">
+                <a:avLst/>
+              </a:prstGeom>
+              <a:noFill/>
+            </p:spPr>
+            <p:txBody>
+              <a:bodyPr wrap="none" rtlCol="0">
+                <a:spAutoFit/>
+              </a:bodyPr>
+              <a:lstStyle/>
+              <a:p>
+                <a:pPr/>
+                <a14:m>
+                  <m:oMathPara xmlns:m="http://schemas.openxmlformats.org/officeDocument/2006/math">
+                    <m:oMathParaPr>
+                      <m:jc m:val="centerGroup"/>
+                    </m:oMathParaPr>
+                    <m:oMath xmlns:m="http://schemas.openxmlformats.org/officeDocument/2006/math">
+                      <m:r>
+                        <a:rPr lang="en-US" altLang="ko-KR" sz="1200" b="0" i="1" smtClean="0">
+                          <a:latin typeface="Cambria Math" panose="02040503050406030204" pitchFamily="18" charset="0"/>
+                        </a:rPr>
+                        <m:t>𝜃</m:t>
+                      </m:r>
+                    </m:oMath>
+                  </m:oMathPara>
+                </a14:m>
+                <a:endParaRPr lang="ko-KR" altLang="en-US" sz="1200" dirty="0"/>
+              </a:p>
+            </p:txBody>
+          </p:sp>
+        </mc:Choice>
+        <mc:Fallback xmlns="">
+          <p:sp>
+            <p:nvSpPr>
+              <p:cNvPr id="23" name="TextBox 22">
+                <a:extLst>
+                  <a:ext uri="{FF2B5EF4-FFF2-40B4-BE49-F238E27FC236}">
+                    <a16:creationId xmlns:a16="http://schemas.microsoft.com/office/drawing/2014/main" id="{D58AAE64-5503-48A2-9A56-D65E1E45BA01}"/>
+                  </a:ext>
+                </a:extLst>
+              </p:cNvPr>
+              <p:cNvSpPr txBox="1">
+                <a:spLocks noRot="1" noChangeAspect="1" noMove="1" noResize="1" noEditPoints="1" noAdjustHandles="1" noChangeArrowheads="1" noChangeShapeType="1" noTextEdit="1"/>
+              </p:cNvSpPr>
+              <p:nvPr/>
+            </p:nvSpPr>
+            <p:spPr>
+              <a:xfrm>
+                <a:off x="7147489" y="3169602"/>
+                <a:ext cx="330219" cy="276999"/>
+              </a:xfrm>
+              <a:prstGeom prst="rect">
+                <a:avLst/>
+              </a:prstGeom>
+              <a:blipFill>
+                <a:blip r:embed="rId7"/>
+                <a:stretch>
+                  <a:fillRect/>
+                </a:stretch>
+              </a:blipFill>
+            </p:spPr>
+            <p:txBody>
+              <a:bodyPr/>
+              <a:lstStyle/>
+              <a:p>
+                <a:r>
+                  <a:rPr lang="ko-KR" altLang="en-US">
+                    <a:noFill/>
+                  </a:rPr>
+                  <a:t> </a:t>
+                </a:r>
+              </a:p>
+            </p:txBody>
+          </p:sp>
+        </mc:Fallback>
+      </mc:AlternateContent>
+      <p:sp>
+        <p:nvSpPr>
+          <p:cNvPr id="12" name="원호 11">
+            <a:extLst>
+              <a:ext uri="{FF2B5EF4-FFF2-40B4-BE49-F238E27FC236}">
+                <a16:creationId xmlns:a16="http://schemas.microsoft.com/office/drawing/2014/main" id="{89BC5A47-1723-498E-8E49-AC986B4EA0A5}"/>
+              </a:ext>
+            </a:extLst>
+          </p:cNvPr>
+          <p:cNvSpPr/>
+          <p:nvPr/>
+        </p:nvSpPr>
+        <p:spPr>
+          <a:xfrm>
+            <a:off x="7038660" y="3285597"/>
+            <a:ext cx="157589" cy="157589"/>
+          </a:xfrm>
+          <a:prstGeom prst="arc">
+            <a:avLst>
+              <a:gd name="adj1" fmla="val 19160594"/>
+              <a:gd name="adj2" fmla="val 596641"/>
+            </a:avLst>
+          </a:prstGeom>
+          <a:ln>
+            <a:solidFill>
+              <a:schemeClr val="tx1"/>
+            </a:solidFill>
+          </a:ln>
+        </p:spPr>
+        <p:style>
+          <a:lnRef idx="1">
+            <a:schemeClr val="accent1"/>
+          </a:lnRef>
+          <a:fillRef idx="0">
+            <a:schemeClr val="accent1"/>
+          </a:fillRef>
+          <a:effectRef idx="0">
+            <a:schemeClr val="accent1"/>
+          </a:effectRef>
+          <a:fontRef idx="minor">
+            <a:schemeClr val="tx1"/>
+          </a:fontRef>
+        </p:style>
+        <p:txBody>
+          <a:bodyPr rtlCol="0" anchor="ctr"/>
+          <a:lstStyle/>
+          <a:p>
+            <a:pPr algn="ctr"/>
+            <a:endParaRPr lang="ko-KR" altLang="en-US"/>
+          </a:p>
+        </p:txBody>
+      </p:sp>
+      <p:cxnSp>
+        <p:nvCxnSpPr>
+          <p:cNvPr id="24" name="직선 연결선 23">
+            <a:extLst>
+              <a:ext uri="{FF2B5EF4-FFF2-40B4-BE49-F238E27FC236}">
+                <a16:creationId xmlns:a16="http://schemas.microsoft.com/office/drawing/2014/main" id="{5A1FCA85-EE75-46B6-8A7A-2E657E7A9E57}"/>
+              </a:ext>
+            </a:extLst>
+          </p:cNvPr>
+          <p:cNvCxnSpPr>
+            <a:cxnSpLocks/>
+          </p:cNvCxnSpPr>
+          <p:nvPr/>
+        </p:nvCxnSpPr>
+        <p:spPr>
+          <a:xfrm>
+            <a:off x="8310880" y="2532754"/>
+            <a:ext cx="0" cy="850526"/>
+          </a:xfrm>
+          <a:prstGeom prst="line">
+            <a:avLst/>
+          </a:prstGeom>
+          <a:ln>
+            <a:solidFill>
+              <a:schemeClr val="tx1"/>
+            </a:solidFill>
+            <a:prstDash val="dashDot"/>
+          </a:ln>
+        </p:spPr>
+        <p:style>
+          <a:lnRef idx="1">
+            <a:schemeClr val="accent1"/>
+          </a:lnRef>
+          <a:fillRef idx="0">
+            <a:schemeClr val="accent1"/>
+          </a:fillRef>
+          <a:effectRef idx="0">
+            <a:schemeClr val="accent1"/>
+          </a:effectRef>
+          <a:fontRef idx="minor">
+            <a:schemeClr val="tx1"/>
+          </a:fontRef>
+        </p:style>
+      </p:cxnSp>
+      <p:pic>
+        <p:nvPicPr>
+          <p:cNvPr id="2" name="그림 4">
+            <a:extLst>
+              <a:ext uri="{FF2B5EF4-FFF2-40B4-BE49-F238E27FC236}">
+                <a16:creationId xmlns:a16="http://schemas.microsoft.com/office/drawing/2014/main" id="{594FA350-07D5-5968-E2D4-1CA951DE3B8B}"/>
+              </a:ext>
+            </a:extLst>
+          </p:cNvPr>
+          <p:cNvPicPr>
+            <a:picLocks noChangeAspect="1"/>
+          </p:cNvPicPr>
+          <p:nvPr/>
+        </p:nvPicPr>
+        <p:blipFill rotWithShape="1">
+          <a:blip r:embed="rId2">
+            <a:extLst>
+              <a:ext uri="{28A0092B-C50C-407E-A947-70E740481C1C}">
+                <a14:useLocalDpi xmlns:a14="http://schemas.microsoft.com/office/drawing/2010/main" val="0"/>
+              </a:ext>
+            </a:extLst>
+          </a:blip>
+          <a:srcRect l="49686" t="79488" r="37060" b="2522"/>
+          <a:stretch/>
+        </p:blipFill>
+        <p:spPr>
+          <a:xfrm>
+            <a:off x="6815837" y="3912251"/>
+            <a:ext cx="378566" cy="237967"/>
+          </a:xfrm>
+          <a:prstGeom prst="rect">
+            <a:avLst/>
+          </a:prstGeom>
+        </p:spPr>
+      </p:pic>
+      <p:sp>
+        <p:nvSpPr>
+          <p:cNvPr id="4" name="Rectangle 3">
+            <a:extLst>
+              <a:ext uri="{FF2B5EF4-FFF2-40B4-BE49-F238E27FC236}">
+                <a16:creationId xmlns:a16="http://schemas.microsoft.com/office/drawing/2014/main" id="{44242033-FE92-54B6-AA97-3A774EBCB6A2}"/>
+              </a:ext>
+            </a:extLst>
+          </p:cNvPr>
+          <p:cNvSpPr/>
+          <p:nvPr/>
+        </p:nvSpPr>
+        <p:spPr>
+          <a:xfrm>
+            <a:off x="6199162" y="2929905"/>
+            <a:ext cx="323557" cy="193123"/>
+          </a:xfrm>
+          <a:prstGeom prst="rect">
+            <a:avLst/>
+          </a:prstGeom>
+          <a:solidFill>
+            <a:schemeClr val="bg1"/>
+          </a:solidFill>
+          <a:ln>
+            <a:noFill/>
+          </a:ln>
+        </p:spPr>
+        <p:style>
+          <a:lnRef idx="2">
+            <a:schemeClr val="accent1">
+              <a:shade val="50000"/>
+            </a:schemeClr>
+          </a:lnRef>
+          <a:fillRef idx="1">
+            <a:schemeClr val="accent1"/>
+          </a:fillRef>
+          <a:effectRef idx="0">
+            <a:schemeClr val="accent1"/>
+          </a:effectRef>
+          <a:fontRef idx="minor">
+            <a:schemeClr val="lt1"/>
+          </a:fontRef>
+        </p:style>
+        <p:txBody>
+          <a:bodyPr rtlCol="0" anchor="ctr"/>
+          <a:lstStyle/>
+          <a:p>
+            <a:pPr algn="ctr"/>
+            <a:endParaRPr lang="en-US"/>
+          </a:p>
+        </p:txBody>
+      </p:sp>
+      <p:sp>
+        <p:nvSpPr>
+          <p:cNvPr id="6" name="TextBox 5">
+            <a:extLst>
+              <a:ext uri="{FF2B5EF4-FFF2-40B4-BE49-F238E27FC236}">
+                <a16:creationId xmlns:a16="http://schemas.microsoft.com/office/drawing/2014/main" id="{E21B973D-A8FA-B217-CE05-3F13DA0CECAD}"/>
+              </a:ext>
+            </a:extLst>
+          </p:cNvPr>
+          <p:cNvSpPr txBox="1"/>
+          <p:nvPr/>
+        </p:nvSpPr>
+        <p:spPr>
+          <a:xfrm>
+            <a:off x="5992839" y="2937362"/>
+            <a:ext cx="618094" cy="246221"/>
+          </a:xfrm>
+          <a:prstGeom prst="rect">
+            <a:avLst/>
+          </a:prstGeom>
+          <a:noFill/>
+        </p:spPr>
+        <p:txBody>
+          <a:bodyPr wrap="square" rtlCol="0">
+            <a:spAutoFit/>
+          </a:bodyPr>
+          <a:lstStyle/>
+          <a:p>
+            <a:pPr algn="ctr"/>
+            <a:r>
+              <a:rPr lang="en-US" sz="1000" dirty="0"/>
+              <a:t>Charles</a:t>
+            </a:r>
+          </a:p>
+        </p:txBody>
+      </p:sp>
+    </p:spTree>
+    <p:extLst>
+      <p:ext uri="{BB962C8B-B14F-4D97-AF65-F5344CB8AC3E}">
+        <p14:creationId xmlns:p14="http://schemas.microsoft.com/office/powerpoint/2010/main" val="3593096969"/>
+      </p:ext>
+    </p:extLst>
+  </p:cSld>
+  <p:clrMapOvr>
+    <a:masterClrMapping/>
+  </p:clrMapOvr>
+</p:sld>
+</file>
+
+<file path=ppt/slides/slide5.xml><?xml version="1.0" encoding="utf-8"?>
 <p:sld xmlns:a="http://schemas.openxmlformats.org/drawingml/2006/main" xmlns:r="http://schemas.openxmlformats.org/officeDocument/2006/relationships" xmlns:p="http://schemas.openxmlformats.org/presentationml/2006/main">
   <p:cSld>
     <p:spTree>
@@ -5117,8 +7015,8 @@
           </a:fontRef>
         </p:style>
       </p:cxnSp>
-      <mc:AlternateContent xmlns:mc="http://schemas.openxmlformats.org/markup-compatibility/2006">
-        <mc:Choice xmlns:a14="http://schemas.microsoft.com/office/drawing/2010/main" Requires="a14">
+      <mc:AlternateContent xmlns:mc="http://schemas.openxmlformats.org/markup-compatibility/2006" xmlns:a14="http://schemas.microsoft.com/office/drawing/2010/main">
+        <mc:Choice Requires="a14">
           <p:sp>
             <p:nvSpPr>
               <p:cNvPr id="8" name="TextBox 7">
@@ -5199,7 +7097,7 @@
             </p:txBody>
           </p:sp>
         </mc:Choice>
-        <mc:Fallback>
+        <mc:Fallback xmlns="">
           <p:sp>
             <p:nvSpPr>
               <p:cNvPr id="8" name="TextBox 7">
@@ -5330,8 +7228,8 @@
           </a:fontRef>
         </p:style>
       </p:cxnSp>
-      <mc:AlternateContent xmlns:mc="http://schemas.openxmlformats.org/markup-compatibility/2006">
-        <mc:Choice xmlns:a14="http://schemas.microsoft.com/office/drawing/2010/main" Requires="a14">
+      <mc:AlternateContent xmlns:mc="http://schemas.openxmlformats.org/markup-compatibility/2006" xmlns:a14="http://schemas.microsoft.com/office/drawing/2010/main">
+        <mc:Choice Requires="a14">
           <p:sp>
             <p:nvSpPr>
               <p:cNvPr id="11" name="TextBox 10">
@@ -5412,7 +7310,7 @@
             </p:txBody>
           </p:sp>
         </mc:Choice>
-        <mc:Fallback>
+        <mc:Fallback xmlns="">
           <p:sp>
             <p:nvSpPr>
               <p:cNvPr id="11" name="TextBox 10">
@@ -5457,8 +7355,8 @@
           </p:sp>
         </mc:Fallback>
       </mc:AlternateContent>
-      <mc:AlternateContent xmlns:mc="http://schemas.openxmlformats.org/markup-compatibility/2006">
-        <mc:Choice xmlns:a14="http://schemas.microsoft.com/office/drawing/2010/main" Requires="a14">
+      <mc:AlternateContent xmlns:mc="http://schemas.openxmlformats.org/markup-compatibility/2006" xmlns:a14="http://schemas.microsoft.com/office/drawing/2010/main">
+        <mc:Choice Requires="a14">
           <p:sp>
             <p:nvSpPr>
               <p:cNvPr id="12" name="TextBox 11">
@@ -5539,7 +7437,7 @@
             </p:txBody>
           </p:sp>
         </mc:Choice>
-        <mc:Fallback>
+        <mc:Fallback xmlns="">
           <p:sp>
             <p:nvSpPr>
               <p:cNvPr id="12" name="TextBox 11">
@@ -5584,8 +7482,8 @@
           </p:sp>
         </mc:Fallback>
       </mc:AlternateContent>
-      <mc:AlternateContent xmlns:mc="http://schemas.openxmlformats.org/markup-compatibility/2006">
-        <mc:Choice xmlns:a14="http://schemas.microsoft.com/office/drawing/2010/main" Requires="a14">
+      <mc:AlternateContent xmlns:mc="http://schemas.openxmlformats.org/markup-compatibility/2006" xmlns:a14="http://schemas.microsoft.com/office/drawing/2010/main">
+        <mc:Choice Requires="a14">
           <p:sp>
             <p:nvSpPr>
               <p:cNvPr id="15" name="TextBox 14">
@@ -5666,7 +7564,7 @@
             </p:txBody>
           </p:sp>
         </mc:Choice>
-        <mc:Fallback>
+        <mc:Fallback xmlns="">
           <p:sp>
             <p:nvSpPr>
               <p:cNvPr id="15" name="TextBox 14">
@@ -5797,8 +7695,8 @@
           </a:fontRef>
         </p:style>
       </p:cxnSp>
-      <mc:AlternateContent xmlns:mc="http://schemas.openxmlformats.org/markup-compatibility/2006">
-        <mc:Choice xmlns:a14="http://schemas.microsoft.com/office/drawing/2010/main" Requires="a14">
+      <mc:AlternateContent xmlns:mc="http://schemas.openxmlformats.org/markup-compatibility/2006" xmlns:a14="http://schemas.microsoft.com/office/drawing/2010/main">
+        <mc:Choice Requires="a14">
           <p:sp>
             <p:nvSpPr>
               <p:cNvPr id="19" name="TextBox 18">
@@ -5867,7 +7765,7 @@
             </p:txBody>
           </p:sp>
         </mc:Choice>
-        <mc:Fallback>
+        <mc:Fallback xmlns="">
           <p:sp>
             <p:nvSpPr>
               <p:cNvPr id="19" name="TextBox 18">
@@ -6008,8 +7906,8 @@
           </a:fontRef>
         </p:style>
       </p:cxnSp>
-      <mc:AlternateContent xmlns:mc="http://schemas.openxmlformats.org/markup-compatibility/2006">
-        <mc:Choice xmlns:a14="http://schemas.microsoft.com/office/drawing/2010/main" Requires="a14">
+      <mc:AlternateContent xmlns:mc="http://schemas.openxmlformats.org/markup-compatibility/2006" xmlns:a14="http://schemas.microsoft.com/office/drawing/2010/main">
+        <mc:Choice Requires="a14">
           <p:sp>
             <p:nvSpPr>
               <p:cNvPr id="22" name="TextBox 21">
@@ -6090,7 +7988,7 @@
             </p:txBody>
           </p:sp>
         </mc:Choice>
-        <mc:Fallback>
+        <mc:Fallback xmlns="">
           <p:sp>
             <p:nvSpPr>
               <p:cNvPr id="22" name="TextBox 21">
@@ -6221,8 +8119,8 @@
           </a:fontRef>
         </p:style>
       </p:cxnSp>
-      <mc:AlternateContent xmlns:mc="http://schemas.openxmlformats.org/markup-compatibility/2006">
-        <mc:Choice xmlns:a14="http://schemas.microsoft.com/office/drawing/2010/main" Requires="a14">
+      <mc:AlternateContent xmlns:mc="http://schemas.openxmlformats.org/markup-compatibility/2006" xmlns:a14="http://schemas.microsoft.com/office/drawing/2010/main">
+        <mc:Choice Requires="a14">
           <p:sp>
             <p:nvSpPr>
               <p:cNvPr id="25" name="TextBox 24">
@@ -6291,7 +8189,7 @@
             </p:txBody>
           </p:sp>
         </mc:Choice>
-        <mc:Fallback>
+        <mc:Fallback xmlns="">
           <p:sp>
             <p:nvSpPr>
               <p:cNvPr id="25" name="TextBox 24">
@@ -6432,8 +8330,8 @@
           </a:fontRef>
         </p:style>
       </p:cxnSp>
-      <mc:AlternateContent xmlns:mc="http://schemas.openxmlformats.org/markup-compatibility/2006">
-        <mc:Choice xmlns:a14="http://schemas.microsoft.com/office/drawing/2010/main" Requires="a14">
+      <mc:AlternateContent xmlns:mc="http://schemas.openxmlformats.org/markup-compatibility/2006" xmlns:a14="http://schemas.microsoft.com/office/drawing/2010/main">
+        <mc:Choice Requires="a14">
           <p:sp>
             <p:nvSpPr>
               <p:cNvPr id="28" name="TextBox 27">
@@ -6514,7 +8412,7 @@
             </p:txBody>
           </p:sp>
         </mc:Choice>
-        <mc:Fallback>
+        <mc:Fallback xmlns="">
           <p:sp>
             <p:nvSpPr>
               <p:cNvPr id="28" name="TextBox 27">
@@ -6645,8 +8543,8 @@
           </a:fontRef>
         </p:style>
       </p:cxnSp>
-      <mc:AlternateContent xmlns:mc="http://schemas.openxmlformats.org/markup-compatibility/2006">
-        <mc:Choice xmlns:a14="http://schemas.microsoft.com/office/drawing/2010/main" Requires="a14">
+      <mc:AlternateContent xmlns:mc="http://schemas.openxmlformats.org/markup-compatibility/2006" xmlns:a14="http://schemas.microsoft.com/office/drawing/2010/main">
+        <mc:Choice Requires="a14">
           <p:sp>
             <p:nvSpPr>
               <p:cNvPr id="31" name="TextBox 30">
@@ -6715,7 +8613,7 @@
             </p:txBody>
           </p:sp>
         </mc:Choice>
-        <mc:Fallback>
+        <mc:Fallback xmlns="">
           <p:sp>
             <p:nvSpPr>
               <p:cNvPr id="31" name="TextBox 30">
@@ -7047,7 +8945,2082 @@
 </p:sld>
 </file>
 
-<file path=ppt/slides/slide4.xml><?xml version="1.0" encoding="utf-8"?>
+<file path=ppt/slides/slide6.xml><?xml version="1.0" encoding="utf-8"?>
+<p:sld xmlns:a="http://schemas.openxmlformats.org/drawingml/2006/main" xmlns:r="http://schemas.openxmlformats.org/officeDocument/2006/relationships" xmlns:p="http://schemas.openxmlformats.org/presentationml/2006/main">
+  <p:cSld>
+    <p:spTree>
+      <p:nvGrpSpPr>
+        <p:cNvPr id="1" name=""/>
+        <p:cNvGrpSpPr/>
+        <p:nvPr/>
+      </p:nvGrpSpPr>
+      <p:grpSpPr>
+        <a:xfrm>
+          <a:off x="0" y="0"/>
+          <a:ext cx="0" cy="0"/>
+          <a:chOff x="0" y="0"/>
+          <a:chExt cx="0" cy="0"/>
+        </a:xfrm>
+      </p:grpSpPr>
+      <p:cxnSp>
+        <p:nvCxnSpPr>
+          <p:cNvPr id="5" name="직선 연결선 4">
+            <a:extLst>
+              <a:ext uri="{FF2B5EF4-FFF2-40B4-BE49-F238E27FC236}">
+                <a16:creationId xmlns:a16="http://schemas.microsoft.com/office/drawing/2014/main" id="{D3FE71D4-393C-4648-8E55-9FE7D857787C}"/>
+              </a:ext>
+            </a:extLst>
+          </p:cNvPr>
+          <p:cNvCxnSpPr/>
+          <p:nvPr/>
+        </p:nvCxnSpPr>
+        <p:spPr>
+          <a:xfrm>
+            <a:off x="2460160" y="3158805"/>
+            <a:ext cx="7271681" cy="0"/>
+          </a:xfrm>
+          <a:prstGeom prst="line">
+            <a:avLst/>
+          </a:prstGeom>
+          <a:ln w="19050">
+            <a:solidFill>
+              <a:schemeClr val="tx1"/>
+            </a:solidFill>
+          </a:ln>
+        </p:spPr>
+        <p:style>
+          <a:lnRef idx="1">
+            <a:schemeClr val="accent1"/>
+          </a:lnRef>
+          <a:fillRef idx="0">
+            <a:schemeClr val="accent1"/>
+          </a:fillRef>
+          <a:effectRef idx="0">
+            <a:schemeClr val="accent1"/>
+          </a:effectRef>
+          <a:fontRef idx="minor">
+            <a:schemeClr val="tx1"/>
+          </a:fontRef>
+        </p:style>
+      </p:cxnSp>
+      <p:cxnSp>
+        <p:nvCxnSpPr>
+          <p:cNvPr id="6" name="직선 연결선 5">
+            <a:extLst>
+              <a:ext uri="{FF2B5EF4-FFF2-40B4-BE49-F238E27FC236}">
+                <a16:creationId xmlns:a16="http://schemas.microsoft.com/office/drawing/2014/main" id="{C03375C5-1560-4337-87DF-455DD291DA5C}"/>
+              </a:ext>
+            </a:extLst>
+          </p:cNvPr>
+          <p:cNvCxnSpPr>
+            <a:cxnSpLocks/>
+          </p:cNvCxnSpPr>
+          <p:nvPr/>
+        </p:nvCxnSpPr>
+        <p:spPr>
+          <a:xfrm>
+            <a:off x="2460160" y="3063240"/>
+            <a:ext cx="0" cy="191130"/>
+          </a:xfrm>
+          <a:prstGeom prst="line">
+            <a:avLst/>
+          </a:prstGeom>
+          <a:ln w="19050">
+            <a:solidFill>
+              <a:schemeClr val="tx1"/>
+            </a:solidFill>
+          </a:ln>
+        </p:spPr>
+        <p:style>
+          <a:lnRef idx="1">
+            <a:schemeClr val="accent1"/>
+          </a:lnRef>
+          <a:fillRef idx="0">
+            <a:schemeClr val="accent1"/>
+          </a:fillRef>
+          <a:effectRef idx="0">
+            <a:schemeClr val="accent1"/>
+          </a:effectRef>
+          <a:fontRef idx="minor">
+            <a:schemeClr val="tx1"/>
+          </a:fontRef>
+        </p:style>
+      </p:cxnSp>
+      <p:cxnSp>
+        <p:nvCxnSpPr>
+          <p:cNvPr id="7" name="직선 연결선 6">
+            <a:extLst>
+              <a:ext uri="{FF2B5EF4-FFF2-40B4-BE49-F238E27FC236}">
+                <a16:creationId xmlns:a16="http://schemas.microsoft.com/office/drawing/2014/main" id="{7AEA28CB-1117-45C8-9EE5-BF08B646A4FF}"/>
+              </a:ext>
+            </a:extLst>
+          </p:cNvPr>
+          <p:cNvCxnSpPr>
+            <a:cxnSpLocks/>
+          </p:cNvCxnSpPr>
+          <p:nvPr/>
+        </p:nvCxnSpPr>
+        <p:spPr>
+          <a:xfrm>
+            <a:off x="9731841" y="3063240"/>
+            <a:ext cx="0" cy="191130"/>
+          </a:xfrm>
+          <a:prstGeom prst="line">
+            <a:avLst/>
+          </a:prstGeom>
+          <a:ln w="19050">
+            <a:solidFill>
+              <a:schemeClr val="tx1"/>
+            </a:solidFill>
+          </a:ln>
+        </p:spPr>
+        <p:style>
+          <a:lnRef idx="1">
+            <a:schemeClr val="accent1"/>
+          </a:lnRef>
+          <a:fillRef idx="0">
+            <a:schemeClr val="accent1"/>
+          </a:fillRef>
+          <a:effectRef idx="0">
+            <a:schemeClr val="accent1"/>
+          </a:effectRef>
+          <a:fontRef idx="minor">
+            <a:schemeClr val="tx1"/>
+          </a:fontRef>
+        </p:style>
+      </p:cxnSp>
+      <mc:AlternateContent xmlns:mc="http://schemas.openxmlformats.org/markup-compatibility/2006" xmlns:a14="http://schemas.microsoft.com/office/drawing/2010/main">
+        <mc:Choice Requires="a14">
+          <p:sp>
+            <p:nvSpPr>
+              <p:cNvPr id="8" name="TextBox 7">
+                <a:extLst>
+                  <a:ext uri="{FF2B5EF4-FFF2-40B4-BE49-F238E27FC236}">
+                    <a16:creationId xmlns:a16="http://schemas.microsoft.com/office/drawing/2014/main" id="{483B975B-B509-4D7E-B88E-A4B31A0E4A0D}"/>
+                  </a:ext>
+                </a:extLst>
+              </p:cNvPr>
+              <p:cNvSpPr txBox="1"/>
+              <p:nvPr/>
+            </p:nvSpPr>
+            <p:spPr>
+              <a:xfrm>
+                <a:off x="3247406" y="3232258"/>
+                <a:ext cx="526041" cy="369332"/>
+              </a:xfrm>
+              <a:prstGeom prst="rect">
+                <a:avLst/>
+              </a:prstGeom>
+              <a:noFill/>
+            </p:spPr>
+            <p:txBody>
+              <a:bodyPr wrap="square" rtlCol="0">
+                <a:spAutoFit/>
+              </a:bodyPr>
+              <a:lstStyle/>
+              <a:p>
+                <a:pPr/>
+                <a14:m>
+                  <m:oMathPara xmlns:m="http://schemas.openxmlformats.org/officeDocument/2006/math">
+                    <m:oMathParaPr>
+                      <m:jc m:val="centerGroup"/>
+                    </m:oMathParaPr>
+                    <m:oMath xmlns:m="http://schemas.openxmlformats.org/officeDocument/2006/math">
+                      <m:sSub>
+                        <m:sSubPr>
+                          <m:ctrlPr>
+                            <a:rPr lang="en-US" altLang="ko-KR" b="0" i="1" smtClean="0">
+                              <a:latin typeface="Cambria Math" panose="02040503050406030204" pitchFamily="18" charset="0"/>
+                            </a:rPr>
+                          </m:ctrlPr>
+                        </m:sSubPr>
+                        <m:e>
+                          <m:acc>
+                            <m:accPr>
+                              <m:chr m:val="⃗"/>
+                              <m:ctrlPr>
+                                <a:rPr lang="en-US" altLang="ko-KR" b="0" i="1" smtClean="0">
+                                  <a:latin typeface="Cambria Math" panose="02040503050406030204" pitchFamily="18" charset="0"/>
+                                </a:rPr>
+                              </m:ctrlPr>
+                            </m:accPr>
+                            <m:e>
+                              <m:r>
+                                <a:rPr lang="en-US" altLang="ko-KR" b="0" i="1" smtClean="0">
+                                  <a:latin typeface="Cambria Math" panose="02040503050406030204" pitchFamily="18" charset="0"/>
+                                </a:rPr>
+                                <m:t>𝑠</m:t>
+                              </m:r>
+                            </m:e>
+                          </m:acc>
+                        </m:e>
+                        <m:sub>
+                          <m:r>
+                            <a:rPr lang="en-US" altLang="ko-KR" b="0" i="1" smtClean="0">
+                              <a:latin typeface="Cambria Math" panose="02040503050406030204" pitchFamily="18" charset="0"/>
+                            </a:rPr>
+                            <m:t>1</m:t>
+                          </m:r>
+                        </m:sub>
+                      </m:sSub>
+                    </m:oMath>
+                  </m:oMathPara>
+                </a14:m>
+                <a:endParaRPr lang="ko-KR" altLang="en-US" dirty="0"/>
+              </a:p>
+            </p:txBody>
+          </p:sp>
+        </mc:Choice>
+        <mc:Fallback xmlns="">
+          <p:sp>
+            <p:nvSpPr>
+              <p:cNvPr id="8" name="TextBox 7">
+                <a:extLst>
+                  <a:ext uri="{FF2B5EF4-FFF2-40B4-BE49-F238E27FC236}">
+                    <a16:creationId xmlns:a16="http://schemas.microsoft.com/office/drawing/2014/main" id="{483B975B-B509-4D7E-B88E-A4B31A0E4A0D}"/>
+                  </a:ext>
+                </a:extLst>
+              </p:cNvPr>
+              <p:cNvSpPr txBox="1">
+                <a:spLocks noRot="1" noChangeAspect="1" noMove="1" noResize="1" noEditPoints="1" noAdjustHandles="1" noChangeArrowheads="1" noChangeShapeType="1" noTextEdit="1"/>
+              </p:cNvSpPr>
+              <p:nvPr/>
+            </p:nvSpPr>
+            <p:spPr>
+              <a:xfrm>
+                <a:off x="3247406" y="3232258"/>
+                <a:ext cx="526041" cy="369332"/>
+              </a:xfrm>
+              <a:prstGeom prst="rect">
+                <a:avLst/>
+              </a:prstGeom>
+              <a:blipFill>
+                <a:blip r:embed="rId2"/>
+                <a:stretch>
+                  <a:fillRect t="-19672" r="-25581" b="-1639"/>
+                </a:stretch>
+              </a:blipFill>
+            </p:spPr>
+            <p:txBody>
+              <a:bodyPr/>
+              <a:lstStyle/>
+              <a:p>
+                <a:r>
+                  <a:rPr lang="ko-KR" altLang="en-US">
+                    <a:noFill/>
+                  </a:rPr>
+                  <a:t> </a:t>
+                </a:r>
+              </a:p>
+            </p:txBody>
+          </p:sp>
+        </mc:Fallback>
+      </mc:AlternateContent>
+      <p:cxnSp>
+        <p:nvCxnSpPr>
+          <p:cNvPr id="9" name="직선 연결선 8">
+            <a:extLst>
+              <a:ext uri="{FF2B5EF4-FFF2-40B4-BE49-F238E27FC236}">
+                <a16:creationId xmlns:a16="http://schemas.microsoft.com/office/drawing/2014/main" id="{6E72BA9A-A5FB-4F5C-AD50-525D78704F01}"/>
+              </a:ext>
+            </a:extLst>
+          </p:cNvPr>
+          <p:cNvCxnSpPr>
+            <a:cxnSpLocks/>
+          </p:cNvCxnSpPr>
+          <p:nvPr/>
+        </p:nvCxnSpPr>
+        <p:spPr>
+          <a:xfrm>
+            <a:off x="4661046" y="3063240"/>
+            <a:ext cx="0" cy="191130"/>
+          </a:xfrm>
+          <a:prstGeom prst="line">
+            <a:avLst/>
+          </a:prstGeom>
+          <a:ln w="19050">
+            <a:solidFill>
+              <a:schemeClr val="tx1"/>
+            </a:solidFill>
+          </a:ln>
+        </p:spPr>
+        <p:style>
+          <a:lnRef idx="1">
+            <a:schemeClr val="accent1"/>
+          </a:lnRef>
+          <a:fillRef idx="0">
+            <a:schemeClr val="accent1"/>
+          </a:fillRef>
+          <a:effectRef idx="0">
+            <a:schemeClr val="accent1"/>
+          </a:effectRef>
+          <a:fontRef idx="minor">
+            <a:schemeClr val="tx1"/>
+          </a:fontRef>
+        </p:style>
+      </p:cxnSp>
+      <p:cxnSp>
+        <p:nvCxnSpPr>
+          <p:cNvPr id="10" name="직선 연결선 9">
+            <a:extLst>
+              <a:ext uri="{FF2B5EF4-FFF2-40B4-BE49-F238E27FC236}">
+                <a16:creationId xmlns:a16="http://schemas.microsoft.com/office/drawing/2014/main" id="{7875E507-8EB4-48CC-9470-CBD13F5B2659}"/>
+              </a:ext>
+            </a:extLst>
+          </p:cNvPr>
+          <p:cNvCxnSpPr>
+            <a:cxnSpLocks/>
+          </p:cNvCxnSpPr>
+          <p:nvPr/>
+        </p:nvCxnSpPr>
+        <p:spPr>
+          <a:xfrm>
+            <a:off x="7100740" y="3063240"/>
+            <a:ext cx="0" cy="191130"/>
+          </a:xfrm>
+          <a:prstGeom prst="line">
+            <a:avLst/>
+          </a:prstGeom>
+          <a:ln w="19050">
+            <a:solidFill>
+              <a:schemeClr val="tx1"/>
+            </a:solidFill>
+          </a:ln>
+        </p:spPr>
+        <p:style>
+          <a:lnRef idx="1">
+            <a:schemeClr val="accent1"/>
+          </a:lnRef>
+          <a:fillRef idx="0">
+            <a:schemeClr val="accent1"/>
+          </a:fillRef>
+          <a:effectRef idx="0">
+            <a:schemeClr val="accent1"/>
+          </a:effectRef>
+          <a:fontRef idx="minor">
+            <a:schemeClr val="tx1"/>
+          </a:fontRef>
+        </p:style>
+      </p:cxnSp>
+      <mc:AlternateContent xmlns:mc="http://schemas.openxmlformats.org/markup-compatibility/2006" xmlns:a14="http://schemas.microsoft.com/office/drawing/2010/main">
+        <mc:Choice Requires="a14">
+          <p:sp>
+            <p:nvSpPr>
+              <p:cNvPr id="11" name="TextBox 10">
+                <a:extLst>
+                  <a:ext uri="{FF2B5EF4-FFF2-40B4-BE49-F238E27FC236}">
+                    <a16:creationId xmlns:a16="http://schemas.microsoft.com/office/drawing/2014/main" id="{EC6E89C4-1D42-4116-943B-56D59AED2796}"/>
+                  </a:ext>
+                </a:extLst>
+              </p:cNvPr>
+              <p:cNvSpPr txBox="1"/>
+              <p:nvPr/>
+            </p:nvSpPr>
+            <p:spPr>
+              <a:xfrm>
+                <a:off x="5742503" y="3232258"/>
+                <a:ext cx="526041" cy="369332"/>
+              </a:xfrm>
+              <a:prstGeom prst="rect">
+                <a:avLst/>
+              </a:prstGeom>
+              <a:noFill/>
+            </p:spPr>
+            <p:txBody>
+              <a:bodyPr wrap="square" rtlCol="0">
+                <a:spAutoFit/>
+              </a:bodyPr>
+              <a:lstStyle/>
+              <a:p>
+                <a:pPr/>
+                <a14:m>
+                  <m:oMathPara xmlns:m="http://schemas.openxmlformats.org/officeDocument/2006/math">
+                    <m:oMathParaPr>
+                      <m:jc m:val="centerGroup"/>
+                    </m:oMathParaPr>
+                    <m:oMath xmlns:m="http://schemas.openxmlformats.org/officeDocument/2006/math">
+                      <m:sSub>
+                        <m:sSubPr>
+                          <m:ctrlPr>
+                            <a:rPr lang="en-US" altLang="ko-KR" b="0" i="1" smtClean="0">
+                              <a:latin typeface="Cambria Math" panose="02040503050406030204" pitchFamily="18" charset="0"/>
+                            </a:rPr>
+                          </m:ctrlPr>
+                        </m:sSubPr>
+                        <m:e>
+                          <m:acc>
+                            <m:accPr>
+                              <m:chr m:val="⃗"/>
+                              <m:ctrlPr>
+                                <a:rPr lang="en-US" altLang="ko-KR" b="0" i="1" smtClean="0">
+                                  <a:latin typeface="Cambria Math" panose="02040503050406030204" pitchFamily="18" charset="0"/>
+                                </a:rPr>
+                              </m:ctrlPr>
+                            </m:accPr>
+                            <m:e>
+                              <m:r>
+                                <a:rPr lang="en-US" altLang="ko-KR" b="0" i="1" smtClean="0">
+                                  <a:latin typeface="Cambria Math" panose="02040503050406030204" pitchFamily="18" charset="0"/>
+                                </a:rPr>
+                                <m:t>𝑠</m:t>
+                              </m:r>
+                            </m:e>
+                          </m:acc>
+                        </m:e>
+                        <m:sub>
+                          <m:r>
+                            <a:rPr lang="en-US" altLang="ko-KR" b="0" i="1" smtClean="0">
+                              <a:latin typeface="Cambria Math" panose="02040503050406030204" pitchFamily="18" charset="0"/>
+                            </a:rPr>
+                            <m:t>2</m:t>
+                          </m:r>
+                        </m:sub>
+                      </m:sSub>
+                    </m:oMath>
+                  </m:oMathPara>
+                </a14:m>
+                <a:endParaRPr lang="ko-KR" altLang="en-US" dirty="0"/>
+              </a:p>
+            </p:txBody>
+          </p:sp>
+        </mc:Choice>
+        <mc:Fallback xmlns="">
+          <p:sp>
+            <p:nvSpPr>
+              <p:cNvPr id="11" name="TextBox 10">
+                <a:extLst>
+                  <a:ext uri="{FF2B5EF4-FFF2-40B4-BE49-F238E27FC236}">
+                    <a16:creationId xmlns:a16="http://schemas.microsoft.com/office/drawing/2014/main" id="{EC6E89C4-1D42-4116-943B-56D59AED2796}"/>
+                  </a:ext>
+                </a:extLst>
+              </p:cNvPr>
+              <p:cNvSpPr txBox="1">
+                <a:spLocks noRot="1" noChangeAspect="1" noMove="1" noResize="1" noEditPoints="1" noAdjustHandles="1" noChangeArrowheads="1" noChangeShapeType="1" noTextEdit="1"/>
+              </p:cNvSpPr>
+              <p:nvPr/>
+            </p:nvSpPr>
+            <p:spPr>
+              <a:xfrm>
+                <a:off x="5742503" y="3232258"/>
+                <a:ext cx="526041" cy="369332"/>
+              </a:xfrm>
+              <a:prstGeom prst="rect">
+                <a:avLst/>
+              </a:prstGeom>
+              <a:blipFill>
+                <a:blip r:embed="rId3"/>
+                <a:stretch>
+                  <a:fillRect t="-19672" r="-25581" b="-1639"/>
+                </a:stretch>
+              </a:blipFill>
+            </p:spPr>
+            <p:txBody>
+              <a:bodyPr/>
+              <a:lstStyle/>
+              <a:p>
+                <a:r>
+                  <a:rPr lang="ko-KR" altLang="en-US">
+                    <a:noFill/>
+                  </a:rPr>
+                  <a:t> </a:t>
+                </a:r>
+              </a:p>
+            </p:txBody>
+          </p:sp>
+        </mc:Fallback>
+      </mc:AlternateContent>
+      <mc:AlternateContent xmlns:mc="http://schemas.openxmlformats.org/markup-compatibility/2006" xmlns:a14="http://schemas.microsoft.com/office/drawing/2010/main">
+        <mc:Choice Requires="a14">
+          <p:sp>
+            <p:nvSpPr>
+              <p:cNvPr id="12" name="TextBox 11">
+                <a:extLst>
+                  <a:ext uri="{FF2B5EF4-FFF2-40B4-BE49-F238E27FC236}">
+                    <a16:creationId xmlns:a16="http://schemas.microsoft.com/office/drawing/2014/main" id="{32B5BE3A-982B-4CCB-B3DC-0BC9BF5C0967}"/>
+                  </a:ext>
+                </a:extLst>
+              </p:cNvPr>
+              <p:cNvSpPr txBox="1"/>
+              <p:nvPr/>
+            </p:nvSpPr>
+            <p:spPr>
+              <a:xfrm>
+                <a:off x="8155531" y="3232258"/>
+                <a:ext cx="526041" cy="369332"/>
+              </a:xfrm>
+              <a:prstGeom prst="rect">
+                <a:avLst/>
+              </a:prstGeom>
+              <a:noFill/>
+            </p:spPr>
+            <p:txBody>
+              <a:bodyPr wrap="square" rtlCol="0">
+                <a:spAutoFit/>
+              </a:bodyPr>
+              <a:lstStyle/>
+              <a:p>
+                <a:pPr/>
+                <a14:m>
+                  <m:oMathPara xmlns:m="http://schemas.openxmlformats.org/officeDocument/2006/math">
+                    <m:oMathParaPr>
+                      <m:jc m:val="centerGroup"/>
+                    </m:oMathParaPr>
+                    <m:oMath xmlns:m="http://schemas.openxmlformats.org/officeDocument/2006/math">
+                      <m:sSub>
+                        <m:sSubPr>
+                          <m:ctrlPr>
+                            <a:rPr lang="en-US" altLang="ko-KR" b="0" i="1" smtClean="0">
+                              <a:latin typeface="Cambria Math" panose="02040503050406030204" pitchFamily="18" charset="0"/>
+                            </a:rPr>
+                          </m:ctrlPr>
+                        </m:sSubPr>
+                        <m:e>
+                          <m:acc>
+                            <m:accPr>
+                              <m:chr m:val="⃗"/>
+                              <m:ctrlPr>
+                                <a:rPr lang="en-US" altLang="ko-KR" b="0" i="1" smtClean="0">
+                                  <a:latin typeface="Cambria Math" panose="02040503050406030204" pitchFamily="18" charset="0"/>
+                                </a:rPr>
+                              </m:ctrlPr>
+                            </m:accPr>
+                            <m:e>
+                              <m:r>
+                                <a:rPr lang="en-US" altLang="ko-KR" b="0" i="1" smtClean="0">
+                                  <a:latin typeface="Cambria Math" panose="02040503050406030204" pitchFamily="18" charset="0"/>
+                                </a:rPr>
+                                <m:t>𝑠</m:t>
+                              </m:r>
+                            </m:e>
+                          </m:acc>
+                        </m:e>
+                        <m:sub>
+                          <m:r>
+                            <a:rPr lang="en-US" altLang="ko-KR" b="0" i="1" smtClean="0">
+                              <a:latin typeface="Cambria Math" panose="02040503050406030204" pitchFamily="18" charset="0"/>
+                            </a:rPr>
+                            <m:t>3</m:t>
+                          </m:r>
+                        </m:sub>
+                      </m:sSub>
+                    </m:oMath>
+                  </m:oMathPara>
+                </a14:m>
+                <a:endParaRPr lang="ko-KR" altLang="en-US" dirty="0"/>
+              </a:p>
+            </p:txBody>
+          </p:sp>
+        </mc:Choice>
+        <mc:Fallback xmlns="">
+          <p:sp>
+            <p:nvSpPr>
+              <p:cNvPr id="12" name="TextBox 11">
+                <a:extLst>
+                  <a:ext uri="{FF2B5EF4-FFF2-40B4-BE49-F238E27FC236}">
+                    <a16:creationId xmlns:a16="http://schemas.microsoft.com/office/drawing/2014/main" id="{32B5BE3A-982B-4CCB-B3DC-0BC9BF5C0967}"/>
+                  </a:ext>
+                </a:extLst>
+              </p:cNvPr>
+              <p:cNvSpPr txBox="1">
+                <a:spLocks noRot="1" noChangeAspect="1" noMove="1" noResize="1" noEditPoints="1" noAdjustHandles="1" noChangeArrowheads="1" noChangeShapeType="1" noTextEdit="1"/>
+              </p:cNvSpPr>
+              <p:nvPr/>
+            </p:nvSpPr>
+            <p:spPr>
+              <a:xfrm>
+                <a:off x="8155531" y="3232258"/>
+                <a:ext cx="526041" cy="369332"/>
+              </a:xfrm>
+              <a:prstGeom prst="rect">
+                <a:avLst/>
+              </a:prstGeom>
+              <a:blipFill>
+                <a:blip r:embed="rId4"/>
+                <a:stretch>
+                  <a:fillRect t="-19672" r="-24419" b="-1639"/>
+                </a:stretch>
+              </a:blipFill>
+            </p:spPr>
+            <p:txBody>
+              <a:bodyPr/>
+              <a:lstStyle/>
+              <a:p>
+                <a:r>
+                  <a:rPr lang="ko-KR" altLang="en-US">
+                    <a:noFill/>
+                  </a:rPr>
+                  <a:t> </a:t>
+                </a:r>
+              </a:p>
+            </p:txBody>
+          </p:sp>
+        </mc:Fallback>
+      </mc:AlternateContent>
+      <mc:AlternateContent xmlns:mc="http://schemas.openxmlformats.org/markup-compatibility/2006" xmlns:a14="http://schemas.microsoft.com/office/drawing/2010/main">
+        <mc:Choice Requires="a14">
+          <p:sp>
+            <p:nvSpPr>
+              <p:cNvPr id="15" name="TextBox 14">
+                <a:extLst>
+                  <a:ext uri="{FF2B5EF4-FFF2-40B4-BE49-F238E27FC236}">
+                    <a16:creationId xmlns:a16="http://schemas.microsoft.com/office/drawing/2014/main" id="{EE14DAC4-08C5-4CE3-A3A2-279E7121F99F}"/>
+                  </a:ext>
+                </a:extLst>
+              </p:cNvPr>
+              <p:cNvSpPr txBox="1"/>
+              <p:nvPr/>
+            </p:nvSpPr>
+            <p:spPr>
+              <a:xfrm>
+                <a:off x="3140470" y="2128625"/>
+                <a:ext cx="484235" cy="402931"/>
+              </a:xfrm>
+              <a:prstGeom prst="rect">
+                <a:avLst/>
+              </a:prstGeom>
+              <a:noFill/>
+            </p:spPr>
+            <p:txBody>
+              <a:bodyPr wrap="none" rtlCol="0">
+                <a:spAutoFit/>
+              </a:bodyPr>
+              <a:lstStyle/>
+              <a:p>
+                <a:pPr/>
+                <a14:m>
+                  <m:oMathPara xmlns:m="http://schemas.openxmlformats.org/officeDocument/2006/math">
+                    <m:oMathParaPr>
+                      <m:jc m:val="centerGroup"/>
+                    </m:oMathParaPr>
+                    <m:oMath xmlns:m="http://schemas.openxmlformats.org/officeDocument/2006/math">
+                      <m:acc>
+                        <m:accPr>
+                          <m:chr m:val="⃗"/>
+                          <m:ctrlPr>
+                            <a:rPr lang="en-US" altLang="ko-KR" b="0" i="1" smtClean="0">
+                              <a:latin typeface="Cambria Math" panose="02040503050406030204" pitchFamily="18" charset="0"/>
+                            </a:rPr>
+                          </m:ctrlPr>
+                        </m:accPr>
+                        <m:e>
+                          <m:sSub>
+                            <m:sSubPr>
+                              <m:ctrlPr>
+                                <a:rPr lang="en-US" altLang="ko-KR" b="0" i="1" smtClean="0">
+                                  <a:latin typeface="Cambria Math" panose="02040503050406030204" pitchFamily="18" charset="0"/>
+                                </a:rPr>
+                              </m:ctrlPr>
+                            </m:sSubPr>
+                            <m:e>
+                              <m:r>
+                                <a:rPr lang="en-US" altLang="ko-KR" b="0" i="1" smtClean="0">
+                                  <a:latin typeface="Cambria Math" panose="02040503050406030204" pitchFamily="18" charset="0"/>
+                                </a:rPr>
+                                <m:t>𝐹</m:t>
+                              </m:r>
+                            </m:e>
+                            <m:sub>
+                              <m:r>
+                                <a:rPr lang="en-US" altLang="ko-KR" b="0" i="1" smtClean="0">
+                                  <a:latin typeface="Cambria Math" panose="02040503050406030204" pitchFamily="18" charset="0"/>
+                                </a:rPr>
+                                <m:t>1</m:t>
+                              </m:r>
+                            </m:sub>
+                          </m:sSub>
+                        </m:e>
+                      </m:acc>
+                    </m:oMath>
+                  </m:oMathPara>
+                </a14:m>
+                <a:endParaRPr lang="ko-KR" altLang="en-US" dirty="0"/>
+              </a:p>
+            </p:txBody>
+          </p:sp>
+        </mc:Choice>
+        <mc:Fallback xmlns="">
+          <p:sp>
+            <p:nvSpPr>
+              <p:cNvPr id="15" name="TextBox 14">
+                <a:extLst>
+                  <a:ext uri="{FF2B5EF4-FFF2-40B4-BE49-F238E27FC236}">
+                    <a16:creationId xmlns:a16="http://schemas.microsoft.com/office/drawing/2014/main" id="{EE14DAC4-08C5-4CE3-A3A2-279E7121F99F}"/>
+                  </a:ext>
+                </a:extLst>
+              </p:cNvPr>
+              <p:cNvSpPr txBox="1">
+                <a:spLocks noRot="1" noChangeAspect="1" noMove="1" noResize="1" noEditPoints="1" noAdjustHandles="1" noChangeArrowheads="1" noChangeShapeType="1" noTextEdit="1"/>
+              </p:cNvSpPr>
+              <p:nvPr/>
+            </p:nvSpPr>
+            <p:spPr>
+              <a:xfrm>
+                <a:off x="3140470" y="2128625"/>
+                <a:ext cx="484235" cy="402931"/>
+              </a:xfrm>
+              <a:prstGeom prst="rect">
+                <a:avLst/>
+              </a:prstGeom>
+              <a:blipFill>
+                <a:blip r:embed="rId5"/>
+                <a:stretch>
+                  <a:fillRect b="-1515"/>
+                </a:stretch>
+              </a:blipFill>
+            </p:spPr>
+            <p:txBody>
+              <a:bodyPr/>
+              <a:lstStyle/>
+              <a:p>
+                <a:r>
+                  <a:rPr lang="ko-KR" altLang="en-US">
+                    <a:noFill/>
+                  </a:rPr>
+                  <a:t> </a:t>
+                </a:r>
+              </a:p>
+            </p:txBody>
+          </p:sp>
+        </mc:Fallback>
+      </mc:AlternateContent>
+      <p:cxnSp>
+        <p:nvCxnSpPr>
+          <p:cNvPr id="16" name="직선 화살표 연결선 15">
+            <a:extLst>
+              <a:ext uri="{FF2B5EF4-FFF2-40B4-BE49-F238E27FC236}">
+                <a16:creationId xmlns:a16="http://schemas.microsoft.com/office/drawing/2014/main" id="{945BA8C6-EC2B-4EA0-B5F7-42EF297A2BF5}"/>
+              </a:ext>
+            </a:extLst>
+          </p:cNvPr>
+          <p:cNvCxnSpPr>
+            <a:cxnSpLocks/>
+          </p:cNvCxnSpPr>
+          <p:nvPr/>
+        </p:nvCxnSpPr>
+        <p:spPr>
+          <a:xfrm flipV="1">
+            <a:off x="2914350" y="2053496"/>
+            <a:ext cx="1242127" cy="850526"/>
+          </a:xfrm>
+          <a:prstGeom prst="straightConnector1">
+            <a:avLst/>
+          </a:prstGeom>
+          <a:ln w="19050">
+            <a:solidFill>
+              <a:schemeClr val="accent2"/>
+            </a:solidFill>
+            <a:tailEnd type="triangle"/>
+          </a:ln>
+        </p:spPr>
+        <p:style>
+          <a:lnRef idx="1">
+            <a:schemeClr val="accent1"/>
+          </a:lnRef>
+          <a:fillRef idx="0">
+            <a:schemeClr val="accent1"/>
+          </a:fillRef>
+          <a:effectRef idx="0">
+            <a:schemeClr val="accent1"/>
+          </a:effectRef>
+          <a:fontRef idx="minor">
+            <a:schemeClr val="tx1"/>
+          </a:fontRef>
+        </p:style>
+      </p:cxnSp>
+      <p:cxnSp>
+        <p:nvCxnSpPr>
+          <p:cNvPr id="17" name="직선 화살표 연결선 16">
+            <a:extLst>
+              <a:ext uri="{FF2B5EF4-FFF2-40B4-BE49-F238E27FC236}">
+                <a16:creationId xmlns:a16="http://schemas.microsoft.com/office/drawing/2014/main" id="{47342F0E-7313-4280-A485-9F0E593DC606}"/>
+              </a:ext>
+            </a:extLst>
+          </p:cNvPr>
+          <p:cNvCxnSpPr>
+            <a:cxnSpLocks/>
+          </p:cNvCxnSpPr>
+          <p:nvPr/>
+        </p:nvCxnSpPr>
+        <p:spPr>
+          <a:xfrm flipV="1">
+            <a:off x="2914350" y="2904023"/>
+            <a:ext cx="1242127" cy="1"/>
+          </a:xfrm>
+          <a:prstGeom prst="straightConnector1">
+            <a:avLst/>
+          </a:prstGeom>
+          <a:ln w="6350">
+            <a:prstDash val="lgDash"/>
+            <a:tailEnd type="triangle"/>
+          </a:ln>
+        </p:spPr>
+        <p:style>
+          <a:lnRef idx="1">
+            <a:schemeClr val="accent1"/>
+          </a:lnRef>
+          <a:fillRef idx="0">
+            <a:schemeClr val="accent1"/>
+          </a:fillRef>
+          <a:effectRef idx="0">
+            <a:schemeClr val="accent1"/>
+          </a:effectRef>
+          <a:fontRef idx="minor">
+            <a:schemeClr val="tx1"/>
+          </a:fontRef>
+        </p:style>
+      </p:cxnSp>
+      <mc:AlternateContent xmlns:mc="http://schemas.openxmlformats.org/markup-compatibility/2006" xmlns:a14="http://schemas.microsoft.com/office/drawing/2010/main">
+        <mc:Choice Requires="a14">
+          <p:sp>
+            <p:nvSpPr>
+              <p:cNvPr id="19" name="TextBox 18">
+                <a:extLst>
+                  <a:ext uri="{FF2B5EF4-FFF2-40B4-BE49-F238E27FC236}">
+                    <a16:creationId xmlns:a16="http://schemas.microsoft.com/office/drawing/2014/main" id="{230A025C-8B94-4E45-AEE4-D3FCF4FBAE20}"/>
+                  </a:ext>
+                </a:extLst>
+              </p:cNvPr>
+              <p:cNvSpPr txBox="1"/>
+              <p:nvPr/>
+            </p:nvSpPr>
+            <p:spPr>
+              <a:xfrm>
+                <a:off x="3113950" y="2660070"/>
+                <a:ext cx="388888" cy="276999"/>
+              </a:xfrm>
+              <a:prstGeom prst="rect">
+                <a:avLst/>
+              </a:prstGeom>
+              <a:noFill/>
+            </p:spPr>
+            <p:txBody>
+              <a:bodyPr wrap="none" rtlCol="0">
+                <a:spAutoFit/>
+              </a:bodyPr>
+              <a:lstStyle/>
+              <a:p>
+                <a:pPr/>
+                <a14:m>
+                  <m:oMathPara xmlns:m="http://schemas.openxmlformats.org/officeDocument/2006/math">
+                    <m:oMathParaPr>
+                      <m:jc m:val="centerGroup"/>
+                    </m:oMathParaPr>
+                    <m:oMath xmlns:m="http://schemas.openxmlformats.org/officeDocument/2006/math">
+                      <m:sSub>
+                        <m:sSubPr>
+                          <m:ctrlPr>
+                            <a:rPr lang="en-US" altLang="ko-KR" sz="1200" b="0" i="1" smtClean="0">
+                              <a:latin typeface="Cambria Math" panose="02040503050406030204" pitchFamily="18" charset="0"/>
+                            </a:rPr>
+                          </m:ctrlPr>
+                        </m:sSubPr>
+                        <m:e>
+                          <m:r>
+                            <a:rPr lang="en-US" altLang="ko-KR" sz="1200" b="0" i="1" smtClean="0">
+                              <a:latin typeface="Cambria Math" panose="02040503050406030204" pitchFamily="18" charset="0"/>
+                            </a:rPr>
+                            <m:t>𝜃</m:t>
+                          </m:r>
+                        </m:e>
+                        <m:sub>
+                          <m:r>
+                            <a:rPr lang="en-US" altLang="ko-KR" sz="1200" b="0" i="1" smtClean="0">
+                              <a:latin typeface="Cambria Math" panose="02040503050406030204" pitchFamily="18" charset="0"/>
+                            </a:rPr>
+                            <m:t>1</m:t>
+                          </m:r>
+                        </m:sub>
+                      </m:sSub>
+                    </m:oMath>
+                  </m:oMathPara>
+                </a14:m>
+                <a:endParaRPr lang="ko-KR" altLang="en-US" sz="1200" dirty="0"/>
+              </a:p>
+            </p:txBody>
+          </p:sp>
+        </mc:Choice>
+        <mc:Fallback xmlns="">
+          <p:sp>
+            <p:nvSpPr>
+              <p:cNvPr id="19" name="TextBox 18">
+                <a:extLst>
+                  <a:ext uri="{FF2B5EF4-FFF2-40B4-BE49-F238E27FC236}">
+                    <a16:creationId xmlns:a16="http://schemas.microsoft.com/office/drawing/2014/main" id="{230A025C-8B94-4E45-AEE4-D3FCF4FBAE20}"/>
+                  </a:ext>
+                </a:extLst>
+              </p:cNvPr>
+              <p:cNvSpPr txBox="1">
+                <a:spLocks noRot="1" noChangeAspect="1" noMove="1" noResize="1" noEditPoints="1" noAdjustHandles="1" noChangeArrowheads="1" noChangeShapeType="1" noTextEdit="1"/>
+              </p:cNvSpPr>
+              <p:nvPr/>
+            </p:nvSpPr>
+            <p:spPr>
+              <a:xfrm>
+                <a:off x="3113950" y="2660070"/>
+                <a:ext cx="388888" cy="276999"/>
+              </a:xfrm>
+              <a:prstGeom prst="rect">
+                <a:avLst/>
+              </a:prstGeom>
+              <a:blipFill>
+                <a:blip r:embed="rId6"/>
+                <a:stretch>
+                  <a:fillRect/>
+                </a:stretch>
+              </a:blipFill>
+            </p:spPr>
+            <p:txBody>
+              <a:bodyPr/>
+              <a:lstStyle/>
+              <a:p>
+                <a:r>
+                  <a:rPr lang="ko-KR" altLang="en-US">
+                    <a:noFill/>
+                  </a:rPr>
+                  <a:t> </a:t>
+                </a:r>
+              </a:p>
+            </p:txBody>
+          </p:sp>
+        </mc:Fallback>
+      </mc:AlternateContent>
+      <p:sp>
+        <p:nvSpPr>
+          <p:cNvPr id="20" name="원호 19">
+            <a:extLst>
+              <a:ext uri="{FF2B5EF4-FFF2-40B4-BE49-F238E27FC236}">
+                <a16:creationId xmlns:a16="http://schemas.microsoft.com/office/drawing/2014/main" id="{791A7C31-37DA-4C9A-A5C0-056B95AE4FA0}"/>
+              </a:ext>
+            </a:extLst>
+          </p:cNvPr>
+          <p:cNvSpPr/>
+          <p:nvPr/>
+        </p:nvSpPr>
+        <p:spPr>
+          <a:xfrm>
+            <a:off x="2840740" y="2733022"/>
+            <a:ext cx="330218" cy="330218"/>
+          </a:xfrm>
+          <a:prstGeom prst="arc">
+            <a:avLst>
+              <a:gd name="adj1" fmla="val 18771761"/>
+              <a:gd name="adj2" fmla="val 214373"/>
+            </a:avLst>
+          </a:prstGeom>
+          <a:ln>
+            <a:solidFill>
+              <a:schemeClr val="tx1"/>
+            </a:solidFill>
+          </a:ln>
+        </p:spPr>
+        <p:style>
+          <a:lnRef idx="1">
+            <a:schemeClr val="accent1"/>
+          </a:lnRef>
+          <a:fillRef idx="0">
+            <a:schemeClr val="accent1"/>
+          </a:fillRef>
+          <a:effectRef idx="0">
+            <a:schemeClr val="accent1"/>
+          </a:effectRef>
+          <a:fontRef idx="minor">
+            <a:schemeClr val="tx1"/>
+          </a:fontRef>
+        </p:style>
+        <p:txBody>
+          <a:bodyPr rtlCol="0" anchor="ctr"/>
+          <a:lstStyle/>
+          <a:p>
+            <a:pPr algn="ctr"/>
+            <a:endParaRPr lang="ko-KR" altLang="en-US"/>
+          </a:p>
+        </p:txBody>
+      </p:sp>
+      <p:cxnSp>
+        <p:nvCxnSpPr>
+          <p:cNvPr id="21" name="직선 연결선 20">
+            <a:extLst>
+              <a:ext uri="{FF2B5EF4-FFF2-40B4-BE49-F238E27FC236}">
+                <a16:creationId xmlns:a16="http://schemas.microsoft.com/office/drawing/2014/main" id="{B51E1C63-C372-426A-8474-B71AFC57FCF2}"/>
+              </a:ext>
+            </a:extLst>
+          </p:cNvPr>
+          <p:cNvCxnSpPr>
+            <a:cxnSpLocks/>
+          </p:cNvCxnSpPr>
+          <p:nvPr/>
+        </p:nvCxnSpPr>
+        <p:spPr>
+          <a:xfrm>
+            <a:off x="4153937" y="2053496"/>
+            <a:ext cx="0" cy="850526"/>
+          </a:xfrm>
+          <a:prstGeom prst="line">
+            <a:avLst/>
+          </a:prstGeom>
+          <a:ln>
+            <a:solidFill>
+              <a:schemeClr val="tx1"/>
+            </a:solidFill>
+            <a:prstDash val="dashDot"/>
+          </a:ln>
+        </p:spPr>
+        <p:style>
+          <a:lnRef idx="1">
+            <a:schemeClr val="accent1"/>
+          </a:lnRef>
+          <a:fillRef idx="0">
+            <a:schemeClr val="accent1"/>
+          </a:fillRef>
+          <a:effectRef idx="0">
+            <a:schemeClr val="accent1"/>
+          </a:effectRef>
+          <a:fontRef idx="minor">
+            <a:schemeClr val="tx1"/>
+          </a:fontRef>
+        </p:style>
+      </p:cxnSp>
+      <mc:AlternateContent xmlns:mc="http://schemas.openxmlformats.org/markup-compatibility/2006" xmlns:a14="http://schemas.microsoft.com/office/drawing/2010/main">
+        <mc:Choice Requires="a14">
+          <p:sp>
+            <p:nvSpPr>
+              <p:cNvPr id="22" name="TextBox 21">
+                <a:extLst>
+                  <a:ext uri="{FF2B5EF4-FFF2-40B4-BE49-F238E27FC236}">
+                    <a16:creationId xmlns:a16="http://schemas.microsoft.com/office/drawing/2014/main" id="{CF167285-DD1A-49F5-AEF4-A381F6837C0B}"/>
+                  </a:ext>
+                </a:extLst>
+              </p:cNvPr>
+              <p:cNvSpPr txBox="1"/>
+              <p:nvPr/>
+            </p:nvSpPr>
+            <p:spPr>
+              <a:xfrm>
+                <a:off x="5686918" y="2169769"/>
+                <a:ext cx="489558" cy="402931"/>
+              </a:xfrm>
+              <a:prstGeom prst="rect">
+                <a:avLst/>
+              </a:prstGeom>
+              <a:noFill/>
+            </p:spPr>
+            <p:txBody>
+              <a:bodyPr wrap="none" rtlCol="0">
+                <a:spAutoFit/>
+              </a:bodyPr>
+              <a:lstStyle/>
+              <a:p>
+                <a:pPr/>
+                <a14:m>
+                  <m:oMathPara xmlns:m="http://schemas.openxmlformats.org/officeDocument/2006/math">
+                    <m:oMathParaPr>
+                      <m:jc m:val="centerGroup"/>
+                    </m:oMathParaPr>
+                    <m:oMath xmlns:m="http://schemas.openxmlformats.org/officeDocument/2006/math">
+                      <m:acc>
+                        <m:accPr>
+                          <m:chr m:val="⃗"/>
+                          <m:ctrlPr>
+                            <a:rPr lang="en-US" altLang="ko-KR" b="0" i="1" smtClean="0">
+                              <a:latin typeface="Cambria Math" panose="02040503050406030204" pitchFamily="18" charset="0"/>
+                            </a:rPr>
+                          </m:ctrlPr>
+                        </m:accPr>
+                        <m:e>
+                          <m:sSub>
+                            <m:sSubPr>
+                              <m:ctrlPr>
+                                <a:rPr lang="en-US" altLang="ko-KR" b="0" i="1" smtClean="0">
+                                  <a:latin typeface="Cambria Math" panose="02040503050406030204" pitchFamily="18" charset="0"/>
+                                </a:rPr>
+                              </m:ctrlPr>
+                            </m:sSubPr>
+                            <m:e>
+                              <m:r>
+                                <a:rPr lang="en-US" altLang="ko-KR" b="0" i="1" smtClean="0">
+                                  <a:latin typeface="Cambria Math" panose="02040503050406030204" pitchFamily="18" charset="0"/>
+                                </a:rPr>
+                                <m:t>𝐹</m:t>
+                              </m:r>
+                            </m:e>
+                            <m:sub>
+                              <m:r>
+                                <a:rPr lang="en-US" altLang="ko-KR" b="0" i="1" smtClean="0">
+                                  <a:latin typeface="Cambria Math" panose="02040503050406030204" pitchFamily="18" charset="0"/>
+                                </a:rPr>
+                                <m:t>2</m:t>
+                              </m:r>
+                            </m:sub>
+                          </m:sSub>
+                        </m:e>
+                      </m:acc>
+                    </m:oMath>
+                  </m:oMathPara>
+                </a14:m>
+                <a:endParaRPr lang="ko-KR" altLang="en-US" dirty="0"/>
+              </a:p>
+            </p:txBody>
+          </p:sp>
+        </mc:Choice>
+        <mc:Fallback xmlns="">
+          <p:sp>
+            <p:nvSpPr>
+              <p:cNvPr id="22" name="TextBox 21">
+                <a:extLst>
+                  <a:ext uri="{FF2B5EF4-FFF2-40B4-BE49-F238E27FC236}">
+                    <a16:creationId xmlns:a16="http://schemas.microsoft.com/office/drawing/2014/main" id="{CF167285-DD1A-49F5-AEF4-A381F6837C0B}"/>
+                  </a:ext>
+                </a:extLst>
+              </p:cNvPr>
+              <p:cNvSpPr txBox="1">
+                <a:spLocks noRot="1" noChangeAspect="1" noMove="1" noResize="1" noEditPoints="1" noAdjustHandles="1" noChangeArrowheads="1" noChangeShapeType="1" noTextEdit="1"/>
+              </p:cNvSpPr>
+              <p:nvPr/>
+            </p:nvSpPr>
+            <p:spPr>
+              <a:xfrm>
+                <a:off x="5686918" y="2169769"/>
+                <a:ext cx="489558" cy="402931"/>
+              </a:xfrm>
+              <a:prstGeom prst="rect">
+                <a:avLst/>
+              </a:prstGeom>
+              <a:blipFill>
+                <a:blip r:embed="rId7"/>
+                <a:stretch>
+                  <a:fillRect b="-1515"/>
+                </a:stretch>
+              </a:blipFill>
+            </p:spPr>
+            <p:txBody>
+              <a:bodyPr/>
+              <a:lstStyle/>
+              <a:p>
+                <a:r>
+                  <a:rPr lang="ko-KR" altLang="en-US">
+                    <a:noFill/>
+                  </a:rPr>
+                  <a:t> </a:t>
+                </a:r>
+              </a:p>
+            </p:txBody>
+          </p:sp>
+        </mc:Fallback>
+      </mc:AlternateContent>
+      <p:cxnSp>
+        <p:nvCxnSpPr>
+          <p:cNvPr id="23" name="직선 화살표 연결선 22">
+            <a:extLst>
+              <a:ext uri="{FF2B5EF4-FFF2-40B4-BE49-F238E27FC236}">
+                <a16:creationId xmlns:a16="http://schemas.microsoft.com/office/drawing/2014/main" id="{D0BC728E-DD9F-40B2-B3B1-A3ECD2DB8BA9}"/>
+              </a:ext>
+            </a:extLst>
+          </p:cNvPr>
+          <p:cNvCxnSpPr>
+            <a:cxnSpLocks/>
+          </p:cNvCxnSpPr>
+          <p:nvPr/>
+        </p:nvCxnSpPr>
+        <p:spPr>
+          <a:xfrm flipV="1">
+            <a:off x="5325543" y="2270502"/>
+            <a:ext cx="1239587" cy="633520"/>
+          </a:xfrm>
+          <a:prstGeom prst="straightConnector1">
+            <a:avLst/>
+          </a:prstGeom>
+          <a:ln w="19050">
+            <a:solidFill>
+              <a:schemeClr val="accent2"/>
+            </a:solidFill>
+            <a:tailEnd type="triangle"/>
+          </a:ln>
+        </p:spPr>
+        <p:style>
+          <a:lnRef idx="1">
+            <a:schemeClr val="accent1"/>
+          </a:lnRef>
+          <a:fillRef idx="0">
+            <a:schemeClr val="accent1"/>
+          </a:fillRef>
+          <a:effectRef idx="0">
+            <a:schemeClr val="accent1"/>
+          </a:effectRef>
+          <a:fontRef idx="minor">
+            <a:schemeClr val="tx1"/>
+          </a:fontRef>
+        </p:style>
+      </p:cxnSp>
+      <p:cxnSp>
+        <p:nvCxnSpPr>
+          <p:cNvPr id="24" name="직선 화살표 연결선 23">
+            <a:extLst>
+              <a:ext uri="{FF2B5EF4-FFF2-40B4-BE49-F238E27FC236}">
+                <a16:creationId xmlns:a16="http://schemas.microsoft.com/office/drawing/2014/main" id="{FB5E01C7-B24B-4BB4-8F62-72D0BCFECF39}"/>
+              </a:ext>
+            </a:extLst>
+          </p:cNvPr>
+          <p:cNvCxnSpPr>
+            <a:cxnSpLocks/>
+          </p:cNvCxnSpPr>
+          <p:nvPr/>
+        </p:nvCxnSpPr>
+        <p:spPr>
+          <a:xfrm flipV="1">
+            <a:off x="5325543" y="2904023"/>
+            <a:ext cx="1242127" cy="1"/>
+          </a:xfrm>
+          <a:prstGeom prst="straightConnector1">
+            <a:avLst/>
+          </a:prstGeom>
+          <a:ln w="6350">
+            <a:prstDash val="lgDash"/>
+            <a:tailEnd type="triangle"/>
+          </a:ln>
+        </p:spPr>
+        <p:style>
+          <a:lnRef idx="1">
+            <a:schemeClr val="accent1"/>
+          </a:lnRef>
+          <a:fillRef idx="0">
+            <a:schemeClr val="accent1"/>
+          </a:fillRef>
+          <a:effectRef idx="0">
+            <a:schemeClr val="accent1"/>
+          </a:effectRef>
+          <a:fontRef idx="minor">
+            <a:schemeClr val="tx1"/>
+          </a:fontRef>
+        </p:style>
+      </p:cxnSp>
+      <mc:AlternateContent xmlns:mc="http://schemas.openxmlformats.org/markup-compatibility/2006" xmlns:a14="http://schemas.microsoft.com/office/drawing/2010/main">
+        <mc:Choice Requires="a14">
+          <p:sp>
+            <p:nvSpPr>
+              <p:cNvPr id="25" name="TextBox 24">
+                <a:extLst>
+                  <a:ext uri="{FF2B5EF4-FFF2-40B4-BE49-F238E27FC236}">
+                    <a16:creationId xmlns:a16="http://schemas.microsoft.com/office/drawing/2014/main" id="{F4C526A7-5BF2-46B1-A121-1E080C561C9E}"/>
+                  </a:ext>
+                </a:extLst>
+              </p:cNvPr>
+              <p:cNvSpPr txBox="1"/>
+              <p:nvPr/>
+            </p:nvSpPr>
+            <p:spPr>
+              <a:xfrm>
+                <a:off x="5525143" y="2660070"/>
+                <a:ext cx="388888" cy="276999"/>
+              </a:xfrm>
+              <a:prstGeom prst="rect">
+                <a:avLst/>
+              </a:prstGeom>
+              <a:noFill/>
+            </p:spPr>
+            <p:txBody>
+              <a:bodyPr wrap="none" rtlCol="0">
+                <a:spAutoFit/>
+              </a:bodyPr>
+              <a:lstStyle/>
+              <a:p>
+                <a:pPr/>
+                <a14:m>
+                  <m:oMathPara xmlns:m="http://schemas.openxmlformats.org/officeDocument/2006/math">
+                    <m:oMathParaPr>
+                      <m:jc m:val="centerGroup"/>
+                    </m:oMathParaPr>
+                    <m:oMath xmlns:m="http://schemas.openxmlformats.org/officeDocument/2006/math">
+                      <m:sSub>
+                        <m:sSubPr>
+                          <m:ctrlPr>
+                            <a:rPr lang="en-US" altLang="ko-KR" sz="1200" b="0" i="1" smtClean="0">
+                              <a:latin typeface="Cambria Math" panose="02040503050406030204" pitchFamily="18" charset="0"/>
+                            </a:rPr>
+                          </m:ctrlPr>
+                        </m:sSubPr>
+                        <m:e>
+                          <m:r>
+                            <a:rPr lang="en-US" altLang="ko-KR" sz="1200" b="0" i="1" smtClean="0">
+                              <a:latin typeface="Cambria Math" panose="02040503050406030204" pitchFamily="18" charset="0"/>
+                            </a:rPr>
+                            <m:t>𝜃</m:t>
+                          </m:r>
+                        </m:e>
+                        <m:sub>
+                          <m:r>
+                            <a:rPr lang="en-US" altLang="ko-KR" sz="1200" b="0" i="1" smtClean="0">
+                              <a:latin typeface="Cambria Math" panose="02040503050406030204" pitchFamily="18" charset="0"/>
+                            </a:rPr>
+                            <m:t>2</m:t>
+                          </m:r>
+                        </m:sub>
+                      </m:sSub>
+                    </m:oMath>
+                  </m:oMathPara>
+                </a14:m>
+                <a:endParaRPr lang="ko-KR" altLang="en-US" sz="1200" dirty="0"/>
+              </a:p>
+            </p:txBody>
+          </p:sp>
+        </mc:Choice>
+        <mc:Fallback xmlns="">
+          <p:sp>
+            <p:nvSpPr>
+              <p:cNvPr id="25" name="TextBox 24">
+                <a:extLst>
+                  <a:ext uri="{FF2B5EF4-FFF2-40B4-BE49-F238E27FC236}">
+                    <a16:creationId xmlns:a16="http://schemas.microsoft.com/office/drawing/2014/main" id="{F4C526A7-5BF2-46B1-A121-1E080C561C9E}"/>
+                  </a:ext>
+                </a:extLst>
+              </p:cNvPr>
+              <p:cNvSpPr txBox="1">
+                <a:spLocks noRot="1" noChangeAspect="1" noMove="1" noResize="1" noEditPoints="1" noAdjustHandles="1" noChangeArrowheads="1" noChangeShapeType="1" noTextEdit="1"/>
+              </p:cNvSpPr>
+              <p:nvPr/>
+            </p:nvSpPr>
+            <p:spPr>
+              <a:xfrm>
+                <a:off x="5525143" y="2660070"/>
+                <a:ext cx="388888" cy="276999"/>
+              </a:xfrm>
+              <a:prstGeom prst="rect">
+                <a:avLst/>
+              </a:prstGeom>
+              <a:blipFill>
+                <a:blip r:embed="rId8"/>
+                <a:stretch>
+                  <a:fillRect/>
+                </a:stretch>
+              </a:blipFill>
+            </p:spPr>
+            <p:txBody>
+              <a:bodyPr/>
+              <a:lstStyle/>
+              <a:p>
+                <a:r>
+                  <a:rPr lang="ko-KR" altLang="en-US">
+                    <a:noFill/>
+                  </a:rPr>
+                  <a:t> </a:t>
+                </a:r>
+              </a:p>
+            </p:txBody>
+          </p:sp>
+        </mc:Fallback>
+      </mc:AlternateContent>
+      <p:sp>
+        <p:nvSpPr>
+          <p:cNvPr id="26" name="원호 25">
+            <a:extLst>
+              <a:ext uri="{FF2B5EF4-FFF2-40B4-BE49-F238E27FC236}">
+                <a16:creationId xmlns:a16="http://schemas.microsoft.com/office/drawing/2014/main" id="{FD3FFCEF-84AE-4CF5-94B6-991D419417EA}"/>
+              </a:ext>
+            </a:extLst>
+          </p:cNvPr>
+          <p:cNvSpPr/>
+          <p:nvPr/>
+        </p:nvSpPr>
+        <p:spPr>
+          <a:xfrm>
+            <a:off x="5251933" y="2733022"/>
+            <a:ext cx="330218" cy="330218"/>
+          </a:xfrm>
+          <a:prstGeom prst="arc">
+            <a:avLst>
+              <a:gd name="adj1" fmla="val 19362075"/>
+              <a:gd name="adj2" fmla="val 214373"/>
+            </a:avLst>
+          </a:prstGeom>
+          <a:ln>
+            <a:solidFill>
+              <a:schemeClr val="tx1"/>
+            </a:solidFill>
+          </a:ln>
+        </p:spPr>
+        <p:style>
+          <a:lnRef idx="1">
+            <a:schemeClr val="accent1"/>
+          </a:lnRef>
+          <a:fillRef idx="0">
+            <a:schemeClr val="accent1"/>
+          </a:fillRef>
+          <a:effectRef idx="0">
+            <a:schemeClr val="accent1"/>
+          </a:effectRef>
+          <a:fontRef idx="minor">
+            <a:schemeClr val="tx1"/>
+          </a:fontRef>
+        </p:style>
+        <p:txBody>
+          <a:bodyPr rtlCol="0" anchor="ctr"/>
+          <a:lstStyle/>
+          <a:p>
+            <a:pPr algn="ctr"/>
+            <a:endParaRPr lang="ko-KR" altLang="en-US"/>
+          </a:p>
+        </p:txBody>
+      </p:sp>
+      <p:cxnSp>
+        <p:nvCxnSpPr>
+          <p:cNvPr id="27" name="직선 연결선 26">
+            <a:extLst>
+              <a:ext uri="{FF2B5EF4-FFF2-40B4-BE49-F238E27FC236}">
+                <a16:creationId xmlns:a16="http://schemas.microsoft.com/office/drawing/2014/main" id="{A0EB8919-84F0-4A80-BE07-09B59CE67C27}"/>
+              </a:ext>
+            </a:extLst>
+          </p:cNvPr>
+          <p:cNvCxnSpPr>
+            <a:cxnSpLocks/>
+          </p:cNvCxnSpPr>
+          <p:nvPr/>
+        </p:nvCxnSpPr>
+        <p:spPr>
+          <a:xfrm>
+            <a:off x="6565130" y="2259330"/>
+            <a:ext cx="0" cy="644692"/>
+          </a:xfrm>
+          <a:prstGeom prst="line">
+            <a:avLst/>
+          </a:prstGeom>
+          <a:ln>
+            <a:solidFill>
+              <a:schemeClr val="tx1"/>
+            </a:solidFill>
+            <a:prstDash val="dashDot"/>
+          </a:ln>
+        </p:spPr>
+        <p:style>
+          <a:lnRef idx="1">
+            <a:schemeClr val="accent1"/>
+          </a:lnRef>
+          <a:fillRef idx="0">
+            <a:schemeClr val="accent1"/>
+          </a:fillRef>
+          <a:effectRef idx="0">
+            <a:schemeClr val="accent1"/>
+          </a:effectRef>
+          <a:fontRef idx="minor">
+            <a:schemeClr val="tx1"/>
+          </a:fontRef>
+        </p:style>
+      </p:cxnSp>
+      <mc:AlternateContent xmlns:mc="http://schemas.openxmlformats.org/markup-compatibility/2006" xmlns:a14="http://schemas.microsoft.com/office/drawing/2010/main">
+        <mc:Choice Requires="a14">
+          <p:sp>
+            <p:nvSpPr>
+              <p:cNvPr id="28" name="TextBox 27">
+                <a:extLst>
+                  <a:ext uri="{FF2B5EF4-FFF2-40B4-BE49-F238E27FC236}">
+                    <a16:creationId xmlns:a16="http://schemas.microsoft.com/office/drawing/2014/main" id="{E6BF535E-F8E5-4AE4-803E-5759E1070C8D}"/>
+                  </a:ext>
+                </a:extLst>
+              </p:cNvPr>
+              <p:cNvSpPr txBox="1"/>
+              <p:nvPr/>
+            </p:nvSpPr>
+            <p:spPr>
+              <a:xfrm>
+                <a:off x="7810014" y="2156481"/>
+                <a:ext cx="489558" cy="402931"/>
+              </a:xfrm>
+              <a:prstGeom prst="rect">
+                <a:avLst/>
+              </a:prstGeom>
+              <a:noFill/>
+            </p:spPr>
+            <p:txBody>
+              <a:bodyPr wrap="none" rtlCol="0">
+                <a:spAutoFit/>
+              </a:bodyPr>
+              <a:lstStyle/>
+              <a:p>
+                <a:pPr/>
+                <a14:m>
+                  <m:oMathPara xmlns:m="http://schemas.openxmlformats.org/officeDocument/2006/math">
+                    <m:oMathParaPr>
+                      <m:jc m:val="centerGroup"/>
+                    </m:oMathParaPr>
+                    <m:oMath xmlns:m="http://schemas.openxmlformats.org/officeDocument/2006/math">
+                      <m:acc>
+                        <m:accPr>
+                          <m:chr m:val="⃗"/>
+                          <m:ctrlPr>
+                            <a:rPr lang="en-US" altLang="ko-KR" b="0" i="1" smtClean="0">
+                              <a:latin typeface="Cambria Math" panose="02040503050406030204" pitchFamily="18" charset="0"/>
+                            </a:rPr>
+                          </m:ctrlPr>
+                        </m:accPr>
+                        <m:e>
+                          <m:sSub>
+                            <m:sSubPr>
+                              <m:ctrlPr>
+                                <a:rPr lang="en-US" altLang="ko-KR" b="0" i="1" smtClean="0">
+                                  <a:latin typeface="Cambria Math" panose="02040503050406030204" pitchFamily="18" charset="0"/>
+                                </a:rPr>
+                              </m:ctrlPr>
+                            </m:sSubPr>
+                            <m:e>
+                              <m:r>
+                                <a:rPr lang="en-US" altLang="ko-KR" b="0" i="1" smtClean="0">
+                                  <a:latin typeface="Cambria Math" panose="02040503050406030204" pitchFamily="18" charset="0"/>
+                                </a:rPr>
+                                <m:t>𝐹</m:t>
+                              </m:r>
+                            </m:e>
+                            <m:sub>
+                              <m:r>
+                                <a:rPr lang="en-US" altLang="ko-KR" b="0" i="1" smtClean="0">
+                                  <a:latin typeface="Cambria Math" panose="02040503050406030204" pitchFamily="18" charset="0"/>
+                                </a:rPr>
+                                <m:t>3</m:t>
+                              </m:r>
+                            </m:sub>
+                          </m:sSub>
+                        </m:e>
+                      </m:acc>
+                    </m:oMath>
+                  </m:oMathPara>
+                </a14:m>
+                <a:endParaRPr lang="ko-KR" altLang="en-US" dirty="0"/>
+              </a:p>
+            </p:txBody>
+          </p:sp>
+        </mc:Choice>
+        <mc:Fallback xmlns="">
+          <p:sp>
+            <p:nvSpPr>
+              <p:cNvPr id="28" name="TextBox 27">
+                <a:extLst>
+                  <a:ext uri="{FF2B5EF4-FFF2-40B4-BE49-F238E27FC236}">
+                    <a16:creationId xmlns:a16="http://schemas.microsoft.com/office/drawing/2014/main" id="{E6BF535E-F8E5-4AE4-803E-5759E1070C8D}"/>
+                  </a:ext>
+                </a:extLst>
+              </p:cNvPr>
+              <p:cNvSpPr txBox="1">
+                <a:spLocks noRot="1" noChangeAspect="1" noMove="1" noResize="1" noEditPoints="1" noAdjustHandles="1" noChangeArrowheads="1" noChangeShapeType="1" noTextEdit="1"/>
+              </p:cNvSpPr>
+              <p:nvPr/>
+            </p:nvSpPr>
+            <p:spPr>
+              <a:xfrm>
+                <a:off x="7810014" y="2156481"/>
+                <a:ext cx="489558" cy="402931"/>
+              </a:xfrm>
+              <a:prstGeom prst="rect">
+                <a:avLst/>
+              </a:prstGeom>
+              <a:blipFill>
+                <a:blip r:embed="rId9"/>
+                <a:stretch>
+                  <a:fillRect b="-1515"/>
+                </a:stretch>
+              </a:blipFill>
+            </p:spPr>
+            <p:txBody>
+              <a:bodyPr/>
+              <a:lstStyle/>
+              <a:p>
+                <a:r>
+                  <a:rPr lang="ko-KR" altLang="en-US">
+                    <a:noFill/>
+                  </a:rPr>
+                  <a:t> </a:t>
+                </a:r>
+              </a:p>
+            </p:txBody>
+          </p:sp>
+        </mc:Fallback>
+      </mc:AlternateContent>
+      <p:cxnSp>
+        <p:nvCxnSpPr>
+          <p:cNvPr id="29" name="직선 화살표 연결선 28">
+            <a:extLst>
+              <a:ext uri="{FF2B5EF4-FFF2-40B4-BE49-F238E27FC236}">
+                <a16:creationId xmlns:a16="http://schemas.microsoft.com/office/drawing/2014/main" id="{26608FE7-DF50-4857-B976-E5A702DD6A51}"/>
+              </a:ext>
+            </a:extLst>
+          </p:cNvPr>
+          <p:cNvCxnSpPr>
+            <a:cxnSpLocks/>
+          </p:cNvCxnSpPr>
+          <p:nvPr/>
+        </p:nvCxnSpPr>
+        <p:spPr>
+          <a:xfrm flipV="1">
+            <a:off x="7793147" y="2123093"/>
+            <a:ext cx="822046" cy="780929"/>
+          </a:xfrm>
+          <a:prstGeom prst="straightConnector1">
+            <a:avLst/>
+          </a:prstGeom>
+          <a:ln w="19050">
+            <a:solidFill>
+              <a:schemeClr val="accent2"/>
+            </a:solidFill>
+            <a:tailEnd type="triangle"/>
+          </a:ln>
+        </p:spPr>
+        <p:style>
+          <a:lnRef idx="1">
+            <a:schemeClr val="accent1"/>
+          </a:lnRef>
+          <a:fillRef idx="0">
+            <a:schemeClr val="accent1"/>
+          </a:fillRef>
+          <a:effectRef idx="0">
+            <a:schemeClr val="accent1"/>
+          </a:effectRef>
+          <a:fontRef idx="minor">
+            <a:schemeClr val="tx1"/>
+          </a:fontRef>
+        </p:style>
+      </p:cxnSp>
+      <p:cxnSp>
+        <p:nvCxnSpPr>
+          <p:cNvPr id="30" name="직선 화살표 연결선 29">
+            <a:extLst>
+              <a:ext uri="{FF2B5EF4-FFF2-40B4-BE49-F238E27FC236}">
+                <a16:creationId xmlns:a16="http://schemas.microsoft.com/office/drawing/2014/main" id="{2882F922-C04F-4F1B-9038-548FFAA3C4F0}"/>
+              </a:ext>
+            </a:extLst>
+          </p:cNvPr>
+          <p:cNvCxnSpPr>
+            <a:cxnSpLocks/>
+          </p:cNvCxnSpPr>
+          <p:nvPr/>
+        </p:nvCxnSpPr>
+        <p:spPr>
+          <a:xfrm flipV="1">
+            <a:off x="7793147" y="2904024"/>
+            <a:ext cx="817460" cy="1"/>
+          </a:xfrm>
+          <a:prstGeom prst="straightConnector1">
+            <a:avLst/>
+          </a:prstGeom>
+          <a:ln w="6350">
+            <a:prstDash val="lgDash"/>
+            <a:tailEnd type="triangle"/>
+          </a:ln>
+        </p:spPr>
+        <p:style>
+          <a:lnRef idx="1">
+            <a:schemeClr val="accent1"/>
+          </a:lnRef>
+          <a:fillRef idx="0">
+            <a:schemeClr val="accent1"/>
+          </a:fillRef>
+          <a:effectRef idx="0">
+            <a:schemeClr val="accent1"/>
+          </a:effectRef>
+          <a:fontRef idx="minor">
+            <a:schemeClr val="tx1"/>
+          </a:fontRef>
+        </p:style>
+      </p:cxnSp>
+      <mc:AlternateContent xmlns:mc="http://schemas.openxmlformats.org/markup-compatibility/2006" xmlns:a14="http://schemas.microsoft.com/office/drawing/2010/main">
+        <mc:Choice Requires="a14">
+          <p:sp>
+            <p:nvSpPr>
+              <p:cNvPr id="31" name="TextBox 30">
+                <a:extLst>
+                  <a:ext uri="{FF2B5EF4-FFF2-40B4-BE49-F238E27FC236}">
+                    <a16:creationId xmlns:a16="http://schemas.microsoft.com/office/drawing/2014/main" id="{A593EF99-0DE6-496D-97D3-D2BBAE9F60C6}"/>
+                  </a:ext>
+                </a:extLst>
+              </p:cNvPr>
+              <p:cNvSpPr txBox="1"/>
+              <p:nvPr/>
+            </p:nvSpPr>
+            <p:spPr>
+              <a:xfrm>
+                <a:off x="7947435" y="2627024"/>
+                <a:ext cx="388888" cy="276999"/>
+              </a:xfrm>
+              <a:prstGeom prst="rect">
+                <a:avLst/>
+              </a:prstGeom>
+              <a:noFill/>
+            </p:spPr>
+            <p:txBody>
+              <a:bodyPr wrap="none" rtlCol="0">
+                <a:spAutoFit/>
+              </a:bodyPr>
+              <a:lstStyle/>
+              <a:p>
+                <a:pPr/>
+                <a14:m>
+                  <m:oMathPara xmlns:m="http://schemas.openxmlformats.org/officeDocument/2006/math">
+                    <m:oMathParaPr>
+                      <m:jc m:val="centerGroup"/>
+                    </m:oMathParaPr>
+                    <m:oMath xmlns:m="http://schemas.openxmlformats.org/officeDocument/2006/math">
+                      <m:sSub>
+                        <m:sSubPr>
+                          <m:ctrlPr>
+                            <a:rPr lang="en-US" altLang="ko-KR" sz="1200" b="0" i="1" smtClean="0">
+                              <a:latin typeface="Cambria Math" panose="02040503050406030204" pitchFamily="18" charset="0"/>
+                            </a:rPr>
+                          </m:ctrlPr>
+                        </m:sSubPr>
+                        <m:e>
+                          <m:r>
+                            <a:rPr lang="en-US" altLang="ko-KR" sz="1200" b="0" i="1" smtClean="0">
+                              <a:latin typeface="Cambria Math" panose="02040503050406030204" pitchFamily="18" charset="0"/>
+                            </a:rPr>
+                            <m:t>𝜃</m:t>
+                          </m:r>
+                        </m:e>
+                        <m:sub>
+                          <m:r>
+                            <a:rPr lang="en-US" altLang="ko-KR" sz="1200" b="0" i="1" smtClean="0">
+                              <a:latin typeface="Cambria Math" panose="02040503050406030204" pitchFamily="18" charset="0"/>
+                            </a:rPr>
+                            <m:t>3</m:t>
+                          </m:r>
+                        </m:sub>
+                      </m:sSub>
+                    </m:oMath>
+                  </m:oMathPara>
+                </a14:m>
+                <a:endParaRPr lang="ko-KR" altLang="en-US" sz="1200" dirty="0"/>
+              </a:p>
+            </p:txBody>
+          </p:sp>
+        </mc:Choice>
+        <mc:Fallback xmlns="">
+          <p:sp>
+            <p:nvSpPr>
+              <p:cNvPr id="31" name="TextBox 30">
+                <a:extLst>
+                  <a:ext uri="{FF2B5EF4-FFF2-40B4-BE49-F238E27FC236}">
+                    <a16:creationId xmlns:a16="http://schemas.microsoft.com/office/drawing/2014/main" id="{A593EF99-0DE6-496D-97D3-D2BBAE9F60C6}"/>
+                  </a:ext>
+                </a:extLst>
+              </p:cNvPr>
+              <p:cNvSpPr txBox="1">
+                <a:spLocks noRot="1" noChangeAspect="1" noMove="1" noResize="1" noEditPoints="1" noAdjustHandles="1" noChangeArrowheads="1" noChangeShapeType="1" noTextEdit="1"/>
+              </p:cNvSpPr>
+              <p:nvPr/>
+            </p:nvSpPr>
+            <p:spPr>
+              <a:xfrm>
+                <a:off x="7947435" y="2627024"/>
+                <a:ext cx="388888" cy="276999"/>
+              </a:xfrm>
+              <a:prstGeom prst="rect">
+                <a:avLst/>
+              </a:prstGeom>
+              <a:blipFill>
+                <a:blip r:embed="rId10"/>
+                <a:stretch>
+                  <a:fillRect/>
+                </a:stretch>
+              </a:blipFill>
+            </p:spPr>
+            <p:txBody>
+              <a:bodyPr/>
+              <a:lstStyle/>
+              <a:p>
+                <a:r>
+                  <a:rPr lang="ko-KR" altLang="en-US">
+                    <a:noFill/>
+                  </a:rPr>
+                  <a:t> </a:t>
+                </a:r>
+              </a:p>
+            </p:txBody>
+          </p:sp>
+        </mc:Fallback>
+      </mc:AlternateContent>
+      <p:sp>
+        <p:nvSpPr>
+          <p:cNvPr id="32" name="원호 31">
+            <a:extLst>
+              <a:ext uri="{FF2B5EF4-FFF2-40B4-BE49-F238E27FC236}">
+                <a16:creationId xmlns:a16="http://schemas.microsoft.com/office/drawing/2014/main" id="{2F26AC22-C1D0-47E4-9F73-F05E2DEAC921}"/>
+              </a:ext>
+            </a:extLst>
+          </p:cNvPr>
+          <p:cNvSpPr/>
+          <p:nvPr/>
+        </p:nvSpPr>
+        <p:spPr>
+          <a:xfrm>
+            <a:off x="7719537" y="2733022"/>
+            <a:ext cx="330218" cy="330218"/>
+          </a:xfrm>
+          <a:prstGeom prst="arc">
+            <a:avLst>
+              <a:gd name="adj1" fmla="val 18003140"/>
+              <a:gd name="adj2" fmla="val 133551"/>
+            </a:avLst>
+          </a:prstGeom>
+          <a:ln>
+            <a:solidFill>
+              <a:schemeClr val="tx1"/>
+            </a:solidFill>
+          </a:ln>
+        </p:spPr>
+        <p:style>
+          <a:lnRef idx="1">
+            <a:schemeClr val="accent1"/>
+          </a:lnRef>
+          <a:fillRef idx="0">
+            <a:schemeClr val="accent1"/>
+          </a:fillRef>
+          <a:effectRef idx="0">
+            <a:schemeClr val="accent1"/>
+          </a:effectRef>
+          <a:fontRef idx="minor">
+            <a:schemeClr val="tx1"/>
+          </a:fontRef>
+        </p:style>
+        <p:txBody>
+          <a:bodyPr rtlCol="0" anchor="ctr"/>
+          <a:lstStyle/>
+          <a:p>
+            <a:pPr algn="ctr"/>
+            <a:endParaRPr lang="ko-KR" altLang="en-US"/>
+          </a:p>
+        </p:txBody>
+      </p:sp>
+      <p:cxnSp>
+        <p:nvCxnSpPr>
+          <p:cNvPr id="33" name="직선 연결선 32">
+            <a:extLst>
+              <a:ext uri="{FF2B5EF4-FFF2-40B4-BE49-F238E27FC236}">
+                <a16:creationId xmlns:a16="http://schemas.microsoft.com/office/drawing/2014/main" id="{72B11A91-A24B-4D43-81D5-7D88A202BB95}"/>
+              </a:ext>
+            </a:extLst>
+          </p:cNvPr>
+          <p:cNvCxnSpPr>
+            <a:cxnSpLocks/>
+          </p:cNvCxnSpPr>
+          <p:nvPr/>
+        </p:nvCxnSpPr>
+        <p:spPr>
+          <a:xfrm>
+            <a:off x="8610607" y="2169769"/>
+            <a:ext cx="0" cy="734253"/>
+          </a:xfrm>
+          <a:prstGeom prst="line">
+            <a:avLst/>
+          </a:prstGeom>
+          <a:ln>
+            <a:solidFill>
+              <a:schemeClr val="tx1"/>
+            </a:solidFill>
+            <a:prstDash val="dashDot"/>
+          </a:ln>
+        </p:spPr>
+        <p:style>
+          <a:lnRef idx="1">
+            <a:schemeClr val="accent1"/>
+          </a:lnRef>
+          <a:fillRef idx="0">
+            <a:schemeClr val="accent1"/>
+          </a:fillRef>
+          <a:effectRef idx="0">
+            <a:schemeClr val="accent1"/>
+          </a:effectRef>
+          <a:fontRef idx="minor">
+            <a:schemeClr val="tx1"/>
+          </a:fontRef>
+        </p:style>
+      </p:cxnSp>
+      <p:sp>
+        <p:nvSpPr>
+          <p:cNvPr id="37" name="TextBox 36">
+            <a:extLst>
+              <a:ext uri="{FF2B5EF4-FFF2-40B4-BE49-F238E27FC236}">
+                <a16:creationId xmlns:a16="http://schemas.microsoft.com/office/drawing/2014/main" id="{FD8E2B16-318D-4C53-AA2C-A6714CF8E945}"/>
+              </a:ext>
+            </a:extLst>
+          </p:cNvPr>
+          <p:cNvSpPr txBox="1"/>
+          <p:nvPr/>
+        </p:nvSpPr>
+        <p:spPr>
+          <a:xfrm>
+            <a:off x="2113578" y="2660070"/>
+            <a:ext cx="653577" cy="369332"/>
+          </a:xfrm>
+          <a:prstGeom prst="rect">
+            <a:avLst/>
+          </a:prstGeom>
+          <a:noFill/>
+        </p:spPr>
+        <p:txBody>
+          <a:bodyPr wrap="none" rtlCol="0">
+            <a:spAutoFit/>
+          </a:bodyPr>
+          <a:lstStyle/>
+          <a:p>
+            <a:r>
+              <a:rPr lang="en-US" altLang="ko-KR" dirty="0"/>
+              <a:t>start</a:t>
+            </a:r>
+            <a:endParaRPr lang="ko-KR" altLang="en-US" dirty="0"/>
+          </a:p>
+        </p:txBody>
+      </p:sp>
+      <p:sp>
+        <p:nvSpPr>
+          <p:cNvPr id="38" name="TextBox 37">
+            <a:extLst>
+              <a:ext uri="{FF2B5EF4-FFF2-40B4-BE49-F238E27FC236}">
+                <a16:creationId xmlns:a16="http://schemas.microsoft.com/office/drawing/2014/main" id="{CAF77632-4618-4EC6-8ACF-ECF853682ECB}"/>
+              </a:ext>
+            </a:extLst>
+          </p:cNvPr>
+          <p:cNvSpPr txBox="1"/>
+          <p:nvPr/>
+        </p:nvSpPr>
+        <p:spPr>
+          <a:xfrm>
+            <a:off x="9439777" y="2660070"/>
+            <a:ext cx="580608" cy="369332"/>
+          </a:xfrm>
+          <a:prstGeom prst="rect">
+            <a:avLst/>
+          </a:prstGeom>
+          <a:noFill/>
+        </p:spPr>
+        <p:txBody>
+          <a:bodyPr wrap="none" rtlCol="0">
+            <a:spAutoFit/>
+          </a:bodyPr>
+          <a:lstStyle/>
+          <a:p>
+            <a:r>
+              <a:rPr lang="en-US" altLang="ko-KR" dirty="0"/>
+              <a:t>end</a:t>
+            </a:r>
+            <a:endParaRPr lang="ko-KR" altLang="en-US" dirty="0"/>
+          </a:p>
+        </p:txBody>
+      </p:sp>
+      <p:sp>
+        <p:nvSpPr>
+          <p:cNvPr id="39" name="화살표: 오른쪽 38">
+            <a:extLst>
+              <a:ext uri="{FF2B5EF4-FFF2-40B4-BE49-F238E27FC236}">
+                <a16:creationId xmlns:a16="http://schemas.microsoft.com/office/drawing/2014/main" id="{26DB7A0F-FC32-4F59-A0FF-A2836CE323B4}"/>
+              </a:ext>
+            </a:extLst>
+          </p:cNvPr>
+          <p:cNvSpPr/>
+          <p:nvPr/>
+        </p:nvSpPr>
+        <p:spPr>
+          <a:xfrm>
+            <a:off x="2497509" y="3601590"/>
+            <a:ext cx="6833043" cy="484632"/>
+          </a:xfrm>
+          <a:prstGeom prst="rightArrow">
+            <a:avLst/>
+          </a:prstGeom>
+          <a:gradFill flip="none" rotWithShape="1">
+            <a:gsLst>
+              <a:gs pos="0">
+                <a:schemeClr val="accent1">
+                  <a:tint val="66000"/>
+                  <a:satMod val="160000"/>
+                </a:schemeClr>
+              </a:gs>
+              <a:gs pos="30000">
+                <a:schemeClr val="accent1">
+                  <a:tint val="44500"/>
+                  <a:satMod val="160000"/>
+                </a:schemeClr>
+              </a:gs>
+              <a:gs pos="85000">
+                <a:schemeClr val="bg1"/>
+              </a:gs>
+            </a:gsLst>
+            <a:lin ang="10800000" scaled="1"/>
+            <a:tileRect/>
+          </a:gradFill>
+          <a:ln>
+            <a:noFill/>
+          </a:ln>
+        </p:spPr>
+        <p:style>
+          <a:lnRef idx="2">
+            <a:schemeClr val="accent1">
+              <a:shade val="50000"/>
+            </a:schemeClr>
+          </a:lnRef>
+          <a:fillRef idx="1">
+            <a:schemeClr val="accent1"/>
+          </a:fillRef>
+          <a:effectRef idx="0">
+            <a:schemeClr val="accent1"/>
+          </a:effectRef>
+          <a:fontRef idx="minor">
+            <a:schemeClr val="lt1"/>
+          </a:fontRef>
+        </p:style>
+        <p:txBody>
+          <a:bodyPr rtlCol="0" anchor="ctr"/>
+          <a:lstStyle/>
+          <a:p>
+            <a:pPr algn="ctr"/>
+            <a:endParaRPr lang="ko-KR" altLang="en-US"/>
+          </a:p>
+        </p:txBody>
+      </p:sp>
+      <p:sp>
+        <p:nvSpPr>
+          <p:cNvPr id="40" name="TextBox 39">
+            <a:extLst>
+              <a:ext uri="{FF2B5EF4-FFF2-40B4-BE49-F238E27FC236}">
+                <a16:creationId xmlns:a16="http://schemas.microsoft.com/office/drawing/2014/main" id="{618CFDAC-233A-4285-84D2-E6BC1C8C8C1A}"/>
+              </a:ext>
+            </a:extLst>
+          </p:cNvPr>
+          <p:cNvSpPr txBox="1"/>
+          <p:nvPr/>
+        </p:nvSpPr>
+        <p:spPr>
+          <a:xfrm>
+            <a:off x="4741026" y="4064110"/>
+            <a:ext cx="2411173" cy="369332"/>
+          </a:xfrm>
+          <a:prstGeom prst="rect">
+            <a:avLst/>
+          </a:prstGeom>
+          <a:noFill/>
+        </p:spPr>
+        <p:txBody>
+          <a:bodyPr wrap="none" rtlCol="0">
+            <a:spAutoFit/>
+          </a:bodyPr>
+          <a:lstStyle/>
+          <a:p>
+            <a:pPr algn="ctr"/>
+            <a:r>
+              <a:rPr lang="en-US" altLang="ko-KR" dirty="0"/>
+              <a:t>Charles’ moving path</a:t>
+            </a:r>
+            <a:endParaRPr lang="ko-KR" altLang="en-US" dirty="0"/>
+          </a:p>
+        </p:txBody>
+      </p:sp>
+    </p:spTree>
+    <p:extLst>
+      <p:ext uri="{BB962C8B-B14F-4D97-AF65-F5344CB8AC3E}">
+        <p14:creationId xmlns:p14="http://schemas.microsoft.com/office/powerpoint/2010/main" val="2375030353"/>
+      </p:ext>
+    </p:extLst>
+  </p:cSld>
+  <p:clrMapOvr>
+    <a:masterClrMapping/>
+  </p:clrMapOvr>
+</p:sld>
+</file>
+
+<file path=ppt/slides/slide7.xml><?xml version="1.0" encoding="utf-8"?>
 <p:sld xmlns:a="http://schemas.openxmlformats.org/drawingml/2006/main" xmlns:r="http://schemas.openxmlformats.org/officeDocument/2006/relationships" xmlns:p="http://schemas.openxmlformats.org/presentationml/2006/main">
   <p:cSld>
     <p:spTree>
@@ -7748,8 +11721,8 @@
           </a:fontRef>
         </p:style>
       </p:cxnSp>
-      <mc:AlternateContent xmlns:mc="http://schemas.openxmlformats.org/markup-compatibility/2006">
-        <mc:Choice xmlns:a14="http://schemas.microsoft.com/office/drawing/2010/main" Requires="a14">
+      <mc:AlternateContent xmlns:mc="http://schemas.openxmlformats.org/markup-compatibility/2006" xmlns:a14="http://schemas.microsoft.com/office/drawing/2010/main">
+        <mc:Choice Requires="a14">
           <p:sp>
             <p:nvSpPr>
               <p:cNvPr id="50" name="TextBox 49">
@@ -7858,7 +11831,7 @@
             </p:txBody>
           </p:sp>
         </mc:Choice>
-        <mc:Fallback>
+        <mc:Fallback xmlns="">
           <p:sp>
             <p:nvSpPr>
               <p:cNvPr id="50" name="TextBox 49">
@@ -7903,8 +11876,8 @@
           </p:sp>
         </mc:Fallback>
       </mc:AlternateContent>
-      <mc:AlternateContent xmlns:mc="http://schemas.openxmlformats.org/markup-compatibility/2006">
-        <mc:Choice xmlns:a14="http://schemas.microsoft.com/office/drawing/2010/main" Requires="a14">
+      <mc:AlternateContent xmlns:mc="http://schemas.openxmlformats.org/markup-compatibility/2006" xmlns:a14="http://schemas.microsoft.com/office/drawing/2010/main">
+        <mc:Choice Requires="a14">
           <p:sp>
             <p:nvSpPr>
               <p:cNvPr id="51" name="TextBox 50">
@@ -8013,7 +11986,7 @@
             </p:txBody>
           </p:sp>
         </mc:Choice>
-        <mc:Fallback>
+        <mc:Fallback xmlns="">
           <p:sp>
             <p:nvSpPr>
               <p:cNvPr id="51" name="TextBox 50">
@@ -8058,8 +12031,8 @@
           </p:sp>
         </mc:Fallback>
       </mc:AlternateContent>
-      <mc:AlternateContent xmlns:mc="http://schemas.openxmlformats.org/markup-compatibility/2006">
-        <mc:Choice xmlns:a14="http://schemas.microsoft.com/office/drawing/2010/main" Requires="a14">
+      <mc:AlternateContent xmlns:mc="http://schemas.openxmlformats.org/markup-compatibility/2006" xmlns:a14="http://schemas.microsoft.com/office/drawing/2010/main">
+        <mc:Choice Requires="a14">
           <p:sp>
             <p:nvSpPr>
               <p:cNvPr id="52" name="TextBox 51">
@@ -8168,7 +12141,7 @@
             </p:txBody>
           </p:sp>
         </mc:Choice>
-        <mc:Fallback>
+        <mc:Fallback xmlns="">
           <p:sp>
             <p:nvSpPr>
               <p:cNvPr id="52" name="TextBox 51">
@@ -8213,8 +12186,8 @@
           </p:sp>
         </mc:Fallback>
       </mc:AlternateContent>
-      <mc:AlternateContent xmlns:mc="http://schemas.openxmlformats.org/markup-compatibility/2006">
-        <mc:Choice xmlns:a14="http://schemas.microsoft.com/office/drawing/2010/main" Requires="a14">
+      <mc:AlternateContent xmlns:mc="http://schemas.openxmlformats.org/markup-compatibility/2006" xmlns:a14="http://schemas.microsoft.com/office/drawing/2010/main">
+        <mc:Choice Requires="a14">
           <p:sp>
             <p:nvSpPr>
               <p:cNvPr id="53" name="TextBox 52">
@@ -8323,7 +12296,7 @@
             </p:txBody>
           </p:sp>
         </mc:Choice>
-        <mc:Fallback>
+        <mc:Fallback xmlns="">
           <p:sp>
             <p:nvSpPr>
               <p:cNvPr id="53" name="TextBox 52">
@@ -8368,8 +12341,8 @@
           </p:sp>
         </mc:Fallback>
       </mc:AlternateContent>
-      <mc:AlternateContent xmlns:mc="http://schemas.openxmlformats.org/markup-compatibility/2006">
-        <mc:Choice xmlns:a14="http://schemas.microsoft.com/office/drawing/2010/main" Requires="a14">
+      <mc:AlternateContent xmlns:mc="http://schemas.openxmlformats.org/markup-compatibility/2006" xmlns:a14="http://schemas.microsoft.com/office/drawing/2010/main">
+        <mc:Choice Requires="a14">
           <p:sp>
             <p:nvSpPr>
               <p:cNvPr id="54" name="TextBox 53">
@@ -8426,7 +12399,7 @@
             </p:txBody>
           </p:sp>
         </mc:Choice>
-        <mc:Fallback>
+        <mc:Fallback xmlns="">
           <p:sp>
             <p:nvSpPr>
               <p:cNvPr id="54" name="TextBox 53">
@@ -8471,8 +12444,8 @@
           </p:sp>
         </mc:Fallback>
       </mc:AlternateContent>
-      <mc:AlternateContent xmlns:mc="http://schemas.openxmlformats.org/markup-compatibility/2006">
-        <mc:Choice xmlns:a14="http://schemas.microsoft.com/office/drawing/2010/main" Requires="a14">
+      <mc:AlternateContent xmlns:mc="http://schemas.openxmlformats.org/markup-compatibility/2006" xmlns:a14="http://schemas.microsoft.com/office/drawing/2010/main">
+        <mc:Choice Requires="a14">
           <p:sp>
             <p:nvSpPr>
               <p:cNvPr id="55" name="TextBox 54">
@@ -8581,7 +12554,7 @@
             </p:txBody>
           </p:sp>
         </mc:Choice>
-        <mc:Fallback>
+        <mc:Fallback xmlns="">
           <p:sp>
             <p:nvSpPr>
               <p:cNvPr id="55" name="TextBox 54">
@@ -8626,8 +12599,8 @@
           </p:sp>
         </mc:Fallback>
       </mc:AlternateContent>
-      <mc:AlternateContent xmlns:mc="http://schemas.openxmlformats.org/markup-compatibility/2006">
-        <mc:Choice xmlns:a14="http://schemas.microsoft.com/office/drawing/2010/main" Requires="a14">
+      <mc:AlternateContent xmlns:mc="http://schemas.openxmlformats.org/markup-compatibility/2006" xmlns:a14="http://schemas.microsoft.com/office/drawing/2010/main">
+        <mc:Choice Requires="a14">
           <p:sp>
             <p:nvSpPr>
               <p:cNvPr id="56" name="TextBox 55">
@@ -8724,7 +12697,7 @@
             </p:txBody>
           </p:sp>
         </mc:Choice>
-        <mc:Fallback>
+        <mc:Fallback xmlns="">
           <p:sp>
             <p:nvSpPr>
               <p:cNvPr id="56" name="TextBox 55">
@@ -8857,8 +12830,8 @@
           </a:fontRef>
         </p:style>
       </p:cxnSp>
-      <mc:AlternateContent xmlns:mc="http://schemas.openxmlformats.org/markup-compatibility/2006">
-        <mc:Choice xmlns:a14="http://schemas.microsoft.com/office/drawing/2010/main" Requires="a14">
+      <mc:AlternateContent xmlns:mc="http://schemas.openxmlformats.org/markup-compatibility/2006" xmlns:a14="http://schemas.microsoft.com/office/drawing/2010/main">
+        <mc:Choice Requires="a14">
           <p:sp>
             <p:nvSpPr>
               <p:cNvPr id="62" name="TextBox 61">
@@ -8955,7 +12928,7 @@
             </p:txBody>
           </p:sp>
         </mc:Choice>
-        <mc:Fallback>
+        <mc:Fallback xmlns="">
           <p:sp>
             <p:nvSpPr>
               <p:cNvPr id="62" name="TextBox 61">
@@ -9044,8 +13017,8 @@
           </a:fontRef>
         </p:style>
       </p:cxnSp>
-      <mc:AlternateContent xmlns:mc="http://schemas.openxmlformats.org/markup-compatibility/2006">
-        <mc:Choice xmlns:a14="http://schemas.microsoft.com/office/drawing/2010/main" Requires="a14">
+      <mc:AlternateContent xmlns:mc="http://schemas.openxmlformats.org/markup-compatibility/2006" xmlns:a14="http://schemas.microsoft.com/office/drawing/2010/main">
+        <mc:Choice Requires="a14">
           <p:sp>
             <p:nvSpPr>
               <p:cNvPr id="66" name="TextBox 65">
@@ -9142,7 +13115,7 @@
             </p:txBody>
           </p:sp>
         </mc:Choice>
-        <mc:Fallback>
+        <mc:Fallback xmlns="">
           <p:sp>
             <p:nvSpPr>
               <p:cNvPr id="66" name="TextBox 65">
@@ -9231,8 +13204,8 @@
           </a:fontRef>
         </p:style>
       </p:cxnSp>
-      <mc:AlternateContent xmlns:mc="http://schemas.openxmlformats.org/markup-compatibility/2006">
-        <mc:Choice xmlns:a14="http://schemas.microsoft.com/office/drawing/2010/main" Requires="a14">
+      <mc:AlternateContent xmlns:mc="http://schemas.openxmlformats.org/markup-compatibility/2006" xmlns:a14="http://schemas.microsoft.com/office/drawing/2010/main">
+        <mc:Choice Requires="a14">
           <p:sp>
             <p:nvSpPr>
               <p:cNvPr id="69" name="TextBox 68">
@@ -9329,7 +13302,7 @@
             </p:txBody>
           </p:sp>
         </mc:Choice>
-        <mc:Fallback>
+        <mc:Fallback xmlns="">
           <p:sp>
             <p:nvSpPr>
               <p:cNvPr id="69" name="TextBox 68">
@@ -9418,8 +13391,8 @@
           </a:fontRef>
         </p:style>
       </p:cxnSp>
-      <mc:AlternateContent xmlns:mc="http://schemas.openxmlformats.org/markup-compatibility/2006">
-        <mc:Choice xmlns:a14="http://schemas.microsoft.com/office/drawing/2010/main" Requires="a14">
+      <mc:AlternateContent xmlns:mc="http://schemas.openxmlformats.org/markup-compatibility/2006" xmlns:a14="http://schemas.microsoft.com/office/drawing/2010/main">
+        <mc:Choice Requires="a14">
           <p:sp>
             <p:nvSpPr>
               <p:cNvPr id="72" name="TextBox 71">
@@ -9516,7 +13489,7 @@
             </p:txBody>
           </p:sp>
         </mc:Choice>
-        <mc:Fallback>
+        <mc:Fallback xmlns="">
           <p:sp>
             <p:nvSpPr>
               <p:cNvPr id="72" name="TextBox 71">
@@ -9678,7 +13651,7 @@
 </p:sld>
 </file>
 
-<file path=ppt/slides/slide5.xml><?xml version="1.0" encoding="utf-8"?>
+<file path=ppt/slides/slide8.xml><?xml version="1.0" encoding="utf-8"?>
 <p:sld xmlns:a="http://schemas.openxmlformats.org/drawingml/2006/main" xmlns:r="http://schemas.openxmlformats.org/officeDocument/2006/relationships" xmlns:p="http://schemas.openxmlformats.org/presentationml/2006/main">
   <p:cSld>
     <p:spTree>

</xml_diff>